<commit_message>
created models and db migrated
</commit_message>
<xml_diff>
--- a/produswap-org.pptx
+++ b/produswap-org.pptx
@@ -11,8 +11,12 @@
     <p:sldId id="262" r:id="rId5"/>
     <p:sldId id="259" r:id="rId6"/>
     <p:sldId id="260" r:id="rId7"/>
-    <p:sldId id="261" r:id="rId8"/>
-    <p:sldId id="263" r:id="rId9"/>
+    <p:sldId id="265" r:id="rId8"/>
+    <p:sldId id="266" r:id="rId9"/>
+    <p:sldId id="261" r:id="rId10"/>
+    <p:sldId id="263" r:id="rId11"/>
+    <p:sldId id="264" r:id="rId12"/>
+    <p:sldId id="267" r:id="rId13"/>
   </p:sldIdLst>
   <p:sldSz cx="12192000" cy="6858000"/>
   <p:notesSz cx="6858000" cy="9144000"/>
@@ -250,7 +254,7 @@
           <a:p>
             <a:fld id="{53B3AD58-3263-734D-AAA1-9560283B719D}" type="datetimeFigureOut">
               <a:rPr lang="en-US" smtClean="0"/>
-              <a:t>10/27/16</a:t>
+              <a:t>10/28/16</a:t>
             </a:fld>
             <a:endParaRPr lang="en-US"/>
           </a:p>
@@ -420,7 +424,7 @@
           <a:p>
             <a:fld id="{53B3AD58-3263-734D-AAA1-9560283B719D}" type="datetimeFigureOut">
               <a:rPr lang="en-US" smtClean="0"/>
-              <a:t>10/27/16</a:t>
+              <a:t>10/28/16</a:t>
             </a:fld>
             <a:endParaRPr lang="en-US"/>
           </a:p>
@@ -600,7 +604,7 @@
           <a:p>
             <a:fld id="{53B3AD58-3263-734D-AAA1-9560283B719D}" type="datetimeFigureOut">
               <a:rPr lang="en-US" smtClean="0"/>
-              <a:t>10/27/16</a:t>
+              <a:t>10/28/16</a:t>
             </a:fld>
             <a:endParaRPr lang="en-US"/>
           </a:p>
@@ -770,7 +774,7 @@
           <a:p>
             <a:fld id="{53B3AD58-3263-734D-AAA1-9560283B719D}" type="datetimeFigureOut">
               <a:rPr lang="en-US" smtClean="0"/>
-              <a:t>10/27/16</a:t>
+              <a:t>10/28/16</a:t>
             </a:fld>
             <a:endParaRPr lang="en-US"/>
           </a:p>
@@ -1016,7 +1020,7 @@
           <a:p>
             <a:fld id="{53B3AD58-3263-734D-AAA1-9560283B719D}" type="datetimeFigureOut">
               <a:rPr lang="en-US" smtClean="0"/>
-              <a:t>10/27/16</a:t>
+              <a:t>10/28/16</a:t>
             </a:fld>
             <a:endParaRPr lang="en-US"/>
           </a:p>
@@ -1248,7 +1252,7 @@
           <a:p>
             <a:fld id="{53B3AD58-3263-734D-AAA1-9560283B719D}" type="datetimeFigureOut">
               <a:rPr lang="en-US" smtClean="0"/>
-              <a:t>10/27/16</a:t>
+              <a:t>10/28/16</a:t>
             </a:fld>
             <a:endParaRPr lang="en-US"/>
           </a:p>
@@ -1615,7 +1619,7 @@
           <a:p>
             <a:fld id="{53B3AD58-3263-734D-AAA1-9560283B719D}" type="datetimeFigureOut">
               <a:rPr lang="en-US" smtClean="0"/>
-              <a:t>10/27/16</a:t>
+              <a:t>10/28/16</a:t>
             </a:fld>
             <a:endParaRPr lang="en-US"/>
           </a:p>
@@ -1733,7 +1737,7 @@
           <a:p>
             <a:fld id="{53B3AD58-3263-734D-AAA1-9560283B719D}" type="datetimeFigureOut">
               <a:rPr lang="en-US" smtClean="0"/>
-              <a:t>10/27/16</a:t>
+              <a:t>10/28/16</a:t>
             </a:fld>
             <a:endParaRPr lang="en-US"/>
           </a:p>
@@ -1828,7 +1832,7 @@
           <a:p>
             <a:fld id="{53B3AD58-3263-734D-AAA1-9560283B719D}" type="datetimeFigureOut">
               <a:rPr lang="en-US" smtClean="0"/>
-              <a:t>10/27/16</a:t>
+              <a:t>10/28/16</a:t>
             </a:fld>
             <a:endParaRPr lang="en-US"/>
           </a:p>
@@ -2105,7 +2109,7 @@
           <a:p>
             <a:fld id="{53B3AD58-3263-734D-AAA1-9560283B719D}" type="datetimeFigureOut">
               <a:rPr lang="en-US" smtClean="0"/>
-              <a:t>10/27/16</a:t>
+              <a:t>10/28/16</a:t>
             </a:fld>
             <a:endParaRPr lang="en-US"/>
           </a:p>
@@ -2358,7 +2362,7 @@
           <a:p>
             <a:fld id="{53B3AD58-3263-734D-AAA1-9560283B719D}" type="datetimeFigureOut">
               <a:rPr lang="en-US" smtClean="0"/>
-              <a:t>10/27/16</a:t>
+              <a:t>10/28/16</a:t>
             </a:fld>
             <a:endParaRPr lang="en-US"/>
           </a:p>
@@ -2571,7 +2575,7 @@
           <a:p>
             <a:fld id="{53B3AD58-3263-734D-AAA1-9560283B719D}" type="datetimeFigureOut">
               <a:rPr lang="en-US" smtClean="0"/>
-              <a:t>10/27/16</a:t>
+              <a:t>10/28/16</a:t>
             </a:fld>
             <a:endParaRPr lang="en-US"/>
           </a:p>
@@ -3386,6 +3390,1045 @@
 </p:sld>
 </file>
 
+<file path=ppt/slides/slide10.xml><?xml version="1.0" encoding="utf-8"?>
+<p:sld xmlns:a="http://schemas.openxmlformats.org/drawingml/2006/main" xmlns:r="http://schemas.openxmlformats.org/officeDocument/2006/relationships" xmlns:p="http://schemas.openxmlformats.org/presentationml/2006/main">
+  <p:cSld>
+    <p:spTree>
+      <p:nvGrpSpPr>
+        <p:cNvPr id="1" name=""/>
+        <p:cNvGrpSpPr/>
+        <p:nvPr/>
+      </p:nvGrpSpPr>
+      <p:grpSpPr>
+        <a:xfrm>
+          <a:off x="0" y="0"/>
+          <a:ext cx="0" cy="0"/>
+          <a:chOff x="0" y="0"/>
+          <a:chExt cx="0" cy="0"/>
+        </a:xfrm>
+      </p:grpSpPr>
+      <p:pic>
+        <p:nvPicPr>
+          <p:cNvPr id="4" name="Picture 3"/>
+          <p:cNvPicPr>
+            <a:picLocks noChangeAspect="1"/>
+          </p:cNvPicPr>
+          <p:nvPr/>
+        </p:nvPicPr>
+        <p:blipFill>
+          <a:blip r:embed="rId2">
+            <a:extLst>
+              <a:ext uri="{28A0092B-C50C-407E-A947-70E740481C1C}">
+                <a14:useLocalDpi xmlns:a14="http://schemas.microsoft.com/office/drawing/2010/main" val="0"/>
+              </a:ext>
+            </a:extLst>
+          </a:blip>
+          <a:stretch>
+            <a:fillRect/>
+          </a:stretch>
+        </p:blipFill>
+        <p:spPr>
+          <a:xfrm>
+            <a:off x="1553029" y="1"/>
+            <a:ext cx="9144000" cy="6858000"/>
+          </a:xfrm>
+          <a:prstGeom prst="rect">
+            <a:avLst/>
+          </a:prstGeom>
+        </p:spPr>
+      </p:pic>
+    </p:spTree>
+    <p:extLst>
+      <p:ext uri="{BB962C8B-B14F-4D97-AF65-F5344CB8AC3E}">
+        <p14:creationId xmlns:p14="http://schemas.microsoft.com/office/powerpoint/2010/main" val="1998744901"/>
+      </p:ext>
+    </p:extLst>
+  </p:cSld>
+  <p:clrMapOvr>
+    <a:masterClrMapping/>
+  </p:clrMapOvr>
+  <p:timing>
+    <p:tnLst>
+      <p:par>
+        <p:cTn id="1" dur="indefinite" restart="never" nodeType="tmRoot"/>
+      </p:par>
+    </p:tnLst>
+  </p:timing>
+</p:sld>
+</file>
+
+<file path=ppt/slides/slide11.xml><?xml version="1.0" encoding="utf-8"?>
+<p:sld xmlns:a="http://schemas.openxmlformats.org/drawingml/2006/main" xmlns:r="http://schemas.openxmlformats.org/officeDocument/2006/relationships" xmlns:p="http://schemas.openxmlformats.org/presentationml/2006/main">
+  <p:cSld>
+    <p:spTree>
+      <p:nvGrpSpPr>
+        <p:cNvPr id="1" name=""/>
+        <p:cNvGrpSpPr/>
+        <p:nvPr/>
+      </p:nvGrpSpPr>
+      <p:grpSpPr>
+        <a:xfrm>
+          <a:off x="0" y="0"/>
+          <a:ext cx="0" cy="0"/>
+          <a:chOff x="0" y="0"/>
+          <a:chExt cx="0" cy="0"/>
+        </a:xfrm>
+      </p:grpSpPr>
+      <p:sp>
+        <p:nvSpPr>
+          <p:cNvPr id="4" name="TextBox 3"/>
+          <p:cNvSpPr txBox="1"/>
+          <p:nvPr/>
+        </p:nvSpPr>
+        <p:spPr>
+          <a:xfrm>
+            <a:off x="261257" y="1103086"/>
+            <a:ext cx="3265714" cy="4770537"/>
+          </a:xfrm>
+          <a:prstGeom prst="rect">
+            <a:avLst/>
+          </a:prstGeom>
+          <a:solidFill>
+            <a:schemeClr val="bg1">
+              <a:lumMod val="95000"/>
+            </a:schemeClr>
+          </a:solidFill>
+          <a:ln>
+            <a:solidFill>
+              <a:schemeClr val="tx1"/>
+            </a:solidFill>
+          </a:ln>
+        </p:spPr>
+        <p:txBody>
+          <a:bodyPr wrap="square" rtlCol="0">
+            <a:spAutoFit/>
+          </a:bodyPr>
+          <a:lstStyle/>
+          <a:p>
+            <a:r>
+              <a:rPr lang="en-US" sz="4000" u="sng" dirty="0" smtClean="0"/>
+              <a:t>Users</a:t>
+            </a:r>
+            <a:endParaRPr lang="en-US" sz="3200" u="sng" dirty="0"/>
+          </a:p>
+          <a:p>
+            <a:r>
+              <a:rPr lang="en-US" sz="2400" dirty="0" smtClean="0"/>
+              <a:t>ID </a:t>
+            </a:r>
+          </a:p>
+          <a:p>
+            <a:r>
+              <a:rPr lang="en-US" sz="2400" dirty="0" err="1"/>
+              <a:t>f</a:t>
+            </a:r>
+            <a:r>
+              <a:rPr lang="en-US" sz="2400" dirty="0" err="1" smtClean="0"/>
+              <a:t>irst_name</a:t>
+            </a:r>
+            <a:r>
+              <a:rPr lang="en-US" sz="2400" dirty="0" smtClean="0"/>
+              <a:t> </a:t>
+            </a:r>
+          </a:p>
+          <a:p>
+            <a:r>
+              <a:rPr lang="en-US" sz="2400"/>
+              <a:t>l</a:t>
+            </a:r>
+            <a:r>
+              <a:rPr lang="en-US" sz="2400" smtClean="0"/>
+              <a:t>ast_name</a:t>
+            </a:r>
+            <a:endParaRPr lang="en-US" sz="2400" dirty="0" smtClean="0"/>
+          </a:p>
+          <a:p>
+            <a:r>
+              <a:rPr lang="en-US" sz="2400" dirty="0" smtClean="0"/>
+              <a:t>Email </a:t>
+            </a:r>
+          </a:p>
+          <a:p>
+            <a:r>
+              <a:rPr lang="en-US" sz="2400" dirty="0" smtClean="0"/>
+              <a:t>Password</a:t>
+            </a:r>
+          </a:p>
+          <a:p>
+            <a:r>
+              <a:rPr lang="en-US" sz="2400" dirty="0" smtClean="0"/>
+              <a:t>Zip Code</a:t>
+            </a:r>
+          </a:p>
+          <a:p>
+            <a:r>
+              <a:rPr lang="en-US" sz="2400" dirty="0" smtClean="0"/>
+              <a:t>Rules?</a:t>
+            </a:r>
+          </a:p>
+          <a:p>
+            <a:endParaRPr lang="en-US" sz="2400" dirty="0"/>
+          </a:p>
+          <a:p>
+            <a:r>
+              <a:rPr lang="en-US" sz="2400" dirty="0" err="1"/>
+              <a:t>h</a:t>
+            </a:r>
+            <a:r>
+              <a:rPr lang="en-US" sz="2400" dirty="0" err="1" smtClean="0"/>
+              <a:t>as_many</a:t>
+            </a:r>
+            <a:r>
+              <a:rPr lang="en-US" sz="2400" dirty="0" smtClean="0"/>
+              <a:t> :posts</a:t>
+            </a:r>
+          </a:p>
+          <a:p>
+            <a:endParaRPr lang="en-US" sz="2400" dirty="0"/>
+          </a:p>
+          <a:p>
+            <a:r>
+              <a:rPr lang="en-US" sz="2400" dirty="0" err="1"/>
+              <a:t>h</a:t>
+            </a:r>
+            <a:r>
+              <a:rPr lang="en-US" sz="2400" dirty="0" err="1" smtClean="0"/>
+              <a:t>as_many</a:t>
+            </a:r>
+            <a:r>
+              <a:rPr lang="en-US" sz="2400" dirty="0" smtClean="0"/>
+              <a:t> :messages</a:t>
+            </a:r>
+          </a:p>
+        </p:txBody>
+      </p:sp>
+      <p:sp>
+        <p:nvSpPr>
+          <p:cNvPr id="5" name="TextBox 4"/>
+          <p:cNvSpPr txBox="1"/>
+          <p:nvPr/>
+        </p:nvSpPr>
+        <p:spPr>
+          <a:xfrm>
+            <a:off x="4869542" y="1103086"/>
+            <a:ext cx="2634343" cy="2862322"/>
+          </a:xfrm>
+          <a:prstGeom prst="rect">
+            <a:avLst/>
+          </a:prstGeom>
+          <a:solidFill>
+            <a:schemeClr val="bg1">
+              <a:lumMod val="95000"/>
+            </a:schemeClr>
+          </a:solidFill>
+          <a:ln>
+            <a:solidFill>
+              <a:schemeClr val="tx1"/>
+            </a:solidFill>
+          </a:ln>
+        </p:spPr>
+        <p:txBody>
+          <a:bodyPr wrap="square" rtlCol="0">
+            <a:spAutoFit/>
+          </a:bodyPr>
+          <a:lstStyle/>
+          <a:p>
+            <a:r>
+              <a:rPr lang="en-US" sz="4000" u="sng" dirty="0" smtClean="0"/>
+              <a:t>Posts</a:t>
+            </a:r>
+            <a:endParaRPr lang="en-US" sz="3200" u="sng" dirty="0"/>
+          </a:p>
+          <a:p>
+            <a:r>
+              <a:rPr lang="en-US" sz="2400" dirty="0" smtClean="0"/>
+              <a:t>ID </a:t>
+            </a:r>
+          </a:p>
+          <a:p>
+            <a:r>
+              <a:rPr lang="en-US" sz="2400" dirty="0" err="1" smtClean="0"/>
+              <a:t>User_ID</a:t>
+            </a:r>
+            <a:r>
+              <a:rPr lang="en-US" sz="2400" dirty="0" smtClean="0"/>
+              <a:t> </a:t>
+            </a:r>
+          </a:p>
+          <a:p>
+            <a:r>
+              <a:rPr lang="en-US" sz="2400" dirty="0" smtClean="0"/>
+              <a:t>Content</a:t>
+            </a:r>
+          </a:p>
+          <a:p>
+            <a:r>
+              <a:rPr lang="en-US" sz="2400" dirty="0" smtClean="0"/>
+              <a:t>Summary</a:t>
+            </a:r>
+          </a:p>
+          <a:p>
+            <a:endParaRPr lang="en-US" sz="2400" dirty="0"/>
+          </a:p>
+          <a:p>
+            <a:r>
+              <a:rPr lang="en-US" sz="2000" dirty="0" err="1"/>
+              <a:t>b</a:t>
+            </a:r>
+            <a:r>
+              <a:rPr lang="en-US" sz="2000" dirty="0" err="1" smtClean="0"/>
+              <a:t>elongs_to</a:t>
+            </a:r>
+            <a:r>
+              <a:rPr lang="en-US" sz="2000" dirty="0" smtClean="0"/>
+              <a:t> :user </a:t>
+            </a:r>
+          </a:p>
+        </p:txBody>
+      </p:sp>
+      <p:cxnSp>
+        <p:nvCxnSpPr>
+          <p:cNvPr id="9" name="Straight Connector 8"/>
+          <p:cNvCxnSpPr/>
+          <p:nvPr/>
+        </p:nvCxnSpPr>
+        <p:spPr>
+          <a:xfrm flipV="1">
+            <a:off x="3526971" y="2177143"/>
+            <a:ext cx="1342571" cy="14514"/>
+          </a:xfrm>
+          <a:prstGeom prst="line">
+            <a:avLst/>
+          </a:prstGeom>
+          <a:ln>
+            <a:solidFill>
+              <a:schemeClr val="tx1"/>
+            </a:solidFill>
+          </a:ln>
+        </p:spPr>
+        <p:style>
+          <a:lnRef idx="1">
+            <a:schemeClr val="accent1"/>
+          </a:lnRef>
+          <a:fillRef idx="0">
+            <a:schemeClr val="accent1"/>
+          </a:fillRef>
+          <a:effectRef idx="0">
+            <a:schemeClr val="accent1"/>
+          </a:effectRef>
+          <a:fontRef idx="minor">
+            <a:schemeClr val="tx1"/>
+          </a:fontRef>
+        </p:style>
+      </p:cxnSp>
+      <p:cxnSp>
+        <p:nvCxnSpPr>
+          <p:cNvPr id="11" name="Straight Connector 10"/>
+          <p:cNvCxnSpPr/>
+          <p:nvPr/>
+        </p:nvCxnSpPr>
+        <p:spPr>
+          <a:xfrm flipV="1">
+            <a:off x="4426857" y="1915886"/>
+            <a:ext cx="442685" cy="246743"/>
+          </a:xfrm>
+          <a:prstGeom prst="line">
+            <a:avLst/>
+          </a:prstGeom>
+          <a:ln>
+            <a:solidFill>
+              <a:schemeClr val="tx1"/>
+            </a:solidFill>
+          </a:ln>
+        </p:spPr>
+        <p:style>
+          <a:lnRef idx="1">
+            <a:schemeClr val="accent1"/>
+          </a:lnRef>
+          <a:fillRef idx="0">
+            <a:schemeClr val="accent1"/>
+          </a:fillRef>
+          <a:effectRef idx="0">
+            <a:schemeClr val="accent1"/>
+          </a:effectRef>
+          <a:fontRef idx="minor">
+            <a:schemeClr val="tx1"/>
+          </a:fontRef>
+        </p:style>
+      </p:cxnSp>
+      <p:cxnSp>
+        <p:nvCxnSpPr>
+          <p:cNvPr id="12" name="Straight Connector 11"/>
+          <p:cNvCxnSpPr>
+            <a:endCxn id="5" idx="1"/>
+          </p:cNvCxnSpPr>
+          <p:nvPr/>
+        </p:nvCxnSpPr>
+        <p:spPr>
+          <a:xfrm>
+            <a:off x="4426857" y="2191657"/>
+            <a:ext cx="442685" cy="342590"/>
+          </a:xfrm>
+          <a:prstGeom prst="line">
+            <a:avLst/>
+          </a:prstGeom>
+          <a:ln>
+            <a:solidFill>
+              <a:schemeClr val="tx1"/>
+            </a:solidFill>
+          </a:ln>
+        </p:spPr>
+        <p:style>
+          <a:lnRef idx="1">
+            <a:schemeClr val="accent1"/>
+          </a:lnRef>
+          <a:fillRef idx="0">
+            <a:schemeClr val="accent1"/>
+          </a:fillRef>
+          <a:effectRef idx="0">
+            <a:schemeClr val="accent1"/>
+          </a:effectRef>
+          <a:fontRef idx="minor">
+            <a:schemeClr val="tx1"/>
+          </a:fontRef>
+        </p:style>
+      </p:cxnSp>
+      <p:cxnSp>
+        <p:nvCxnSpPr>
+          <p:cNvPr id="15" name="Straight Connector 14"/>
+          <p:cNvCxnSpPr/>
+          <p:nvPr/>
+        </p:nvCxnSpPr>
+        <p:spPr>
+          <a:xfrm>
+            <a:off x="3664856" y="2037885"/>
+            <a:ext cx="0" cy="301907"/>
+          </a:xfrm>
+          <a:prstGeom prst="line">
+            <a:avLst/>
+          </a:prstGeom>
+          <a:ln>
+            <a:solidFill>
+              <a:schemeClr val="tx1"/>
+            </a:solidFill>
+          </a:ln>
+        </p:spPr>
+        <p:style>
+          <a:lnRef idx="1">
+            <a:schemeClr val="accent1"/>
+          </a:lnRef>
+          <a:fillRef idx="0">
+            <a:schemeClr val="accent1"/>
+          </a:fillRef>
+          <a:effectRef idx="0">
+            <a:schemeClr val="accent1"/>
+          </a:effectRef>
+          <a:fontRef idx="minor">
+            <a:schemeClr val="tx1"/>
+          </a:fontRef>
+        </p:style>
+      </p:cxnSp>
+      <p:cxnSp>
+        <p:nvCxnSpPr>
+          <p:cNvPr id="18" name="Straight Connector 17"/>
+          <p:cNvCxnSpPr/>
+          <p:nvPr/>
+        </p:nvCxnSpPr>
+        <p:spPr>
+          <a:xfrm flipV="1">
+            <a:off x="7463971" y="2339792"/>
+            <a:ext cx="1342571" cy="14514"/>
+          </a:xfrm>
+          <a:prstGeom prst="line">
+            <a:avLst/>
+          </a:prstGeom>
+          <a:ln>
+            <a:solidFill>
+              <a:schemeClr val="tx1"/>
+            </a:solidFill>
+          </a:ln>
+        </p:spPr>
+        <p:style>
+          <a:lnRef idx="1">
+            <a:schemeClr val="accent1"/>
+          </a:lnRef>
+          <a:fillRef idx="0">
+            <a:schemeClr val="accent1"/>
+          </a:fillRef>
+          <a:effectRef idx="0">
+            <a:schemeClr val="accent1"/>
+          </a:effectRef>
+          <a:fontRef idx="minor">
+            <a:schemeClr val="tx1"/>
+          </a:fontRef>
+        </p:style>
+      </p:cxnSp>
+      <p:cxnSp>
+        <p:nvCxnSpPr>
+          <p:cNvPr id="19" name="Straight Connector 18"/>
+          <p:cNvCxnSpPr/>
+          <p:nvPr/>
+        </p:nvCxnSpPr>
+        <p:spPr>
+          <a:xfrm flipV="1">
+            <a:off x="8363857" y="2078535"/>
+            <a:ext cx="442685" cy="246743"/>
+          </a:xfrm>
+          <a:prstGeom prst="line">
+            <a:avLst/>
+          </a:prstGeom>
+          <a:ln>
+            <a:solidFill>
+              <a:schemeClr val="tx1"/>
+            </a:solidFill>
+          </a:ln>
+        </p:spPr>
+        <p:style>
+          <a:lnRef idx="1">
+            <a:schemeClr val="accent1"/>
+          </a:lnRef>
+          <a:fillRef idx="0">
+            <a:schemeClr val="accent1"/>
+          </a:fillRef>
+          <a:effectRef idx="0">
+            <a:schemeClr val="accent1"/>
+          </a:effectRef>
+          <a:fontRef idx="minor">
+            <a:schemeClr val="tx1"/>
+          </a:fontRef>
+        </p:style>
+      </p:cxnSp>
+      <p:cxnSp>
+        <p:nvCxnSpPr>
+          <p:cNvPr id="20" name="Straight Connector 19"/>
+          <p:cNvCxnSpPr>
+            <a:endCxn id="21" idx="1"/>
+          </p:cNvCxnSpPr>
+          <p:nvPr/>
+        </p:nvCxnSpPr>
+        <p:spPr>
+          <a:xfrm>
+            <a:off x="8363857" y="2354306"/>
+            <a:ext cx="442685" cy="342590"/>
+          </a:xfrm>
+          <a:prstGeom prst="line">
+            <a:avLst/>
+          </a:prstGeom>
+          <a:ln>
+            <a:solidFill>
+              <a:schemeClr val="tx1"/>
+            </a:solidFill>
+          </a:ln>
+        </p:spPr>
+        <p:style>
+          <a:lnRef idx="1">
+            <a:schemeClr val="accent1"/>
+          </a:lnRef>
+          <a:fillRef idx="0">
+            <a:schemeClr val="accent1"/>
+          </a:fillRef>
+          <a:effectRef idx="0">
+            <a:schemeClr val="accent1"/>
+          </a:effectRef>
+          <a:fontRef idx="minor">
+            <a:schemeClr val="tx1"/>
+          </a:fontRef>
+        </p:style>
+      </p:cxnSp>
+      <p:cxnSp>
+        <p:nvCxnSpPr>
+          <p:cNvPr id="21" name="Straight Connector 20"/>
+          <p:cNvCxnSpPr/>
+          <p:nvPr/>
+        </p:nvCxnSpPr>
+        <p:spPr>
+          <a:xfrm>
+            <a:off x="7601856" y="2200534"/>
+            <a:ext cx="0" cy="301907"/>
+          </a:xfrm>
+          <a:prstGeom prst="line">
+            <a:avLst/>
+          </a:prstGeom>
+          <a:ln>
+            <a:solidFill>
+              <a:schemeClr val="tx1"/>
+            </a:solidFill>
+          </a:ln>
+        </p:spPr>
+        <p:style>
+          <a:lnRef idx="1">
+            <a:schemeClr val="accent1"/>
+          </a:lnRef>
+          <a:fillRef idx="0">
+            <a:schemeClr val="accent1"/>
+          </a:fillRef>
+          <a:effectRef idx="0">
+            <a:schemeClr val="accent1"/>
+          </a:effectRef>
+          <a:fontRef idx="minor">
+            <a:schemeClr val="tx1"/>
+          </a:fontRef>
+        </p:style>
+      </p:cxnSp>
+      <p:sp>
+        <p:nvSpPr>
+          <p:cNvPr id="6" name="TextBox 5"/>
+          <p:cNvSpPr txBox="1"/>
+          <p:nvPr/>
+        </p:nvSpPr>
+        <p:spPr>
+          <a:xfrm>
+            <a:off x="8708571" y="979975"/>
+            <a:ext cx="2540000" cy="3416320"/>
+          </a:xfrm>
+          <a:prstGeom prst="rect">
+            <a:avLst/>
+          </a:prstGeom>
+          <a:solidFill>
+            <a:schemeClr val="bg1">
+              <a:lumMod val="95000"/>
+            </a:schemeClr>
+          </a:solidFill>
+          <a:ln>
+            <a:solidFill>
+              <a:schemeClr val="tx1"/>
+            </a:solidFill>
+          </a:ln>
+        </p:spPr>
+        <p:txBody>
+          <a:bodyPr wrap="square" rtlCol="0">
+            <a:spAutoFit/>
+          </a:bodyPr>
+          <a:lstStyle/>
+          <a:p>
+            <a:r>
+              <a:rPr lang="en-US" sz="4000" u="sng" dirty="0" smtClean="0"/>
+              <a:t>Messages</a:t>
+            </a:r>
+            <a:endParaRPr lang="en-US" sz="3200" u="sng" dirty="0"/>
+          </a:p>
+          <a:p>
+            <a:r>
+              <a:rPr lang="en-US" sz="2400" dirty="0" smtClean="0"/>
+              <a:t>ID</a:t>
+            </a:r>
+          </a:p>
+          <a:p>
+            <a:r>
+              <a:rPr lang="en-US" sz="2400" dirty="0" err="1" smtClean="0"/>
+              <a:t>User_ID</a:t>
+            </a:r>
+            <a:r>
+              <a:rPr lang="en-US" sz="2400" dirty="0" smtClean="0"/>
+              <a:t> </a:t>
+            </a:r>
+          </a:p>
+          <a:p>
+            <a:r>
+              <a:rPr lang="en-US" sz="2400" dirty="0" err="1" smtClean="0"/>
+              <a:t>Post_ID</a:t>
+            </a:r>
+            <a:endParaRPr lang="en-US" sz="2400" dirty="0" smtClean="0"/>
+          </a:p>
+          <a:p>
+            <a:r>
+              <a:rPr lang="en-US" sz="2400" dirty="0" smtClean="0"/>
+              <a:t>Content </a:t>
+            </a:r>
+          </a:p>
+          <a:p>
+            <a:r>
+              <a:rPr lang="en-US" sz="2400" dirty="0" err="1" smtClean="0"/>
+              <a:t>Recipient_ID:int</a:t>
+            </a:r>
+            <a:endParaRPr lang="en-US" sz="2400" dirty="0" smtClean="0"/>
+          </a:p>
+          <a:p>
+            <a:endParaRPr lang="en-US" sz="1600" dirty="0" smtClean="0"/>
+          </a:p>
+          <a:p>
+            <a:r>
+              <a:rPr lang="en-US" sz="2000" dirty="0" err="1"/>
+              <a:t>b</a:t>
+            </a:r>
+            <a:r>
+              <a:rPr lang="en-US" sz="2000" dirty="0" err="1" smtClean="0"/>
+              <a:t>elongs_to</a:t>
+            </a:r>
+            <a:r>
+              <a:rPr lang="en-US" sz="2000" dirty="0" smtClean="0"/>
+              <a:t> :post</a:t>
+            </a:r>
+          </a:p>
+          <a:p>
+            <a:r>
+              <a:rPr lang="en-US" sz="2000" dirty="0" err="1"/>
+              <a:t>b</a:t>
+            </a:r>
+            <a:r>
+              <a:rPr lang="en-US" sz="2000" dirty="0" err="1" smtClean="0"/>
+              <a:t>elongs_to</a:t>
+            </a:r>
+            <a:r>
+              <a:rPr lang="en-US" sz="2000" dirty="0" smtClean="0"/>
+              <a:t> :user</a:t>
+            </a:r>
+          </a:p>
+        </p:txBody>
+      </p:sp>
+      <p:sp>
+        <p:nvSpPr>
+          <p:cNvPr id="26" name="Freeform 25"/>
+          <p:cNvSpPr/>
+          <p:nvPr/>
+        </p:nvSpPr>
+        <p:spPr>
+          <a:xfrm>
+            <a:off x="1741714" y="566057"/>
+            <a:ext cx="8636000" cy="537029"/>
+          </a:xfrm>
+          <a:custGeom>
+            <a:avLst/>
+            <a:gdLst>
+              <a:gd name="connsiteX0" fmla="*/ 0 w 8636000"/>
+              <a:gd name="connsiteY0" fmla="*/ 537029 h 537029"/>
+              <a:gd name="connsiteX1" fmla="*/ 1364343 w 8636000"/>
+              <a:gd name="connsiteY1" fmla="*/ 116114 h 537029"/>
+              <a:gd name="connsiteX2" fmla="*/ 3468915 w 8636000"/>
+              <a:gd name="connsiteY2" fmla="*/ 0 h 537029"/>
+              <a:gd name="connsiteX3" fmla="*/ 6037943 w 8636000"/>
+              <a:gd name="connsiteY3" fmla="*/ 29029 h 537029"/>
+              <a:gd name="connsiteX4" fmla="*/ 7968343 w 8636000"/>
+              <a:gd name="connsiteY4" fmla="*/ 188686 h 537029"/>
+              <a:gd name="connsiteX5" fmla="*/ 8636000 w 8636000"/>
+              <a:gd name="connsiteY5" fmla="*/ 420914 h 537029"/>
+            </a:gdLst>
+            <a:ahLst/>
+            <a:cxnLst>
+              <a:cxn ang="0">
+                <a:pos x="connsiteX0" y="connsiteY0"/>
+              </a:cxn>
+              <a:cxn ang="0">
+                <a:pos x="connsiteX1" y="connsiteY1"/>
+              </a:cxn>
+              <a:cxn ang="0">
+                <a:pos x="connsiteX2" y="connsiteY2"/>
+              </a:cxn>
+              <a:cxn ang="0">
+                <a:pos x="connsiteX3" y="connsiteY3"/>
+              </a:cxn>
+              <a:cxn ang="0">
+                <a:pos x="connsiteX4" y="connsiteY4"/>
+              </a:cxn>
+              <a:cxn ang="0">
+                <a:pos x="connsiteX5" y="connsiteY5"/>
+              </a:cxn>
+            </a:cxnLst>
+            <a:rect l="l" t="t" r="r" b="b"/>
+            <a:pathLst>
+              <a:path w="8636000" h="537029">
+                <a:moveTo>
+                  <a:pt x="0" y="537029"/>
+                </a:moveTo>
+                <a:cubicBezTo>
+                  <a:pt x="393095" y="371324"/>
+                  <a:pt x="786191" y="205619"/>
+                  <a:pt x="1364343" y="116114"/>
+                </a:cubicBezTo>
+                <a:cubicBezTo>
+                  <a:pt x="1942495" y="26609"/>
+                  <a:pt x="3468915" y="0"/>
+                  <a:pt x="3468915" y="0"/>
+                </a:cubicBezTo>
+                <a:lnTo>
+                  <a:pt x="6037943" y="29029"/>
+                </a:lnTo>
+                <a:cubicBezTo>
+                  <a:pt x="6787848" y="60477"/>
+                  <a:pt x="7535334" y="123372"/>
+                  <a:pt x="7968343" y="188686"/>
+                </a:cubicBezTo>
+                <a:cubicBezTo>
+                  <a:pt x="8401352" y="254000"/>
+                  <a:pt x="8636000" y="420914"/>
+                  <a:pt x="8636000" y="420914"/>
+                </a:cubicBezTo>
+              </a:path>
+            </a:pathLst>
+          </a:custGeom>
+          <a:noFill/>
+          <a:ln>
+            <a:solidFill>
+              <a:schemeClr val="tx1"/>
+            </a:solidFill>
+          </a:ln>
+        </p:spPr>
+        <p:style>
+          <a:lnRef idx="2">
+            <a:schemeClr val="accent1">
+              <a:shade val="50000"/>
+            </a:schemeClr>
+          </a:lnRef>
+          <a:fillRef idx="1">
+            <a:schemeClr val="accent1"/>
+          </a:fillRef>
+          <a:effectRef idx="0">
+            <a:schemeClr val="accent1"/>
+          </a:effectRef>
+          <a:fontRef idx="minor">
+            <a:schemeClr val="lt1"/>
+          </a:fontRef>
+        </p:style>
+        <p:txBody>
+          <a:bodyPr rtlCol="0" anchor="ctr"/>
+          <a:lstStyle/>
+          <a:p>
+            <a:pPr algn="ctr"/>
+            <a:endParaRPr lang="en-US"/>
+          </a:p>
+        </p:txBody>
+      </p:sp>
+      <p:cxnSp>
+        <p:nvCxnSpPr>
+          <p:cNvPr id="28" name="Straight Connector 27"/>
+          <p:cNvCxnSpPr/>
+          <p:nvPr/>
+        </p:nvCxnSpPr>
+        <p:spPr>
+          <a:xfrm>
+            <a:off x="2148115" y="711461"/>
+            <a:ext cx="304800" cy="268514"/>
+          </a:xfrm>
+          <a:prstGeom prst="line">
+            <a:avLst/>
+          </a:prstGeom>
+          <a:ln>
+            <a:solidFill>
+              <a:schemeClr val="tx1"/>
+            </a:solidFill>
+          </a:ln>
+        </p:spPr>
+        <p:style>
+          <a:lnRef idx="1">
+            <a:schemeClr val="accent1"/>
+          </a:lnRef>
+          <a:fillRef idx="0">
+            <a:schemeClr val="accent1"/>
+          </a:fillRef>
+          <a:effectRef idx="0">
+            <a:schemeClr val="accent1"/>
+          </a:effectRef>
+          <a:fontRef idx="minor">
+            <a:schemeClr val="tx1"/>
+          </a:fontRef>
+        </p:style>
+      </p:cxnSp>
+      <p:cxnSp>
+        <p:nvCxnSpPr>
+          <p:cNvPr id="31" name="Straight Connector 30"/>
+          <p:cNvCxnSpPr>
+            <a:stCxn id="26" idx="4"/>
+          </p:cNvCxnSpPr>
+          <p:nvPr/>
+        </p:nvCxnSpPr>
+        <p:spPr>
+          <a:xfrm>
+            <a:off x="9710057" y="754743"/>
+            <a:ext cx="239486" cy="225232"/>
+          </a:xfrm>
+          <a:prstGeom prst="line">
+            <a:avLst/>
+          </a:prstGeom>
+          <a:ln>
+            <a:solidFill>
+              <a:schemeClr val="tx1"/>
+            </a:solidFill>
+          </a:ln>
+        </p:spPr>
+        <p:style>
+          <a:lnRef idx="1">
+            <a:schemeClr val="accent1"/>
+          </a:lnRef>
+          <a:fillRef idx="0">
+            <a:schemeClr val="accent1"/>
+          </a:fillRef>
+          <a:effectRef idx="0">
+            <a:schemeClr val="accent1"/>
+          </a:effectRef>
+          <a:fontRef idx="minor">
+            <a:schemeClr val="tx1"/>
+          </a:fontRef>
+        </p:style>
+      </p:cxnSp>
+      <p:cxnSp>
+        <p:nvCxnSpPr>
+          <p:cNvPr id="33" name="Straight Connector 32"/>
+          <p:cNvCxnSpPr/>
+          <p:nvPr/>
+        </p:nvCxnSpPr>
+        <p:spPr>
+          <a:xfrm>
+            <a:off x="9782628" y="747748"/>
+            <a:ext cx="1204686" cy="232227"/>
+          </a:xfrm>
+          <a:prstGeom prst="line">
+            <a:avLst/>
+          </a:prstGeom>
+          <a:ln>
+            <a:solidFill>
+              <a:schemeClr val="tx1"/>
+            </a:solidFill>
+          </a:ln>
+        </p:spPr>
+        <p:style>
+          <a:lnRef idx="1">
+            <a:schemeClr val="accent1"/>
+          </a:lnRef>
+          <a:fillRef idx="0">
+            <a:schemeClr val="accent1"/>
+          </a:fillRef>
+          <a:effectRef idx="0">
+            <a:schemeClr val="accent1"/>
+          </a:effectRef>
+          <a:fontRef idx="minor">
+            <a:schemeClr val="tx1"/>
+          </a:fontRef>
+        </p:style>
+      </p:cxnSp>
+    </p:spTree>
+    <p:extLst>
+      <p:ext uri="{BB962C8B-B14F-4D97-AF65-F5344CB8AC3E}">
+        <p14:creationId xmlns:p14="http://schemas.microsoft.com/office/powerpoint/2010/main" val="363773568"/>
+      </p:ext>
+    </p:extLst>
+  </p:cSld>
+  <p:clrMapOvr>
+    <a:masterClrMapping/>
+  </p:clrMapOvr>
+</p:sld>
+</file>
+
+<file path=ppt/slides/slide12.xml><?xml version="1.0" encoding="utf-8"?>
+<p:sld xmlns:a="http://schemas.openxmlformats.org/drawingml/2006/main" xmlns:r="http://schemas.openxmlformats.org/officeDocument/2006/relationships" xmlns:p="http://schemas.openxmlformats.org/presentationml/2006/main">
+  <p:cSld>
+    <p:spTree>
+      <p:nvGrpSpPr>
+        <p:cNvPr id="1" name=""/>
+        <p:cNvGrpSpPr/>
+        <p:nvPr/>
+      </p:nvGrpSpPr>
+      <p:grpSpPr>
+        <a:xfrm>
+          <a:off x="0" y="0"/>
+          <a:ext cx="0" cy="0"/>
+          <a:chOff x="0" y="0"/>
+          <a:chExt cx="0" cy="0"/>
+        </a:xfrm>
+      </p:grpSpPr>
+      <p:sp>
+        <p:nvSpPr>
+          <p:cNvPr id="4" name="TextBox 3"/>
+          <p:cNvSpPr txBox="1"/>
+          <p:nvPr/>
+        </p:nvSpPr>
+        <p:spPr>
+          <a:xfrm>
+            <a:off x="261256" y="1103086"/>
+            <a:ext cx="8476343" cy="4401205"/>
+          </a:xfrm>
+          <a:prstGeom prst="rect">
+            <a:avLst/>
+          </a:prstGeom>
+          <a:solidFill>
+            <a:schemeClr val="bg1">
+              <a:lumMod val="95000"/>
+            </a:schemeClr>
+          </a:solidFill>
+          <a:ln>
+            <a:solidFill>
+              <a:schemeClr val="tx1"/>
+            </a:solidFill>
+          </a:ln>
+        </p:spPr>
+        <p:txBody>
+          <a:bodyPr wrap="square" rtlCol="0">
+            <a:spAutoFit/>
+          </a:bodyPr>
+          <a:lstStyle/>
+          <a:p>
+            <a:r>
+              <a:rPr lang="en-US" sz="4000" u="sng" dirty="0" smtClean="0"/>
+              <a:t>Routes</a:t>
+            </a:r>
+          </a:p>
+          <a:p>
+            <a:r>
+              <a:rPr lang="en-US" sz="4000" dirty="0" smtClean="0"/>
+              <a:t>resources :users do </a:t>
+            </a:r>
+          </a:p>
+          <a:p>
+            <a:r>
+              <a:rPr lang="en-US" sz="4000" dirty="0"/>
+              <a:t>	</a:t>
+            </a:r>
+            <a:r>
+              <a:rPr lang="en-US" sz="4000" dirty="0" smtClean="0"/>
+              <a:t>resources :posts do </a:t>
+            </a:r>
+          </a:p>
+          <a:p>
+            <a:r>
+              <a:rPr lang="en-US" sz="4000" dirty="0"/>
+              <a:t>	</a:t>
+            </a:r>
+            <a:r>
+              <a:rPr lang="en-US" sz="4000" dirty="0" smtClean="0"/>
+              <a:t>	resources :messages</a:t>
+            </a:r>
+          </a:p>
+          <a:p>
+            <a:r>
+              <a:rPr lang="en-US" sz="4000" dirty="0" smtClean="0"/>
+              <a:t>end </a:t>
+            </a:r>
+          </a:p>
+          <a:p>
+            <a:r>
+              <a:rPr lang="en-US" sz="4000" dirty="0"/>
+              <a:t>	</a:t>
+            </a:r>
+            <a:r>
+              <a:rPr lang="en-US" sz="4000" dirty="0" smtClean="0"/>
+              <a:t>end </a:t>
+            </a:r>
+          </a:p>
+          <a:p>
+            <a:r>
+              <a:rPr lang="en-US" sz="4000" dirty="0"/>
+              <a:t>	</a:t>
+            </a:r>
+            <a:r>
+              <a:rPr lang="en-US" sz="4000" dirty="0" smtClean="0"/>
+              <a:t>	end </a:t>
+            </a:r>
+            <a:endParaRPr lang="en-US" sz="3200" dirty="0"/>
+          </a:p>
+        </p:txBody>
+      </p:sp>
+    </p:spTree>
+    <p:extLst>
+      <p:ext uri="{BB962C8B-B14F-4D97-AF65-F5344CB8AC3E}">
+        <p14:creationId xmlns:p14="http://schemas.microsoft.com/office/powerpoint/2010/main" val="976159849"/>
+      </p:ext>
+    </p:extLst>
+  </p:cSld>
+  <p:clrMapOvr>
+    <a:masterClrMapping/>
+  </p:clrMapOvr>
+</p:sld>
+</file>
+
 <file path=ppt/slides/slide2.xml><?xml version="1.0" encoding="utf-8"?>
 <p:sld xmlns:a="http://schemas.openxmlformats.org/drawingml/2006/main" xmlns:r="http://schemas.openxmlformats.org/officeDocument/2006/relationships" xmlns:p="http://schemas.openxmlformats.org/presentationml/2006/main">
   <p:cSld>
@@ -3515,7 +4558,7 @@
         </p:nvSpPr>
         <p:spPr>
           <a:xfrm>
-            <a:off x="9939338" y="652926"/>
+            <a:off x="9142981" y="653626"/>
             <a:ext cx="947737" cy="369332"/>
           </a:xfrm>
           <a:prstGeom prst="rect">
@@ -3531,7 +4574,7 @@
           <a:p>
             <a:pPr algn="ctr"/>
             <a:r>
-              <a:rPr lang="en-US" smtClean="0">
+              <a:rPr lang="en-US" u="sng" smtClean="0">
                 <a:solidFill>
                   <a:schemeClr val="accent1">
                     <a:lumMod val="75000"/>
@@ -3541,23 +4584,23 @@
               <a:t>ABOUT</a:t>
             </a:r>
             <a:r>
-              <a:rPr lang="en-US" smtClean="0"/>
+              <a:rPr lang="en-US" u="sng" smtClean="0"/>
               <a:t> </a:t>
             </a:r>
-            <a:endParaRPr lang="en-US" dirty="0"/>
-          </a:p>
-        </p:txBody>
-      </p:sp>
-      <p:sp>
-        <p:nvSpPr>
-          <p:cNvPr id="8" name="TextBox 7"/>
+            <a:endParaRPr lang="en-US" u="sng" dirty="0"/>
+          </a:p>
+        </p:txBody>
+      </p:sp>
+      <p:sp>
+        <p:nvSpPr>
+          <p:cNvPr id="9" name="TextBox 8"/>
           <p:cNvSpPr txBox="1"/>
           <p:nvPr/>
         </p:nvSpPr>
         <p:spPr>
           <a:xfrm>
-            <a:off x="1343025" y="1364710"/>
-            <a:ext cx="3943350" cy="461665"/>
+            <a:off x="1343026" y="2692539"/>
+            <a:ext cx="8429625" cy="461665"/>
           </a:xfrm>
           <a:prstGeom prst="rect">
             <a:avLst/>
@@ -3571,23 +4614,35 @@
           <a:lstStyle/>
           <a:p>
             <a:r>
-              <a:rPr lang="en-US" sz="2400" b="1" smtClean="0"/>
-              <a:t>Showing results for 93010:</a:t>
-            </a:r>
-            <a:endParaRPr lang="en-US" sz="2400" b="1"/>
-          </a:p>
-        </p:txBody>
-      </p:sp>
-      <p:sp>
-        <p:nvSpPr>
-          <p:cNvPr id="9" name="TextBox 8"/>
+              <a:rPr lang="en-US" sz="2400" b="1" dirty="0" smtClean="0"/>
+              <a:t>username</a:t>
+            </a:r>
+            <a:r>
+              <a:rPr lang="en-US" sz="2400" b="1" dirty="0" smtClean="0"/>
+              <a:t>	</a:t>
+            </a:r>
+            <a:r>
+              <a:rPr lang="en-US" sz="2400" b="1" dirty="0" smtClean="0"/>
+              <a:t>post date</a:t>
+            </a:r>
+            <a:r>
+              <a:rPr lang="en-US" sz="2400" b="1" dirty="0" smtClean="0"/>
+              <a:t>	         summary			 </a:t>
+            </a:r>
+            <a:endParaRPr lang="en-US" sz="2400" b="1" dirty="0"/>
+          </a:p>
+        </p:txBody>
+      </p:sp>
+      <p:sp>
+        <p:nvSpPr>
+          <p:cNvPr id="10" name="TextBox 9"/>
           <p:cNvSpPr txBox="1"/>
           <p:nvPr/>
         </p:nvSpPr>
         <p:spPr>
           <a:xfrm>
-            <a:off x="1343026" y="1995488"/>
-            <a:ext cx="8429625" cy="461665"/>
+            <a:off x="1343025" y="3265885"/>
+            <a:ext cx="10058400" cy="923330"/>
           </a:xfrm>
           <a:prstGeom prst="rect">
             <a:avLst/>
@@ -3601,22 +4656,77 @@
           <a:lstStyle/>
           <a:p>
             <a:r>
-              <a:rPr lang="en-US" sz="2400" b="1" dirty="0" smtClean="0"/>
-              <a:t>username	user rating	         summary			 </a:t>
-            </a:r>
-            <a:endParaRPr lang="en-US" sz="2400" b="1" dirty="0"/>
-          </a:p>
-        </p:txBody>
-      </p:sp>
-      <p:sp>
-        <p:nvSpPr>
-          <p:cNvPr id="10" name="TextBox 9"/>
+              <a:rPr lang="en-US" dirty="0" smtClean="0"/>
+              <a:t>agonzalez27	</a:t>
+            </a:r>
+            <a:r>
+              <a:rPr lang="en-US" dirty="0" smtClean="0"/>
+              <a:t>10/25/2016</a:t>
+            </a:r>
+            <a:r>
+              <a:rPr lang="en-US" dirty="0" smtClean="0"/>
+              <a:t>	            I will swap oranges for           </a:t>
+            </a:r>
+            <a:r>
+              <a:rPr lang="en-US" dirty="0" smtClean="0"/>
+              <a:t>	 </a:t>
+            </a:r>
+            <a:r>
+              <a:rPr lang="en-US" u="sng" dirty="0" smtClean="0">
+                <a:solidFill>
+                  <a:schemeClr val="accent1">
+                    <a:lumMod val="75000"/>
+                  </a:schemeClr>
+                </a:solidFill>
+              </a:rPr>
+              <a:t>view post</a:t>
+            </a:r>
+            <a:r>
+              <a:rPr lang="en-US" dirty="0" smtClean="0">
+                <a:solidFill>
+                  <a:schemeClr val="accent1">
+                    <a:lumMod val="75000"/>
+                  </a:schemeClr>
+                </a:solidFill>
+              </a:rPr>
+              <a:t>      </a:t>
+            </a:r>
+            <a:endParaRPr lang="en-US" u="sng" dirty="0" smtClean="0">
+              <a:solidFill>
+                <a:schemeClr val="accent1">
+                  <a:lumMod val="75000"/>
+                </a:schemeClr>
+              </a:solidFill>
+            </a:endParaRPr>
+          </a:p>
+          <a:p>
+            <a:r>
+              <a:rPr lang="en-US" dirty="0" smtClean="0"/>
+              <a:t>				            avocados, tomatoes, </a:t>
+            </a:r>
+          </a:p>
+          <a:p>
+            <a:r>
+              <a:rPr lang="en-US" dirty="0"/>
+              <a:t>	</a:t>
+            </a:r>
+            <a:r>
+              <a:rPr lang="en-US" dirty="0" smtClean="0"/>
+              <a:t>			            or squash. 			 </a:t>
+            </a:r>
+            <a:endParaRPr lang="en-US" dirty="0"/>
+          </a:p>
+        </p:txBody>
+      </p:sp>
+      <p:sp>
+        <p:nvSpPr>
+          <p:cNvPr id="11" name="TextBox 10"/>
           <p:cNvSpPr txBox="1"/>
           <p:nvPr/>
         </p:nvSpPr>
         <p:spPr>
           <a:xfrm>
-            <a:off x="1343025" y="2568834"/>
+            <a:off x="1343025" y="4274826"/>
             <a:ext cx="10058400" cy="923330"/>
           </a:xfrm>
           <a:prstGeom prst="rect">
@@ -3632,7 +4742,19 @@
           <a:p>
             <a:r>
               <a:rPr lang="en-US" dirty="0" smtClean="0"/>
-              <a:t>agonzalez27	4.5/5 Stars/5 swaps	            I will swap oranges for            </a:t>
+              <a:t>Kwood28		</a:t>
+            </a:r>
+            <a:r>
+              <a:rPr lang="en-US" dirty="0" smtClean="0"/>
+              <a:t>10/25/2016	            I </a:t>
+            </a:r>
+            <a:r>
+              <a:rPr lang="en-US" dirty="0" smtClean="0"/>
+              <a:t>will swap strawberries         </a:t>
+            </a:r>
+            <a:r>
+              <a:rPr lang="en-US" dirty="0" smtClean="0"/>
+              <a:t>	 </a:t>
             </a:r>
             <a:r>
               <a:rPr lang="en-US" u="sng" dirty="0" smtClean="0">
@@ -3654,21 +4776,18 @@
               </a:rPr>
               <a:t>      </a:t>
             </a:r>
-            <a:r>
-              <a:rPr lang="en-US" u="sng" dirty="0" smtClean="0">
-                <a:solidFill>
-                  <a:schemeClr val="accent1">
-                    <a:lumMod val="75000"/>
-                  </a:schemeClr>
-                </a:solidFill>
-              </a:rPr>
-              <a:t>message user</a:t>
-            </a:r>
+            <a:endParaRPr lang="en-US" u="sng" dirty="0" smtClean="0">
+              <a:solidFill>
+                <a:schemeClr val="accent1">
+                  <a:lumMod val="75000"/>
+                </a:schemeClr>
+              </a:solidFill>
+            </a:endParaRPr>
           </a:p>
           <a:p>
             <a:r>
               <a:rPr lang="en-US" dirty="0" smtClean="0"/>
-              <a:t>				            avocados, tomatoes, </a:t>
+              <a:t>				            for avocados, tomatoes, </a:t>
             </a:r>
           </a:p>
           <a:p>
@@ -3678,7 +4797,7 @@
             </a:r>
             <a:r>
               <a:rPr lang="en-US" dirty="0" smtClean="0"/>
-              <a:t>			            or squash. 			 </a:t>
+              <a:t>			            or oranges. 			 </a:t>
             </a:r>
             <a:endParaRPr lang="en-US" dirty="0"/>
           </a:p>
@@ -3686,13 +4805,13 @@
       </p:sp>
       <p:sp>
         <p:nvSpPr>
-          <p:cNvPr id="11" name="TextBox 10"/>
+          <p:cNvPr id="12" name="TextBox 11"/>
           <p:cNvSpPr txBox="1"/>
           <p:nvPr/>
         </p:nvSpPr>
         <p:spPr>
           <a:xfrm>
-            <a:off x="1343025" y="3577775"/>
+            <a:off x="1343025" y="5381497"/>
             <a:ext cx="10058400" cy="923330"/>
           </a:xfrm>
           <a:prstGeom prst="rect">
@@ -3708,7 +4827,19 @@
           <a:p>
             <a:r>
               <a:rPr lang="en-US" dirty="0" smtClean="0"/>
-              <a:t>Kwood28		5/5 Stars/20 swaps	            I will swap strawberries           </a:t>
+              <a:t>mwong50	</a:t>
+            </a:r>
+            <a:r>
+              <a:rPr lang="en-US" dirty="0" smtClean="0"/>
+              <a:t>10/24/2016	            I </a:t>
+            </a:r>
+            <a:r>
+              <a:rPr lang="en-US" dirty="0" smtClean="0"/>
+              <a:t>will swap strawberries           </a:t>
+            </a:r>
+            <a:r>
+              <a:rPr lang="en-US" dirty="0" smtClean="0"/>
+              <a:t>	 </a:t>
             </a:r>
             <a:r>
               <a:rPr lang="en-US" u="sng" dirty="0" smtClean="0">
@@ -3718,134 +4849,25 @@
                   </a:schemeClr>
                 </a:solidFill>
               </a:rPr>
-              <a:t>view </a:t>
-            </a:r>
-            <a:r>
-              <a:rPr lang="en-US" u="sng" dirty="0" smtClean="0">
+              <a:t>view post</a:t>
+            </a:r>
+            <a:r>
+              <a:rPr lang="en-US" dirty="0" smtClean="0">
                 <a:solidFill>
                   <a:schemeClr val="accent1">
                     <a:lumMod val="75000"/>
                   </a:schemeClr>
                 </a:solidFill>
               </a:rPr>
-              <a:t>post</a:t>
-            </a:r>
-            <a:r>
-              <a:rPr lang="en-US" dirty="0" smtClean="0">
-                <a:solidFill>
-                  <a:schemeClr val="accent1">
-                    <a:lumMod val="75000"/>
-                  </a:schemeClr>
-                </a:solidFill>
-              </a:rPr>
               <a:t>      </a:t>
             </a:r>
-            <a:r>
-              <a:rPr lang="en-US" dirty="0" smtClean="0">
-                <a:solidFill>
-                  <a:schemeClr val="accent1">
-                    <a:lumMod val="75000"/>
-                  </a:schemeClr>
-                </a:solidFill>
-              </a:rPr>
-              <a:t> </a:t>
-            </a:r>
-            <a:r>
-              <a:rPr lang="en-US" u="sng" dirty="0" smtClean="0">
-                <a:solidFill>
-                  <a:schemeClr val="accent1">
-                    <a:lumMod val="75000"/>
-                  </a:schemeClr>
-                </a:solidFill>
-              </a:rPr>
-              <a:t>message </a:t>
-            </a:r>
-            <a:r>
-              <a:rPr lang="en-US" u="sng" dirty="0" smtClean="0">
-                <a:solidFill>
-                  <a:schemeClr val="accent1">
-                    <a:lumMod val="75000"/>
-                  </a:schemeClr>
-                </a:solidFill>
-              </a:rPr>
-              <a:t>user</a:t>
-            </a:r>
-          </a:p>
-          <a:p>
-            <a:r>
-              <a:rPr lang="en-US" dirty="0" smtClean="0"/>
-              <a:t>				            for avocados, tomatoes, </a:t>
-            </a:r>
-          </a:p>
-          <a:p>
-            <a:r>
-              <a:rPr lang="en-US" dirty="0"/>
-              <a:t>	</a:t>
-            </a:r>
-            <a:r>
-              <a:rPr lang="en-US" dirty="0" smtClean="0"/>
-              <a:t>			            or oranges. 			 </a:t>
-            </a:r>
-            <a:endParaRPr lang="en-US" dirty="0"/>
-          </a:p>
-        </p:txBody>
-      </p:sp>
-      <p:sp>
-        <p:nvSpPr>
-          <p:cNvPr id="12" name="TextBox 11"/>
-          <p:cNvSpPr txBox="1"/>
-          <p:nvPr/>
-        </p:nvSpPr>
-        <p:spPr>
-          <a:xfrm>
-            <a:off x="1343025" y="4684446"/>
-            <a:ext cx="10058400" cy="923330"/>
-          </a:xfrm>
-          <a:prstGeom prst="rect">
-            <a:avLst/>
-          </a:prstGeom>
-          <a:noFill/>
-        </p:spPr>
-        <p:txBody>
-          <a:bodyPr wrap="square" rtlCol="0">
-            <a:spAutoFit/>
-          </a:bodyPr>
-          <a:lstStyle/>
-          <a:p>
-            <a:r>
-              <a:rPr lang="en-US" dirty="0" smtClean="0"/>
-              <a:t>mwong50	4.5/5 Stars/100 swaps        I will swap strawberries            </a:t>
-            </a:r>
-            <a:r>
-              <a:rPr lang="en-US" u="sng" dirty="0" smtClean="0">
-                <a:solidFill>
-                  <a:schemeClr val="accent1">
-                    <a:lumMod val="75000"/>
-                  </a:schemeClr>
-                </a:solidFill>
-              </a:rPr>
-              <a:t>view post</a:t>
-            </a:r>
-            <a:r>
-              <a:rPr lang="en-US" dirty="0" smtClean="0">
-                <a:solidFill>
-                  <a:schemeClr val="accent1">
-                    <a:lumMod val="75000"/>
-                  </a:schemeClr>
-                </a:solidFill>
-              </a:rPr>
-              <a:t>      </a:t>
-            </a:r>
-            <a:r>
-              <a:rPr lang="en-US" u="sng" dirty="0" smtClean="0">
-                <a:solidFill>
-                  <a:schemeClr val="accent1">
-                    <a:lumMod val="75000"/>
-                  </a:schemeClr>
-                </a:solidFill>
-              </a:rPr>
-              <a:t>message user</a:t>
-            </a:r>
+            <a:endParaRPr lang="en-US" u="sng" dirty="0" smtClean="0">
+              <a:solidFill>
+                <a:schemeClr val="accent1">
+                  <a:lumMod val="75000"/>
+                </a:schemeClr>
+              </a:solidFill>
+            </a:endParaRPr>
           </a:p>
           <a:p>
             <a:r>
@@ -3951,7 +4973,7 @@
         </p:nvSpPr>
         <p:spPr>
           <a:xfrm>
-            <a:off x="8893164" y="652926"/>
+            <a:off x="8273145" y="639112"/>
             <a:ext cx="947737" cy="369332"/>
           </a:xfrm>
           <a:prstGeom prst="rect">
@@ -3967,7 +4989,7 @@
           <a:p>
             <a:pPr algn="ctr"/>
             <a:r>
-              <a:rPr lang="en-US" dirty="0" smtClean="0">
+              <a:rPr lang="en-US" u="sng" dirty="0" smtClean="0">
                 <a:solidFill>
                   <a:schemeClr val="accent1">
                     <a:lumMod val="75000"/>
@@ -3977,10 +4999,10 @@
               <a:t>HOME</a:t>
             </a:r>
             <a:r>
-              <a:rPr lang="en-US" dirty="0" smtClean="0"/>
+              <a:rPr lang="en-US" u="sng" dirty="0" smtClean="0"/>
               <a:t> </a:t>
             </a:r>
-            <a:endParaRPr lang="en-US" dirty="0"/>
+            <a:endParaRPr lang="en-US" u="sng" dirty="0"/>
           </a:p>
         </p:txBody>
       </p:sp>
@@ -3992,8 +5014,8 @@
         </p:nvSpPr>
         <p:spPr>
           <a:xfrm>
-            <a:off x="5525442" y="1264588"/>
-            <a:ext cx="1715791" cy="584775"/>
+            <a:off x="1952616" y="1298196"/>
+            <a:ext cx="1524200" cy="523220"/>
           </a:xfrm>
           <a:prstGeom prst="rect">
             <a:avLst/>
@@ -4006,7 +5028,7 @@
           <a:lstStyle/>
           <a:p>
             <a:r>
-              <a:rPr lang="en-US" sz="3200" u="sng">
+              <a:rPr lang="en-US" sz="2800" u="sng" dirty="0">
                 <a:solidFill>
                   <a:schemeClr val="accent1">
                     <a:lumMod val="75000"/>
@@ -4016,16 +5038,220 @@
               <a:t>n</a:t>
             </a:r>
             <a:r>
-              <a:rPr lang="en-US" sz="3200" u="sng" smtClean="0">
+              <a:rPr lang="en-US" sz="2800" u="sng" dirty="0" smtClean="0">
                 <a:solidFill>
                   <a:schemeClr val="accent1">
                     <a:lumMod val="75000"/>
                   </a:schemeClr>
                 </a:solidFill>
               </a:rPr>
-              <a:t>ew post</a:t>
-            </a:r>
-            <a:endParaRPr lang="en-US" sz="3200" u="sng" dirty="0">
+              <a:t>ew </a:t>
+            </a:r>
+            <a:r>
+              <a:rPr lang="en-US" sz="2800" u="sng" dirty="0" smtClean="0">
+                <a:solidFill>
+                  <a:schemeClr val="accent1">
+                    <a:lumMod val="75000"/>
+                  </a:schemeClr>
+                </a:solidFill>
+              </a:rPr>
+              <a:t>post</a:t>
+            </a:r>
+            <a:endParaRPr lang="en-US" sz="2800" u="sng" dirty="0">
+              <a:solidFill>
+                <a:schemeClr val="accent1">
+                  <a:lumMod val="75000"/>
+                </a:schemeClr>
+              </a:solidFill>
+            </a:endParaRPr>
+          </a:p>
+        </p:txBody>
+      </p:sp>
+      <p:sp>
+        <p:nvSpPr>
+          <p:cNvPr id="16" name="Rectangle 15"/>
+          <p:cNvSpPr/>
+          <p:nvPr/>
+        </p:nvSpPr>
+        <p:spPr>
+          <a:xfrm>
+            <a:off x="5200811" y="1298196"/>
+            <a:ext cx="1485471" cy="523220"/>
+          </a:xfrm>
+          <a:prstGeom prst="rect">
+            <a:avLst/>
+          </a:prstGeom>
+        </p:spPr>
+        <p:txBody>
+          <a:bodyPr wrap="none">
+            <a:spAutoFit/>
+          </a:bodyPr>
+          <a:lstStyle/>
+          <a:p>
+            <a:r>
+              <a:rPr lang="en-US" sz="2800" u="sng" dirty="0">
+                <a:solidFill>
+                  <a:schemeClr val="accent1">
+                    <a:lumMod val="75000"/>
+                  </a:schemeClr>
+                </a:solidFill>
+              </a:rPr>
+              <a:t>m</a:t>
+            </a:r>
+            <a:r>
+              <a:rPr lang="en-US" sz="2800" u="sng" dirty="0" smtClean="0">
+                <a:solidFill>
+                  <a:schemeClr val="accent1">
+                    <a:lumMod val="75000"/>
+                  </a:schemeClr>
+                </a:solidFill>
+              </a:rPr>
+              <a:t>y posts</a:t>
+            </a:r>
+            <a:endParaRPr lang="en-US" sz="2800" u="sng" dirty="0">
+              <a:solidFill>
+                <a:schemeClr val="accent1">
+                  <a:lumMod val="75000"/>
+                </a:schemeClr>
+              </a:solidFill>
+            </a:endParaRPr>
+          </a:p>
+        </p:txBody>
+      </p:sp>
+      <p:sp>
+        <p:nvSpPr>
+          <p:cNvPr id="19" name="TextBox 18"/>
+          <p:cNvSpPr txBox="1"/>
+          <p:nvPr/>
+        </p:nvSpPr>
+        <p:spPr>
+          <a:xfrm>
+            <a:off x="10090718" y="641012"/>
+            <a:ext cx="1310707" cy="369332"/>
+          </a:xfrm>
+          <a:prstGeom prst="rect">
+            <a:avLst/>
+          </a:prstGeom>
+          <a:noFill/>
+        </p:spPr>
+        <p:txBody>
+          <a:bodyPr wrap="square" rtlCol="0">
+            <a:spAutoFit/>
+          </a:bodyPr>
+          <a:lstStyle/>
+          <a:p>
+            <a:pPr algn="ctr"/>
+            <a:r>
+              <a:rPr lang="en-US" u="sng" smtClean="0">
+                <a:solidFill>
+                  <a:schemeClr val="accent1">
+                    <a:lumMod val="75000"/>
+                  </a:schemeClr>
+                </a:solidFill>
+              </a:rPr>
+              <a:t>MY PROFILE</a:t>
+            </a:r>
+            <a:r>
+              <a:rPr lang="en-US" u="sng" smtClean="0"/>
+              <a:t> </a:t>
+            </a:r>
+            <a:endParaRPr lang="en-US" u="sng" dirty="0"/>
+          </a:p>
+        </p:txBody>
+      </p:sp>
+      <p:sp>
+        <p:nvSpPr>
+          <p:cNvPr id="20" name="Rectangle 19"/>
+          <p:cNvSpPr/>
+          <p:nvPr/>
+        </p:nvSpPr>
+        <p:spPr>
+          <a:xfrm>
+            <a:off x="8165016" y="1309737"/>
+            <a:ext cx="2111732" cy="523220"/>
+          </a:xfrm>
+          <a:prstGeom prst="rect">
+            <a:avLst/>
+          </a:prstGeom>
+        </p:spPr>
+        <p:txBody>
+          <a:bodyPr wrap="none">
+            <a:spAutoFit/>
+          </a:bodyPr>
+          <a:lstStyle/>
+          <a:p>
+            <a:r>
+              <a:rPr lang="en-US" sz="2800" u="sng" dirty="0">
+                <a:solidFill>
+                  <a:schemeClr val="accent1">
+                    <a:lumMod val="75000"/>
+                  </a:schemeClr>
+                </a:solidFill>
+              </a:rPr>
+              <a:t>m</a:t>
+            </a:r>
+            <a:r>
+              <a:rPr lang="en-US" sz="2800" u="sng" dirty="0" smtClean="0">
+                <a:solidFill>
+                  <a:schemeClr val="accent1">
+                    <a:lumMod val="75000"/>
+                  </a:schemeClr>
+                </a:solidFill>
+              </a:rPr>
+              <a:t>y messages</a:t>
+            </a:r>
+            <a:endParaRPr lang="en-US" sz="2800" u="sng" dirty="0">
+              <a:solidFill>
+                <a:schemeClr val="accent1">
+                  <a:lumMod val="75000"/>
+                </a:schemeClr>
+              </a:solidFill>
+            </a:endParaRPr>
+          </a:p>
+        </p:txBody>
+      </p:sp>
+      <p:sp>
+        <p:nvSpPr>
+          <p:cNvPr id="22" name="Rectangle 21"/>
+          <p:cNvSpPr/>
+          <p:nvPr/>
+        </p:nvSpPr>
+        <p:spPr>
+          <a:xfrm>
+            <a:off x="1229245" y="2105253"/>
+            <a:ext cx="2202911" cy="461665"/>
+          </a:xfrm>
+          <a:prstGeom prst="rect">
+            <a:avLst/>
+          </a:prstGeom>
+        </p:spPr>
+        <p:txBody>
+          <a:bodyPr wrap="none">
+            <a:spAutoFit/>
+          </a:bodyPr>
+          <a:lstStyle/>
+          <a:p>
+            <a:r>
+              <a:rPr lang="en-US" sz="2400" u="sng" dirty="0">
+                <a:solidFill>
+                  <a:schemeClr val="accent1">
+                    <a:lumMod val="75000"/>
+                  </a:schemeClr>
+                </a:solidFill>
+              </a:rPr>
+              <a:t>p</a:t>
+            </a:r>
+            <a:r>
+              <a:rPr lang="en-US" sz="2400" u="sng" dirty="0" smtClean="0">
+                <a:solidFill>
+                  <a:schemeClr val="accent1">
+                    <a:lumMod val="75000"/>
+                  </a:schemeClr>
+                </a:solidFill>
+              </a:rPr>
+              <a:t>osts for 93010:</a:t>
+            </a:r>
+            <a:endParaRPr lang="en-US" sz="2400" u="sng" dirty="0">
               <a:solidFill>
                 <a:schemeClr val="accent1">
                   <a:lumMod val="75000"/>
@@ -4323,16 +5549,13 @@
               </a:rPr>
               <a:t>      </a:t>
             </a:r>
-            <a:r>
-              <a:rPr lang="en-US" u="sng" dirty="0" smtClean="0">
-                <a:solidFill>
-                  <a:schemeClr val="accent1">
-                    <a:lumMod val="75000"/>
-                  </a:schemeClr>
-                </a:solidFill>
-              </a:rPr>
-              <a:t>message user</a:t>
-            </a:r>
+            <a:endParaRPr lang="en-US" u="sng" dirty="0" smtClean="0">
+              <a:solidFill>
+                <a:schemeClr val="accent1">
+                  <a:lumMod val="75000"/>
+                </a:schemeClr>
+              </a:solidFill>
+            </a:endParaRPr>
           </a:p>
           <a:p>
             <a:r>
@@ -4399,16 +5622,13 @@
               </a:rPr>
               <a:t>      </a:t>
             </a:r>
-            <a:r>
-              <a:rPr lang="en-US" u="sng" dirty="0" smtClean="0">
-                <a:solidFill>
-                  <a:schemeClr val="accent1">
-                    <a:lumMod val="75000"/>
-                  </a:schemeClr>
-                </a:solidFill>
-              </a:rPr>
-              <a:t>message user</a:t>
-            </a:r>
+            <a:endParaRPr lang="en-US" u="sng" dirty="0" smtClean="0">
+              <a:solidFill>
+                <a:schemeClr val="accent1">
+                  <a:lumMod val="75000"/>
+                </a:schemeClr>
+              </a:solidFill>
+            </a:endParaRPr>
           </a:p>
           <a:p>
             <a:r>
@@ -4473,18 +5693,15 @@
                   </a:schemeClr>
                 </a:solidFill>
               </a:rPr>
-              <a:t>      </a:t>
-            </a:r>
-            <a:r>
-              <a:rPr lang="en-US" u="sng" dirty="0" smtClean="0">
-                <a:solidFill>
-                  <a:schemeClr val="accent1">
-                    <a:lumMod val="75000"/>
-                  </a:schemeClr>
-                </a:solidFill>
-              </a:rPr>
-              <a:t>message user</a:t>
-            </a:r>
+              <a:t>     </a:t>
+            </a:r>
+            <a:endParaRPr lang="en-US" u="sng" dirty="0" smtClean="0">
+              <a:solidFill>
+                <a:schemeClr val="accent1">
+                  <a:lumMod val="75000"/>
+                </a:schemeClr>
+              </a:solidFill>
+            </a:endParaRPr>
           </a:p>
           <a:p>
             <a:r>
@@ -5670,16 +6887,13 @@
               </a:rPr>
               <a:t>      </a:t>
             </a:r>
-            <a:r>
-              <a:rPr lang="en-US" u="sng" dirty="0" smtClean="0">
-                <a:solidFill>
-                  <a:schemeClr val="accent1">
-                    <a:lumMod val="75000"/>
-                  </a:schemeClr>
-                </a:solidFill>
-              </a:rPr>
-              <a:t>message user</a:t>
-            </a:r>
+            <a:endParaRPr lang="en-US" u="sng" dirty="0" smtClean="0">
+              <a:solidFill>
+                <a:schemeClr val="accent1">
+                  <a:lumMod val="75000"/>
+                </a:schemeClr>
+              </a:solidFill>
+            </a:endParaRPr>
           </a:p>
           <a:p>
             <a:r>
@@ -5746,16 +6960,13 @@
               </a:rPr>
               <a:t>      </a:t>
             </a:r>
-            <a:r>
-              <a:rPr lang="en-US" u="sng" dirty="0" smtClean="0">
-                <a:solidFill>
-                  <a:schemeClr val="accent1">
-                    <a:lumMod val="75000"/>
-                  </a:schemeClr>
-                </a:solidFill>
-              </a:rPr>
-              <a:t>message user</a:t>
-            </a:r>
+            <a:endParaRPr lang="en-US" u="sng" dirty="0" smtClean="0">
+              <a:solidFill>
+                <a:schemeClr val="accent1">
+                  <a:lumMod val="75000"/>
+                </a:schemeClr>
+              </a:solidFill>
+            </a:endParaRPr>
           </a:p>
           <a:p>
             <a:r>
@@ -5822,16 +7033,13 @@
               </a:rPr>
               <a:t>      </a:t>
             </a:r>
-            <a:r>
-              <a:rPr lang="en-US" u="sng" dirty="0" smtClean="0">
-                <a:solidFill>
-                  <a:schemeClr val="accent1">
-                    <a:lumMod val="75000"/>
-                  </a:schemeClr>
-                </a:solidFill>
-              </a:rPr>
-              <a:t>message user</a:t>
-            </a:r>
+            <a:endParaRPr lang="en-US" u="sng" dirty="0" smtClean="0">
+              <a:solidFill>
+                <a:schemeClr val="accent1">
+                  <a:lumMod val="75000"/>
+                </a:schemeClr>
+              </a:solidFill>
+            </a:endParaRPr>
           </a:p>
           <a:p>
             <a:r>
@@ -6128,11 +7336,7 @@
             </a:pPr>
             <a:r>
               <a:rPr lang="en-US" dirty="0" smtClean="0"/>
-              <a:t>I will schedule swaps at well lit and open spaces (shopping centers, malls, etc</a:t>
-            </a:r>
-            <a:r>
-              <a:rPr lang="en-US" dirty="0" smtClean="0"/>
-              <a:t>..)</a:t>
+              <a:t>I will schedule swaps at well lit and open spaces (shopping centers, malls, etc..)</a:t>
             </a:r>
           </a:p>
           <a:p>
@@ -6143,7 +7347,6 @@
               <a:rPr lang="en-US" dirty="0" smtClean="0"/>
               <a:t>I will not exchange currency for produce.  I will only barter like for like.  </a:t>
             </a:r>
-            <a:endParaRPr lang="en-US" dirty="0" smtClean="0"/>
           </a:p>
           <a:p>
             <a:pPr marL="342900" indent="-342900">
@@ -6376,7 +7579,11 @@
           <a:p>
             <a:r>
               <a:rPr lang="en-US" sz="2400" dirty="0" smtClean="0"/>
-              <a:t>4.5/5 Stars/5 swaps	</a:t>
+              <a:t>10/25/2016</a:t>
+            </a:r>
+            <a:r>
+              <a:rPr lang="en-US" sz="2400" dirty="0" smtClean="0"/>
+              <a:t>	</a:t>
             </a:r>
             <a:endParaRPr lang="en-US" sz="2400" b="1" dirty="0"/>
           </a:p>
@@ -6696,8 +7903,8 @@
         </p:nvSpPr>
         <p:spPr>
           <a:xfrm>
-            <a:off x="1343025" y="1073800"/>
-            <a:ext cx="3943350" cy="830997"/>
+            <a:off x="1343025" y="845637"/>
+            <a:ext cx="3943350" cy="1200329"/>
           </a:xfrm>
           <a:prstGeom prst="rect">
             <a:avLst/>
@@ -6718,7 +7925,17 @@
           <a:p>
             <a:r>
               <a:rPr lang="en-US" sz="2400" dirty="0" smtClean="0"/>
-              <a:t>4.5/5 Stars/5 swaps	</a:t>
+              <a:t>10/25/2016</a:t>
+            </a:r>
+          </a:p>
+          <a:p>
+            <a:r>
+              <a:rPr lang="en-US" sz="2400" dirty="0" smtClean="0"/>
+              <a:t>5:00pm </a:t>
+            </a:r>
+            <a:r>
+              <a:rPr lang="en-US" sz="2400" dirty="0" smtClean="0"/>
+              <a:t>	</a:t>
             </a:r>
             <a:endParaRPr lang="en-US" sz="2400" b="1" dirty="0"/>
           </a:p>
@@ -6803,8 +8020,8 @@
         </p:nvSpPr>
         <p:spPr>
           <a:xfrm>
-            <a:off x="2068740" y="5539763"/>
-            <a:ext cx="1527726" cy="369332"/>
+            <a:off x="2068740" y="5909095"/>
+            <a:ext cx="848309" cy="369332"/>
           </a:xfrm>
           <a:prstGeom prst="rect">
             <a:avLst/>
@@ -6817,14 +8034,14 @@
           <a:lstStyle/>
           <a:p>
             <a:r>
-              <a:rPr lang="en-US" u="sng" smtClean="0">
+              <a:rPr lang="en-US" u="sng" dirty="0" smtClean="0">
                 <a:solidFill>
                   <a:schemeClr val="accent1">
                     <a:lumMod val="75000"/>
                   </a:schemeClr>
                 </a:solidFill>
               </a:rPr>
-              <a:t>Send Message</a:t>
+              <a:t>Submit</a:t>
             </a:r>
             <a:endParaRPr lang="en-US" u="sng" dirty="0" smtClean="0">
               <a:solidFill>
@@ -6844,7 +8061,7 @@
         </p:nvSpPr>
         <p:spPr>
           <a:xfrm>
-            <a:off x="2068740" y="4268939"/>
+            <a:off x="2068740" y="4718789"/>
             <a:ext cx="8787946" cy="923330"/>
           </a:xfrm>
           <a:prstGeom prst="rect">
@@ -6885,6 +8102,59 @@
               <a:t>Thanks! </a:t>
             </a:r>
             <a:endParaRPr lang="en-US" dirty="0"/>
+          </a:p>
+        </p:txBody>
+      </p:sp>
+      <p:sp>
+        <p:nvSpPr>
+          <p:cNvPr id="10" name="TextBox 9"/>
+          <p:cNvSpPr txBox="1"/>
+          <p:nvPr/>
+        </p:nvSpPr>
+        <p:spPr>
+          <a:xfrm>
+            <a:off x="2068740" y="4072458"/>
+            <a:ext cx="6015717" cy="646331"/>
+          </a:xfrm>
+          <a:prstGeom prst="rect">
+            <a:avLst/>
+          </a:prstGeom>
+          <a:noFill/>
+        </p:spPr>
+        <p:txBody>
+          <a:bodyPr wrap="square" rtlCol="0">
+            <a:spAutoFit/>
+          </a:bodyPr>
+          <a:lstStyle/>
+          <a:p>
+            <a:r>
+              <a:rPr lang="en-US" b="1" dirty="0" smtClean="0"/>
+              <a:t>Message</a:t>
+            </a:r>
+            <a:r>
+              <a:rPr lang="en-US" b="1" dirty="0" smtClean="0"/>
+              <a:t> </a:t>
+            </a:r>
+            <a:r>
+              <a:rPr lang="en-US" b="1" dirty="0" smtClean="0"/>
+              <a:t>by </a:t>
+            </a:r>
+            <a:r>
+              <a:rPr lang="en-US" b="1" dirty="0" smtClean="0"/>
+              <a:t>kwood28 10/25/2016 5:05pm</a:t>
+            </a:r>
+            <a:r>
+              <a:rPr lang="en-US" b="1" dirty="0" smtClean="0"/>
+              <a:t>:</a:t>
+            </a:r>
+            <a:endParaRPr lang="en-US" b="1" dirty="0" smtClean="0"/>
+          </a:p>
+          <a:p>
+            <a:r>
+              <a:rPr lang="en-US" dirty="0" smtClean="0"/>
+              <a:t>	</a:t>
+            </a:r>
+            <a:endParaRPr lang="en-US" b="1" dirty="0"/>
           </a:p>
         </p:txBody>
       </p:sp>
@@ -6990,60 +8260,14 @@
       </p:sp>
       <p:sp>
         <p:nvSpPr>
-          <p:cNvPr id="5" name="Rectangle 4"/>
-          <p:cNvSpPr/>
-          <p:nvPr/>
-        </p:nvSpPr>
-        <p:spPr>
-          <a:xfrm>
-            <a:off x="3120571" y="498294"/>
-            <a:ext cx="5927292" cy="5297716"/>
-          </a:xfrm>
-          <a:prstGeom prst="rect">
-            <a:avLst/>
-          </a:prstGeom>
-          <a:solidFill>
-            <a:schemeClr val="accent6">
-              <a:lumMod val="20000"/>
-              <a:lumOff val="80000"/>
-            </a:schemeClr>
-          </a:solidFill>
-        </p:spPr>
-        <p:style>
-          <a:lnRef idx="2">
-            <a:schemeClr val="accent1">
-              <a:shade val="50000"/>
-            </a:schemeClr>
-          </a:lnRef>
-          <a:fillRef idx="1">
-            <a:schemeClr val="accent1"/>
-          </a:fillRef>
-          <a:effectRef idx="0">
-            <a:schemeClr val="accent1"/>
-          </a:effectRef>
-          <a:fontRef idx="minor">
-            <a:schemeClr val="lt1"/>
-          </a:fontRef>
-        </p:style>
-        <p:txBody>
-          <a:bodyPr rtlCol="0" anchor="ctr"/>
-          <a:lstStyle/>
-          <a:p>
-            <a:pPr algn="ctr"/>
-            <a:endParaRPr lang="en-US"/>
-          </a:p>
-        </p:txBody>
-      </p:sp>
-      <p:sp>
-        <p:nvSpPr>
-          <p:cNvPr id="6" name="TextBox 5"/>
+          <p:cNvPr id="5" name="TextBox 4"/>
           <p:cNvSpPr txBox="1"/>
           <p:nvPr/>
         </p:nvSpPr>
         <p:spPr>
           <a:xfrm>
-            <a:off x="3816742" y="624113"/>
-            <a:ext cx="4422195" cy="707886"/>
+            <a:off x="4993480" y="652926"/>
+            <a:ext cx="2128838" cy="369332"/>
           </a:xfrm>
           <a:prstGeom prst="rect">
             <a:avLst/>
@@ -7058,29 +8282,33 @@
           <a:p>
             <a:pPr algn="ctr"/>
             <a:r>
-              <a:rPr lang="en-US" sz="4000" dirty="0" smtClean="0">
+              <a:rPr lang="en-US" dirty="0" smtClean="0">
                 <a:solidFill>
                   <a:schemeClr val="accent1">
                     <a:lumMod val="75000"/>
                   </a:schemeClr>
                 </a:solidFill>
               </a:rPr>
-              <a:t>Rate Swap</a:t>
-            </a:r>
-            <a:endParaRPr lang="en-US" sz="4000" dirty="0"/>
-          </a:p>
-        </p:txBody>
-      </p:sp>
-      <p:sp>
-        <p:nvSpPr>
-          <p:cNvPr id="7" name="TextBox 6"/>
+              <a:t>WELCOME ANDREW</a:t>
+            </a:r>
+            <a:r>
+              <a:rPr lang="en-US" dirty="0" smtClean="0"/>
+              <a:t> </a:t>
+            </a:r>
+            <a:endParaRPr lang="en-US" dirty="0"/>
+          </a:p>
+        </p:txBody>
+      </p:sp>
+      <p:sp>
+        <p:nvSpPr>
+          <p:cNvPr id="6" name="TextBox 5"/>
           <p:cNvSpPr txBox="1"/>
           <p:nvPr/>
         </p:nvSpPr>
         <p:spPr>
           <a:xfrm>
-            <a:off x="4427143" y="1854493"/>
-            <a:ext cx="4499142" cy="2585323"/>
+            <a:off x="9142981" y="653626"/>
+            <a:ext cx="947737" cy="369332"/>
           </a:xfrm>
           <a:prstGeom prst="rect">
             <a:avLst/>
@@ -7093,64 +8321,22 @@
           </a:bodyPr>
           <a:lstStyle/>
           <a:p>
-            <a:pPr marL="342900" indent="-342900">
-              <a:buAutoNum type="arabicPeriod"/>
-            </a:pPr>
-            <a:r>
-              <a:rPr lang="en-US" dirty="0" smtClean="0"/>
-              <a:t>Swapper was on time.  </a:t>
-            </a:r>
-          </a:p>
-          <a:p>
-            <a:pPr marL="342900" indent="-342900">
-              <a:buAutoNum type="arabicPeriod"/>
-            </a:pPr>
-            <a:endParaRPr lang="en-US" dirty="0"/>
-          </a:p>
-          <a:p>
-            <a:pPr marL="342900" indent="-342900">
-              <a:buAutoNum type="arabicPeriod"/>
-            </a:pPr>
-            <a:r>
-              <a:rPr lang="en-US" dirty="0" smtClean="0"/>
-              <a:t>Swapper was kind.</a:t>
-            </a:r>
-          </a:p>
-          <a:p>
-            <a:pPr marL="342900" indent="-342900">
-              <a:buAutoNum type="arabicPeriod"/>
-            </a:pPr>
-            <a:endParaRPr lang="en-US" dirty="0" smtClean="0"/>
-          </a:p>
-          <a:p>
-            <a:pPr marL="342900" indent="-342900">
-              <a:buAutoNum type="arabicPeriod"/>
-            </a:pPr>
-            <a:r>
-              <a:rPr lang="en-US" dirty="0" smtClean="0"/>
-              <a:t>Produce was high quality.</a:t>
-            </a:r>
-          </a:p>
-          <a:p>
-            <a:pPr marL="342900" indent="-342900">
-              <a:buAutoNum type="arabicPeriod"/>
-            </a:pPr>
-            <a:endParaRPr lang="en-US" dirty="0" smtClean="0"/>
-          </a:p>
-          <a:p>
-            <a:pPr marL="342900" indent="-342900">
-              <a:buAutoNum type="arabicPeriod"/>
-            </a:pPr>
-            <a:r>
-              <a:rPr lang="en-US" dirty="0" smtClean="0"/>
-              <a:t>I had an overall great experience with swapper </a:t>
-            </a:r>
-          </a:p>
-          <a:p>
-            <a:pPr marL="342900" indent="-342900">
-              <a:buAutoNum type="arabicPeriod"/>
-            </a:pPr>
-            <a:endParaRPr lang="en-US" dirty="0"/>
+            <a:pPr algn="ctr"/>
+            <a:r>
+              <a:rPr lang="en-US" u="sng" smtClean="0">
+                <a:solidFill>
+                  <a:schemeClr val="accent1">
+                    <a:lumMod val="75000"/>
+                  </a:schemeClr>
+                </a:solidFill>
+              </a:rPr>
+              <a:t>ABOUT</a:t>
+            </a:r>
+            <a:r>
+              <a:rPr lang="en-US" u="sng" smtClean="0"/>
+              <a:t> </a:t>
+            </a:r>
+            <a:endParaRPr lang="en-US" u="sng" dirty="0"/>
           </a:p>
         </p:txBody>
       </p:sp>
@@ -7162,8 +8348,8 @@
         </p:nvSpPr>
         <p:spPr>
           <a:xfrm>
-            <a:off x="3304080" y="1514475"/>
-            <a:ext cx="4934857" cy="369332"/>
+            <a:off x="1343026" y="2721837"/>
+            <a:ext cx="8429625" cy="461665"/>
           </a:xfrm>
           <a:prstGeom prst="rect">
             <a:avLst/>
@@ -7176,26 +8362,106 @@
           </a:bodyPr>
           <a:lstStyle/>
           <a:p>
-            <a:pPr marL="342900" marR="0" lvl="0" indent="-342900" defTabSz="914400" eaLnBrk="1" fontAlgn="auto" latinLnBrk="0" hangingPunct="1">
-              <a:lnSpc>
-                <a:spcPct val="100000"/>
-              </a:lnSpc>
-              <a:spcBef>
-                <a:spcPts val="0"/>
-              </a:spcBef>
-              <a:spcAft>
-                <a:spcPts val="0"/>
-              </a:spcAft>
-              <a:buClrTx/>
-              <a:buSzTx/>
-              <a:buFontTx/>
-              <a:buNone/>
-              <a:tabLst/>
-              <a:defRPr/>
-            </a:pPr>
-            <a:r>
-              <a:rPr lang="en-US" smtClean="0"/>
-              <a:t>True   False </a:t>
+            <a:r>
+              <a:rPr lang="en-US" sz="2400" b="1" dirty="0" smtClean="0"/>
+              <a:t>username</a:t>
+            </a:r>
+            <a:r>
+              <a:rPr lang="en-US" sz="2400" b="1" dirty="0" smtClean="0"/>
+              <a:t>	</a:t>
+            </a:r>
+            <a:r>
+              <a:rPr lang="en-US" sz="2400" b="1" dirty="0" smtClean="0"/>
+              <a:t>post date</a:t>
+            </a:r>
+            <a:r>
+              <a:rPr lang="en-US" sz="2400" b="1" dirty="0" smtClean="0"/>
+              <a:t>	         summary			 </a:t>
+            </a:r>
+            <a:endParaRPr lang="en-US" sz="2400" b="1" dirty="0"/>
+          </a:p>
+        </p:txBody>
+      </p:sp>
+      <p:sp>
+        <p:nvSpPr>
+          <p:cNvPr id="9" name="TextBox 8"/>
+          <p:cNvSpPr txBox="1"/>
+          <p:nvPr/>
+        </p:nvSpPr>
+        <p:spPr>
+          <a:xfrm>
+            <a:off x="1343025" y="3295183"/>
+            <a:ext cx="10058400" cy="923330"/>
+          </a:xfrm>
+          <a:prstGeom prst="rect">
+            <a:avLst/>
+          </a:prstGeom>
+          <a:noFill/>
+        </p:spPr>
+        <p:txBody>
+          <a:bodyPr wrap="square" rtlCol="0">
+            <a:spAutoFit/>
+          </a:bodyPr>
+          <a:lstStyle/>
+          <a:p>
+            <a:r>
+              <a:rPr lang="en-US" dirty="0" smtClean="0"/>
+              <a:t>agonzalez27	</a:t>
+            </a:r>
+            <a:r>
+              <a:rPr lang="en-US" dirty="0" smtClean="0"/>
+              <a:t>10/25/2016</a:t>
+            </a:r>
+            <a:r>
+              <a:rPr lang="en-US" dirty="0" smtClean="0"/>
+              <a:t>	            I will swap oranges for           </a:t>
+            </a:r>
+            <a:r>
+              <a:rPr lang="en-US" dirty="0" smtClean="0"/>
+              <a:t>	 </a:t>
+            </a:r>
+            <a:r>
+              <a:rPr lang="en-US" u="sng" dirty="0" smtClean="0">
+                <a:solidFill>
+                  <a:schemeClr val="accent1">
+                    <a:lumMod val="75000"/>
+                  </a:schemeClr>
+                </a:solidFill>
+              </a:rPr>
+              <a:t>view post</a:t>
+            </a:r>
+            <a:r>
+              <a:rPr lang="en-US" dirty="0" smtClean="0">
+                <a:solidFill>
+                  <a:schemeClr val="accent1">
+                    <a:lumMod val="75000"/>
+                  </a:schemeClr>
+                </a:solidFill>
+              </a:rPr>
+              <a:t>      </a:t>
+            </a:r>
+            <a:endParaRPr lang="en-US" u="sng" dirty="0" smtClean="0">
+              <a:solidFill>
+                <a:schemeClr val="accent1">
+                  <a:lumMod val="75000"/>
+                </a:schemeClr>
+              </a:solidFill>
+            </a:endParaRPr>
+          </a:p>
+          <a:p>
+            <a:r>
+              <a:rPr lang="en-US" dirty="0" smtClean="0"/>
+              <a:t>				            avocados, tomatoes, </a:t>
+            </a:r>
+          </a:p>
+          <a:p>
+            <a:r>
+              <a:rPr lang="en-US" dirty="0"/>
+              <a:t>	</a:t>
+            </a:r>
+            <a:r>
+              <a:rPr lang="en-US" dirty="0" smtClean="0"/>
+              <a:t>			            or squash. 			 </a:t>
             </a:r>
             <a:endParaRPr lang="en-US" dirty="0"/>
           </a:p>
@@ -7203,115 +8469,169 @@
       </p:sp>
       <p:sp>
         <p:nvSpPr>
-          <p:cNvPr id="9" name="Rectangle 8"/>
-          <p:cNvSpPr/>
-          <p:nvPr/>
-        </p:nvSpPr>
-        <p:spPr>
-          <a:xfrm flipH="1">
-            <a:off x="3545490" y="1942911"/>
-            <a:ext cx="203200" cy="246743"/>
-          </a:xfrm>
-          <a:prstGeom prst="rect">
-            <a:avLst/>
-          </a:prstGeom>
-        </p:spPr>
-        <p:style>
-          <a:lnRef idx="2">
-            <a:schemeClr val="accent6"/>
-          </a:lnRef>
-          <a:fillRef idx="1">
-            <a:schemeClr val="lt1"/>
-          </a:fillRef>
-          <a:effectRef idx="0">
-            <a:schemeClr val="accent6"/>
-          </a:effectRef>
-          <a:fontRef idx="minor">
-            <a:schemeClr val="dk1"/>
-          </a:fontRef>
-        </p:style>
-        <p:txBody>
-          <a:bodyPr rtlCol="0" anchor="ctr"/>
-          <a:lstStyle/>
-          <a:p>
-            <a:pPr algn="ctr"/>
-            <a:endParaRPr lang="en-US"/>
-          </a:p>
-        </p:txBody>
-      </p:sp>
-      <p:sp>
-        <p:nvSpPr>
-          <p:cNvPr id="10" name="Rectangle 9"/>
-          <p:cNvSpPr/>
-          <p:nvPr/>
-        </p:nvSpPr>
-        <p:spPr>
-          <a:xfrm flipH="1">
-            <a:off x="4072009" y="1942911"/>
-            <a:ext cx="203200" cy="246743"/>
-          </a:xfrm>
-          <a:prstGeom prst="rect">
-            <a:avLst/>
-          </a:prstGeom>
-        </p:spPr>
-        <p:style>
-          <a:lnRef idx="2">
-            <a:schemeClr val="accent6"/>
-          </a:lnRef>
-          <a:fillRef idx="1">
-            <a:schemeClr val="lt1"/>
-          </a:fillRef>
-          <a:effectRef idx="0">
-            <a:schemeClr val="accent6"/>
-          </a:effectRef>
-          <a:fontRef idx="minor">
-            <a:schemeClr val="dk1"/>
-          </a:fontRef>
-        </p:style>
-        <p:txBody>
-          <a:bodyPr rtlCol="0" anchor="ctr"/>
-          <a:lstStyle/>
-          <a:p>
-            <a:pPr algn="ctr"/>
-            <a:endParaRPr lang="en-US"/>
-          </a:p>
-        </p:txBody>
-      </p:sp>
-      <p:sp>
-        <p:nvSpPr>
-          <p:cNvPr id="11" name="Rectangle 10"/>
-          <p:cNvSpPr/>
-          <p:nvPr/>
-        </p:nvSpPr>
-        <p:spPr>
-          <a:xfrm flipH="1">
-            <a:off x="3545490" y="2462460"/>
-            <a:ext cx="203200" cy="246743"/>
-          </a:xfrm>
-          <a:prstGeom prst="rect">
-            <a:avLst/>
-          </a:prstGeom>
-        </p:spPr>
-        <p:style>
-          <a:lnRef idx="2">
-            <a:schemeClr val="accent6"/>
-          </a:lnRef>
-          <a:fillRef idx="1">
-            <a:schemeClr val="lt1"/>
-          </a:fillRef>
-          <a:effectRef idx="0">
-            <a:schemeClr val="accent6"/>
-          </a:effectRef>
-          <a:fontRef idx="minor">
-            <a:schemeClr val="dk1"/>
-          </a:fontRef>
-        </p:style>
-        <p:txBody>
-          <a:bodyPr rtlCol="0" anchor="ctr"/>
-          <a:lstStyle/>
-          <a:p>
-            <a:pPr algn="ctr"/>
-            <a:endParaRPr lang="en-US"/>
+          <p:cNvPr id="10" name="TextBox 9"/>
+          <p:cNvSpPr txBox="1"/>
+          <p:nvPr/>
+        </p:nvSpPr>
+        <p:spPr>
+          <a:xfrm>
+            <a:off x="1343025" y="4304124"/>
+            <a:ext cx="10058400" cy="646331"/>
+          </a:xfrm>
+          <a:prstGeom prst="rect">
+            <a:avLst/>
+          </a:prstGeom>
+          <a:noFill/>
+        </p:spPr>
+        <p:txBody>
+          <a:bodyPr wrap="square" rtlCol="0">
+            <a:spAutoFit/>
+          </a:bodyPr>
+          <a:lstStyle/>
+          <a:p>
+            <a:r>
+              <a:rPr lang="en-US" dirty="0"/>
+              <a:t>agonzalez27 </a:t>
+            </a:r>
+            <a:r>
+              <a:rPr lang="en-US" dirty="0" smtClean="0"/>
+              <a:t>	</a:t>
+            </a:r>
+            <a:r>
+              <a:rPr lang="en-US" dirty="0" smtClean="0"/>
+              <a:t>10/10/2016	            I </a:t>
+            </a:r>
+            <a:r>
+              <a:rPr lang="en-US" dirty="0" smtClean="0"/>
+              <a:t>will swap </a:t>
+            </a:r>
+            <a:r>
+              <a:rPr lang="en-US" dirty="0" smtClean="0"/>
+              <a:t>oranges for		</a:t>
+            </a:r>
+            <a:r>
+              <a:rPr lang="en-US" u="sng" dirty="0">
+                <a:solidFill>
+                  <a:schemeClr val="accent1">
+                    <a:lumMod val="75000"/>
+                  </a:schemeClr>
+                </a:solidFill>
+              </a:rPr>
+              <a:t> view post</a:t>
+            </a:r>
+            <a:r>
+              <a:rPr lang="en-US" dirty="0">
+                <a:solidFill>
+                  <a:schemeClr val="accent1">
+                    <a:lumMod val="75000"/>
+                  </a:schemeClr>
+                </a:solidFill>
+              </a:rPr>
+              <a:t> </a:t>
+            </a:r>
+            <a:endParaRPr lang="en-US" dirty="0" smtClean="0"/>
+          </a:p>
+          <a:p>
+            <a:r>
+              <a:rPr lang="en-US" dirty="0"/>
+              <a:t>	</a:t>
+            </a:r>
+            <a:r>
+              <a:rPr lang="en-US" dirty="0" smtClean="0"/>
+              <a:t>			            tomatoes!</a:t>
+            </a:r>
+            <a:r>
+              <a:rPr lang="en-US" dirty="0" smtClean="0"/>
+              <a:t>			 </a:t>
+            </a:r>
+            <a:endParaRPr lang="en-US" dirty="0"/>
+          </a:p>
+        </p:txBody>
+      </p:sp>
+      <p:sp>
+        <p:nvSpPr>
+          <p:cNvPr id="11" name="TextBox 10"/>
+          <p:cNvSpPr txBox="1"/>
+          <p:nvPr/>
+        </p:nvSpPr>
+        <p:spPr>
+          <a:xfrm>
+            <a:off x="1343025" y="5410795"/>
+            <a:ext cx="10058400" cy="646331"/>
+          </a:xfrm>
+          <a:prstGeom prst="rect">
+            <a:avLst/>
+          </a:prstGeom>
+          <a:noFill/>
+        </p:spPr>
+        <p:txBody>
+          <a:bodyPr wrap="square" rtlCol="0">
+            <a:spAutoFit/>
+          </a:bodyPr>
+          <a:lstStyle/>
+          <a:p>
+            <a:r>
+              <a:rPr lang="en-US" dirty="0"/>
+              <a:t>agonzalez27 </a:t>
+            </a:r>
+            <a:r>
+              <a:rPr lang="en-US" dirty="0" smtClean="0"/>
+              <a:t>	</a:t>
+            </a:r>
+            <a:r>
+              <a:rPr lang="en-US" dirty="0" smtClean="0"/>
+              <a:t>10/1/2016	            I </a:t>
+            </a:r>
+            <a:r>
+              <a:rPr lang="en-US" dirty="0" smtClean="0"/>
+              <a:t>will swap </a:t>
+            </a:r>
+            <a:r>
+              <a:rPr lang="en-US" dirty="0" smtClean="0"/>
+              <a:t>oranges for</a:t>
+            </a:r>
+            <a:r>
+              <a:rPr lang="en-US" dirty="0" smtClean="0"/>
+              <a:t>          	 </a:t>
+            </a:r>
+            <a:r>
+              <a:rPr lang="en-US" u="sng" dirty="0" smtClean="0">
+                <a:solidFill>
+                  <a:schemeClr val="accent1">
+                    <a:lumMod val="75000"/>
+                  </a:schemeClr>
+                </a:solidFill>
+              </a:rPr>
+              <a:t>view post</a:t>
+            </a:r>
+            <a:r>
+              <a:rPr lang="en-US" dirty="0" smtClean="0">
+                <a:solidFill>
+                  <a:schemeClr val="accent1">
+                    <a:lumMod val="75000"/>
+                  </a:schemeClr>
+                </a:solidFill>
+              </a:rPr>
+              <a:t>      </a:t>
+            </a:r>
+            <a:endParaRPr lang="en-US" u="sng" dirty="0" smtClean="0">
+              <a:solidFill>
+                <a:schemeClr val="accent1">
+                  <a:lumMod val="75000"/>
+                </a:schemeClr>
+              </a:solidFill>
+            </a:endParaRPr>
+          </a:p>
+          <a:p>
+            <a:r>
+              <a:rPr lang="en-US" dirty="0" smtClean="0"/>
+              <a:t>				            </a:t>
+            </a:r>
+            <a:r>
+              <a:rPr lang="en-US" dirty="0" smtClean="0"/>
+              <a:t>pumpkins. </a:t>
+            </a:r>
+            <a:endParaRPr lang="en-US" dirty="0"/>
           </a:p>
         </p:txBody>
       </p:sp>
@@ -7322,110 +8642,114 @@
           <p:nvPr/>
         </p:nvSpPr>
         <p:spPr>
-          <a:xfrm flipH="1">
-            <a:off x="4072009" y="2462460"/>
-            <a:ext cx="203200" cy="246743"/>
-          </a:xfrm>
-          <a:prstGeom prst="rect">
-            <a:avLst/>
-          </a:prstGeom>
-        </p:spPr>
-        <p:style>
-          <a:lnRef idx="2">
-            <a:schemeClr val="accent6"/>
-          </a:lnRef>
-          <a:fillRef idx="1">
-            <a:schemeClr val="lt1"/>
-          </a:fillRef>
-          <a:effectRef idx="0">
-            <a:schemeClr val="accent6"/>
-          </a:effectRef>
-          <a:fontRef idx="minor">
-            <a:schemeClr val="dk1"/>
-          </a:fontRef>
-        </p:style>
-        <p:txBody>
-          <a:bodyPr rtlCol="0" anchor="ctr"/>
+          <a:xfrm>
+            <a:off x="457383" y="465647"/>
+            <a:ext cx="4514667" cy="646331"/>
+          </a:xfrm>
+          <a:prstGeom prst="rect">
+            <a:avLst/>
+          </a:prstGeom>
+          <a:noFill/>
+        </p:spPr>
+        <p:txBody>
+          <a:bodyPr wrap="square" lIns="91440" tIns="45720" rIns="91440" bIns="45720">
+            <a:spAutoFit/>
+          </a:bodyPr>
           <a:lstStyle/>
           <a:p>
             <a:pPr algn="ctr"/>
-            <a:endParaRPr lang="en-US"/>
-          </a:p>
-        </p:txBody>
-      </p:sp>
-      <p:sp>
-        <p:nvSpPr>
-          <p:cNvPr id="13" name="Rectangle 12"/>
-          <p:cNvSpPr/>
-          <p:nvPr/>
-        </p:nvSpPr>
-        <p:spPr>
-          <a:xfrm flipH="1">
-            <a:off x="3557613" y="3036073"/>
-            <a:ext cx="203200" cy="246743"/>
-          </a:xfrm>
-          <a:prstGeom prst="rect">
-            <a:avLst/>
-          </a:prstGeom>
-        </p:spPr>
-        <p:style>
-          <a:lnRef idx="2">
-            <a:schemeClr val="accent6"/>
-          </a:lnRef>
-          <a:fillRef idx="1">
-            <a:schemeClr val="lt1"/>
-          </a:fillRef>
-          <a:effectRef idx="0">
-            <a:schemeClr val="accent6"/>
-          </a:effectRef>
-          <a:fontRef idx="minor">
-            <a:schemeClr val="dk1"/>
-          </a:fontRef>
-        </p:style>
-        <p:txBody>
-          <a:bodyPr rtlCol="0" anchor="ctr"/>
+            <a:r>
+              <a:rPr lang="en-US" sz="3600" dirty="0" err="1">
+                <a:ln w="0"/>
+                <a:solidFill>
+                  <a:schemeClr val="accent6">
+                    <a:lumMod val="50000"/>
+                  </a:schemeClr>
+                </a:solidFill>
+                <a:effectLst>
+                  <a:outerShdw blurRad="38100" dist="19050" dir="2700000" algn="tl" rotWithShape="0">
+                    <a:schemeClr val="dk1">
+                      <a:alpha val="40000"/>
+                    </a:schemeClr>
+                  </a:outerShdw>
+                </a:effectLst>
+              </a:rPr>
+              <a:t>p</a:t>
+            </a:r>
+            <a:r>
+              <a:rPr lang="en-US" sz="3600" b="0" cap="none" spc="0" dirty="0" err="1" smtClean="0">
+                <a:ln w="0"/>
+                <a:solidFill>
+                  <a:schemeClr val="accent6">
+                    <a:lumMod val="50000"/>
+                  </a:schemeClr>
+                </a:solidFill>
+                <a:effectLst>
+                  <a:outerShdw blurRad="38100" dist="19050" dir="2700000" algn="tl" rotWithShape="0">
+                    <a:schemeClr val="dk1">
+                      <a:alpha val="40000"/>
+                    </a:schemeClr>
+                  </a:outerShdw>
+                </a:effectLst>
+              </a:rPr>
+              <a:t>roduswap.org</a:t>
+            </a:r>
+            <a:endParaRPr lang="en-US" sz="3600" b="0" cap="none" spc="0" dirty="0">
+              <a:ln w="0"/>
+              <a:solidFill>
+                <a:schemeClr val="accent6">
+                  <a:lumMod val="50000"/>
+                </a:schemeClr>
+              </a:solidFill>
+              <a:effectLst>
+                <a:outerShdw blurRad="38100" dist="19050" dir="2700000" algn="tl" rotWithShape="0">
+                  <a:schemeClr val="dk1">
+                    <a:alpha val="40000"/>
+                  </a:schemeClr>
+                </a:outerShdw>
+              </a:effectLst>
+            </a:endParaRPr>
+          </a:p>
+        </p:txBody>
+      </p:sp>
+      <p:sp>
+        <p:nvSpPr>
+          <p:cNvPr id="13" name="TextBox 12"/>
+          <p:cNvSpPr txBox="1"/>
+          <p:nvPr/>
+        </p:nvSpPr>
+        <p:spPr>
+          <a:xfrm>
+            <a:off x="8273145" y="639112"/>
+            <a:ext cx="947737" cy="369332"/>
+          </a:xfrm>
+          <a:prstGeom prst="rect">
+            <a:avLst/>
+          </a:prstGeom>
+          <a:noFill/>
+        </p:spPr>
+        <p:txBody>
+          <a:bodyPr wrap="square" rtlCol="0">
+            <a:spAutoFit/>
+          </a:bodyPr>
           <a:lstStyle/>
           <a:p>
             <a:pPr algn="ctr"/>
-            <a:endParaRPr lang="en-US"/>
-          </a:p>
-        </p:txBody>
-      </p:sp>
-      <p:sp>
-        <p:nvSpPr>
-          <p:cNvPr id="14" name="Rectangle 13"/>
-          <p:cNvSpPr/>
-          <p:nvPr/>
-        </p:nvSpPr>
-        <p:spPr>
-          <a:xfrm flipH="1">
-            <a:off x="4084132" y="3036073"/>
-            <a:ext cx="203200" cy="246743"/>
-          </a:xfrm>
-          <a:prstGeom prst="rect">
-            <a:avLst/>
-          </a:prstGeom>
-        </p:spPr>
-        <p:style>
-          <a:lnRef idx="2">
-            <a:schemeClr val="accent6"/>
-          </a:lnRef>
-          <a:fillRef idx="1">
-            <a:schemeClr val="lt1"/>
-          </a:fillRef>
-          <a:effectRef idx="0">
-            <a:schemeClr val="accent6"/>
-          </a:effectRef>
-          <a:fontRef idx="minor">
-            <a:schemeClr val="dk1"/>
-          </a:fontRef>
-        </p:style>
-        <p:txBody>
-          <a:bodyPr rtlCol="0" anchor="ctr"/>
-          <a:lstStyle/>
-          <a:p>
-            <a:pPr algn="ctr"/>
-            <a:endParaRPr lang="en-US"/>
+            <a:r>
+              <a:rPr lang="en-US" u="sng" dirty="0" smtClean="0">
+                <a:solidFill>
+                  <a:schemeClr val="accent1">
+                    <a:lumMod val="75000"/>
+                  </a:schemeClr>
+                </a:solidFill>
+              </a:rPr>
+              <a:t>HOME</a:t>
+            </a:r>
+            <a:r>
+              <a:rPr lang="en-US" u="sng" dirty="0" smtClean="0"/>
+              <a:t> </a:t>
+            </a:r>
+            <a:endParaRPr lang="en-US" u="sng" dirty="0"/>
           </a:p>
         </p:txBody>
       </p:sp>
@@ -7436,92 +8760,274 @@
           <p:nvPr/>
         </p:nvSpPr>
         <p:spPr>
-          <a:xfrm flipH="1">
-            <a:off x="3575068" y="3609686"/>
-            <a:ext cx="203200" cy="246743"/>
-          </a:xfrm>
-          <a:prstGeom prst="rect">
-            <a:avLst/>
-          </a:prstGeom>
-        </p:spPr>
-        <p:style>
-          <a:lnRef idx="2">
-            <a:schemeClr val="accent6"/>
-          </a:lnRef>
-          <a:fillRef idx="1">
-            <a:schemeClr val="lt1"/>
-          </a:fillRef>
-          <a:effectRef idx="0">
-            <a:schemeClr val="accent6"/>
-          </a:effectRef>
-          <a:fontRef idx="minor">
-            <a:schemeClr val="dk1"/>
-          </a:fontRef>
-        </p:style>
-        <p:txBody>
-          <a:bodyPr rtlCol="0" anchor="ctr"/>
+          <a:xfrm>
+            <a:off x="1343025" y="2078106"/>
+            <a:ext cx="1581651" cy="523220"/>
+          </a:xfrm>
+          <a:prstGeom prst="rect">
+            <a:avLst/>
+          </a:prstGeom>
+        </p:spPr>
+        <p:txBody>
+          <a:bodyPr wrap="none">
+            <a:spAutoFit/>
+          </a:bodyPr>
+          <a:lstStyle/>
+          <a:p>
+            <a:r>
+              <a:rPr lang="en-US" sz="2800" u="sng" dirty="0">
+                <a:solidFill>
+                  <a:schemeClr val="accent1">
+                    <a:lumMod val="75000"/>
+                  </a:schemeClr>
+                </a:solidFill>
+              </a:rPr>
+              <a:t>m</a:t>
+            </a:r>
+            <a:r>
+              <a:rPr lang="en-US" sz="2800" u="sng" dirty="0" smtClean="0">
+                <a:solidFill>
+                  <a:schemeClr val="accent1">
+                    <a:lumMod val="75000"/>
+                  </a:schemeClr>
+                </a:solidFill>
+              </a:rPr>
+              <a:t>y posts:</a:t>
+            </a:r>
+            <a:endParaRPr lang="en-US" sz="2800" u="sng" dirty="0">
+              <a:solidFill>
+                <a:schemeClr val="accent1">
+                  <a:lumMod val="75000"/>
+                </a:schemeClr>
+              </a:solidFill>
+            </a:endParaRPr>
+          </a:p>
+        </p:txBody>
+      </p:sp>
+      <p:sp>
+        <p:nvSpPr>
+          <p:cNvPr id="16" name="TextBox 15"/>
+          <p:cNvSpPr txBox="1"/>
+          <p:nvPr/>
+        </p:nvSpPr>
+        <p:spPr>
+          <a:xfrm>
+            <a:off x="10090718" y="641012"/>
+            <a:ext cx="1310707" cy="369332"/>
+          </a:xfrm>
+          <a:prstGeom prst="rect">
+            <a:avLst/>
+          </a:prstGeom>
+          <a:noFill/>
+        </p:spPr>
+        <p:txBody>
+          <a:bodyPr wrap="square" rtlCol="0">
+            <a:spAutoFit/>
+          </a:bodyPr>
           <a:lstStyle/>
           <a:p>
             <a:pPr algn="ctr"/>
-            <a:endParaRPr lang="en-US"/>
-          </a:p>
-        </p:txBody>
-      </p:sp>
-      <p:sp>
-        <p:nvSpPr>
-          <p:cNvPr id="16" name="Rectangle 15"/>
+            <a:r>
+              <a:rPr lang="en-US" u="sng" smtClean="0">
+                <a:solidFill>
+                  <a:schemeClr val="accent1">
+                    <a:lumMod val="75000"/>
+                  </a:schemeClr>
+                </a:solidFill>
+              </a:rPr>
+              <a:t>MY PROFILE</a:t>
+            </a:r>
+            <a:r>
+              <a:rPr lang="en-US" u="sng" smtClean="0"/>
+              <a:t> </a:t>
+            </a:r>
+            <a:endParaRPr lang="en-US" u="sng" dirty="0"/>
+          </a:p>
+        </p:txBody>
+      </p:sp>
+      <p:sp>
+        <p:nvSpPr>
+          <p:cNvPr id="17" name="Rectangle 16"/>
           <p:cNvSpPr/>
           <p:nvPr/>
         </p:nvSpPr>
         <p:spPr>
-          <a:xfrm flipH="1">
-            <a:off x="4089464" y="3606769"/>
-            <a:ext cx="203200" cy="246743"/>
-          </a:xfrm>
-          <a:prstGeom prst="rect">
-            <a:avLst/>
-          </a:prstGeom>
-        </p:spPr>
-        <p:style>
-          <a:lnRef idx="2">
-            <a:schemeClr val="accent6"/>
-          </a:lnRef>
-          <a:fillRef idx="1">
-            <a:schemeClr val="lt1"/>
-          </a:fillRef>
-          <a:effectRef idx="0">
-            <a:schemeClr val="accent6"/>
-          </a:effectRef>
-          <a:fontRef idx="minor">
-            <a:schemeClr val="dk1"/>
-          </a:fontRef>
-        </p:style>
-        <p:txBody>
-          <a:bodyPr rtlCol="0" anchor="ctr"/>
-          <a:lstStyle/>
-          <a:p>
-            <a:pPr algn="ctr"/>
-            <a:endParaRPr lang="en-US"/>
+          <a:xfrm>
+            <a:off x="7314976" y="1236423"/>
+            <a:ext cx="2111732" cy="523220"/>
+          </a:xfrm>
+          <a:prstGeom prst="rect">
+            <a:avLst/>
+          </a:prstGeom>
+        </p:spPr>
+        <p:txBody>
+          <a:bodyPr wrap="none">
+            <a:spAutoFit/>
+          </a:bodyPr>
+          <a:lstStyle/>
+          <a:p>
+            <a:r>
+              <a:rPr lang="en-US" sz="2800" u="sng" dirty="0">
+                <a:solidFill>
+                  <a:schemeClr val="accent1">
+                    <a:lumMod val="75000"/>
+                  </a:schemeClr>
+                </a:solidFill>
+              </a:rPr>
+              <a:t>m</a:t>
+            </a:r>
+            <a:r>
+              <a:rPr lang="en-US" sz="2800" u="sng" dirty="0" smtClean="0">
+                <a:solidFill>
+                  <a:schemeClr val="accent1">
+                    <a:lumMod val="75000"/>
+                  </a:schemeClr>
+                </a:solidFill>
+              </a:rPr>
+              <a:t>y messages</a:t>
+            </a:r>
+            <a:endParaRPr lang="en-US" sz="2800" u="sng" dirty="0">
+              <a:solidFill>
+                <a:schemeClr val="accent1">
+                  <a:lumMod val="75000"/>
+                </a:schemeClr>
+              </a:solidFill>
+            </a:endParaRPr>
+          </a:p>
+        </p:txBody>
+      </p:sp>
+      <p:sp>
+        <p:nvSpPr>
+          <p:cNvPr id="19" name="Rectangle 18"/>
+          <p:cNvSpPr/>
+          <p:nvPr/>
+        </p:nvSpPr>
+        <p:spPr>
+          <a:xfrm>
+            <a:off x="4282456" y="1282615"/>
+            <a:ext cx="2550763" cy="523220"/>
+          </a:xfrm>
+          <a:prstGeom prst="rect">
+            <a:avLst/>
+          </a:prstGeom>
+        </p:spPr>
+        <p:txBody>
+          <a:bodyPr wrap="none">
+            <a:spAutoFit/>
+          </a:bodyPr>
+          <a:lstStyle/>
+          <a:p>
+            <a:r>
+              <a:rPr lang="en-US" sz="2800" u="sng" dirty="0">
+                <a:solidFill>
+                  <a:schemeClr val="accent1">
+                    <a:lumMod val="75000"/>
+                  </a:schemeClr>
+                </a:solidFill>
+              </a:rPr>
+              <a:t>p</a:t>
+            </a:r>
+            <a:r>
+              <a:rPr lang="en-US" sz="2800" u="sng" dirty="0" smtClean="0">
+                <a:solidFill>
+                  <a:schemeClr val="accent1">
+                    <a:lumMod val="75000"/>
+                  </a:schemeClr>
+                </a:solidFill>
+              </a:rPr>
+              <a:t>osts </a:t>
+            </a:r>
+            <a:r>
+              <a:rPr lang="en-US" sz="2800" u="sng" smtClean="0">
+                <a:solidFill>
+                  <a:schemeClr val="accent1">
+                    <a:lumMod val="75000"/>
+                  </a:schemeClr>
+                </a:solidFill>
+              </a:rPr>
+              <a:t>for 93010</a:t>
+            </a:r>
+            <a:endParaRPr lang="en-US" sz="2800" u="sng" dirty="0">
+              <a:solidFill>
+                <a:schemeClr val="accent1">
+                  <a:lumMod val="75000"/>
+                </a:schemeClr>
+              </a:solidFill>
+            </a:endParaRPr>
+          </a:p>
+        </p:txBody>
+      </p:sp>
+      <p:sp>
+        <p:nvSpPr>
+          <p:cNvPr id="20" name="Rectangle 19"/>
+          <p:cNvSpPr/>
+          <p:nvPr/>
+        </p:nvSpPr>
+        <p:spPr>
+          <a:xfrm>
+            <a:off x="2162576" y="1250471"/>
+            <a:ext cx="1524200" cy="523220"/>
+          </a:xfrm>
+          <a:prstGeom prst="rect">
+            <a:avLst/>
+          </a:prstGeom>
+        </p:spPr>
+        <p:txBody>
+          <a:bodyPr wrap="none">
+            <a:spAutoFit/>
+          </a:bodyPr>
+          <a:lstStyle/>
+          <a:p>
+            <a:r>
+              <a:rPr lang="en-US" sz="2800" u="sng" dirty="0">
+                <a:solidFill>
+                  <a:schemeClr val="accent1">
+                    <a:lumMod val="75000"/>
+                  </a:schemeClr>
+                </a:solidFill>
+              </a:rPr>
+              <a:t>n</a:t>
+            </a:r>
+            <a:r>
+              <a:rPr lang="en-US" sz="2800" u="sng" dirty="0" smtClean="0">
+                <a:solidFill>
+                  <a:schemeClr val="accent1">
+                    <a:lumMod val="75000"/>
+                  </a:schemeClr>
+                </a:solidFill>
+              </a:rPr>
+              <a:t>ew </a:t>
+            </a:r>
+            <a:r>
+              <a:rPr lang="en-US" sz="2800" u="sng" dirty="0" smtClean="0">
+                <a:solidFill>
+                  <a:schemeClr val="accent1">
+                    <a:lumMod val="75000"/>
+                  </a:schemeClr>
+                </a:solidFill>
+              </a:rPr>
+              <a:t>post</a:t>
+            </a:r>
+            <a:endParaRPr lang="en-US" sz="2800" u="sng" dirty="0">
+              <a:solidFill>
+                <a:schemeClr val="accent1">
+                  <a:lumMod val="75000"/>
+                </a:schemeClr>
+              </a:solidFill>
+            </a:endParaRPr>
           </a:p>
         </p:txBody>
       </p:sp>
     </p:spTree>
     <p:extLst>
       <p:ext uri="{BB962C8B-B14F-4D97-AF65-F5344CB8AC3E}">
-        <p14:creationId xmlns:p14="http://schemas.microsoft.com/office/powerpoint/2010/main" val="824676872"/>
+        <p14:creationId xmlns:p14="http://schemas.microsoft.com/office/powerpoint/2010/main" val="1869086924"/>
       </p:ext>
     </p:extLst>
   </p:cSld>
   <p:clrMapOvr>
     <a:masterClrMapping/>
   </p:clrMapOvr>
-  <p:timing>
-    <p:tnLst>
-      <p:par>
-        <p:cTn id="1" dur="indefinite" restart="never" nodeType="tmRoot"/>
-      </p:par>
-    </p:tnLst>
-  </p:timing>
 </p:sld>
 </file>
 
@@ -7542,40 +9048,1427 @@
           <a:chExt cx="0" cy="0"/>
         </a:xfrm>
       </p:grpSpPr>
-      <p:pic>
-        <p:nvPicPr>
-          <p:cNvPr id="4" name="Picture 3"/>
-          <p:cNvPicPr>
-            <a:picLocks noChangeAspect="1"/>
-          </p:cNvPicPr>
-          <p:nvPr/>
-        </p:nvPicPr>
-        <p:blipFill>
-          <a:blip r:embed="rId2">
-            <a:extLst>
-              <a:ext uri="{28A0092B-C50C-407E-A947-70E740481C1C}">
-                <a14:useLocalDpi xmlns:a14="http://schemas.microsoft.com/office/drawing/2010/main" val="0"/>
-              </a:ext>
-            </a:extLst>
-          </a:blip>
-          <a:stretch>
-            <a:fillRect/>
-          </a:stretch>
-        </p:blipFill>
-        <p:spPr>
-          <a:xfrm>
-            <a:off x="1553029" y="1"/>
-            <a:ext cx="9144000" cy="6858000"/>
-          </a:xfrm>
-          <a:prstGeom prst="rect">
-            <a:avLst/>
-          </a:prstGeom>
-        </p:spPr>
-      </p:pic>
+      <p:sp>
+        <p:nvSpPr>
+          <p:cNvPr id="4" name="Rectangle 3"/>
+          <p:cNvSpPr/>
+          <p:nvPr/>
+        </p:nvSpPr>
+        <p:spPr>
+          <a:xfrm>
+            <a:off x="654256" y="291130"/>
+            <a:ext cx="10747169" cy="6181106"/>
+          </a:xfrm>
+          <a:prstGeom prst="rect">
+            <a:avLst/>
+          </a:prstGeom>
+          <a:gradFill flip="none" rotWithShape="1">
+            <a:gsLst>
+              <a:gs pos="83000">
+                <a:schemeClr val="bg1">
+                  <a:lumMod val="95000"/>
+                </a:schemeClr>
+              </a:gs>
+              <a:gs pos="100000">
+                <a:schemeClr val="accent6">
+                  <a:lumMod val="40000"/>
+                  <a:lumOff val="60000"/>
+                </a:schemeClr>
+              </a:gs>
+            </a:gsLst>
+            <a:path path="shape">
+              <a:fillToRect l="50000" t="50000" r="50000" b="50000"/>
+            </a:path>
+            <a:tileRect/>
+          </a:gradFill>
+        </p:spPr>
+        <p:style>
+          <a:lnRef idx="2">
+            <a:schemeClr val="accent1">
+              <a:shade val="50000"/>
+            </a:schemeClr>
+          </a:lnRef>
+          <a:fillRef idx="1">
+            <a:schemeClr val="accent1"/>
+          </a:fillRef>
+          <a:effectRef idx="0">
+            <a:schemeClr val="accent1"/>
+          </a:effectRef>
+          <a:fontRef idx="minor">
+            <a:schemeClr val="lt1"/>
+          </a:fontRef>
+        </p:style>
+        <p:txBody>
+          <a:bodyPr rtlCol="0" anchor="ctr"/>
+          <a:lstStyle/>
+          <a:p>
+            <a:pPr algn="ctr"/>
+            <a:endParaRPr lang="en-US" dirty="0">
+              <a:solidFill>
+                <a:srgbClr val="EEB403"/>
+              </a:solidFill>
+            </a:endParaRPr>
+          </a:p>
+        </p:txBody>
+      </p:sp>
+      <p:sp>
+        <p:nvSpPr>
+          <p:cNvPr id="5" name="TextBox 4"/>
+          <p:cNvSpPr txBox="1"/>
+          <p:nvPr/>
+        </p:nvSpPr>
+        <p:spPr>
+          <a:xfrm>
+            <a:off x="4993480" y="652926"/>
+            <a:ext cx="2128838" cy="369332"/>
+          </a:xfrm>
+          <a:prstGeom prst="rect">
+            <a:avLst/>
+          </a:prstGeom>
+          <a:noFill/>
+        </p:spPr>
+        <p:txBody>
+          <a:bodyPr wrap="square" rtlCol="0">
+            <a:spAutoFit/>
+          </a:bodyPr>
+          <a:lstStyle/>
+          <a:p>
+            <a:pPr algn="ctr"/>
+            <a:r>
+              <a:rPr lang="en-US" dirty="0" smtClean="0">
+                <a:solidFill>
+                  <a:schemeClr val="accent1">
+                    <a:lumMod val="75000"/>
+                  </a:schemeClr>
+                </a:solidFill>
+              </a:rPr>
+              <a:t>WELCOME ANDREW</a:t>
+            </a:r>
+            <a:r>
+              <a:rPr lang="en-US" dirty="0" smtClean="0"/>
+              <a:t> </a:t>
+            </a:r>
+            <a:endParaRPr lang="en-US" dirty="0"/>
+          </a:p>
+        </p:txBody>
+      </p:sp>
+      <p:sp>
+        <p:nvSpPr>
+          <p:cNvPr id="6" name="TextBox 5"/>
+          <p:cNvSpPr txBox="1"/>
+          <p:nvPr/>
+        </p:nvSpPr>
+        <p:spPr>
+          <a:xfrm>
+            <a:off x="9142981" y="653626"/>
+            <a:ext cx="947737" cy="369332"/>
+          </a:xfrm>
+          <a:prstGeom prst="rect">
+            <a:avLst/>
+          </a:prstGeom>
+          <a:noFill/>
+        </p:spPr>
+        <p:txBody>
+          <a:bodyPr wrap="square" rtlCol="0">
+            <a:spAutoFit/>
+          </a:bodyPr>
+          <a:lstStyle/>
+          <a:p>
+            <a:pPr algn="ctr"/>
+            <a:r>
+              <a:rPr lang="en-US" u="sng" smtClean="0">
+                <a:solidFill>
+                  <a:schemeClr val="accent1">
+                    <a:lumMod val="75000"/>
+                  </a:schemeClr>
+                </a:solidFill>
+              </a:rPr>
+              <a:t>ABOUT</a:t>
+            </a:r>
+            <a:r>
+              <a:rPr lang="en-US" u="sng" smtClean="0"/>
+              <a:t> </a:t>
+            </a:r>
+            <a:endParaRPr lang="en-US" u="sng" dirty="0"/>
+          </a:p>
+        </p:txBody>
+      </p:sp>
+      <p:sp>
+        <p:nvSpPr>
+          <p:cNvPr id="7" name="TextBox 6"/>
+          <p:cNvSpPr txBox="1"/>
+          <p:nvPr/>
+        </p:nvSpPr>
+        <p:spPr>
+          <a:xfrm>
+            <a:off x="570052" y="2694695"/>
+            <a:ext cx="10504348" cy="461665"/>
+          </a:xfrm>
+          <a:prstGeom prst="rect">
+            <a:avLst/>
+          </a:prstGeom>
+          <a:noFill/>
+        </p:spPr>
+        <p:txBody>
+          <a:bodyPr wrap="square" rtlCol="0">
+            <a:spAutoFit/>
+          </a:bodyPr>
+          <a:lstStyle/>
+          <a:p>
+            <a:r>
+              <a:rPr lang="en-US" sz="2400" b="1" dirty="0" smtClean="0"/>
+              <a:t>	</a:t>
+            </a:r>
+            <a:r>
+              <a:rPr lang="en-US" sz="2400" b="1" dirty="0" smtClean="0"/>
+              <a:t>message</a:t>
+            </a:r>
+            <a:r>
+              <a:rPr lang="en-US" sz="2400" b="1" dirty="0" smtClean="0"/>
+              <a:t> date</a:t>
+            </a:r>
+            <a:r>
+              <a:rPr lang="en-US" sz="2400" b="1" dirty="0" smtClean="0"/>
+              <a:t>	</a:t>
+            </a:r>
+            <a:r>
+              <a:rPr lang="en-US" sz="2400" b="1" dirty="0" smtClean="0"/>
+              <a:t>       message time      message to    message from    </a:t>
+            </a:r>
+            <a:r>
+              <a:rPr lang="en-US" sz="2400" b="1" dirty="0" smtClean="0"/>
+              <a:t>		 </a:t>
+            </a:r>
+            <a:endParaRPr lang="en-US" sz="2400" b="1" dirty="0"/>
+          </a:p>
+        </p:txBody>
+      </p:sp>
+      <p:sp>
+        <p:nvSpPr>
+          <p:cNvPr id="8" name="TextBox 7"/>
+          <p:cNvSpPr txBox="1"/>
+          <p:nvPr/>
+        </p:nvSpPr>
+        <p:spPr>
+          <a:xfrm>
+            <a:off x="570052" y="3332270"/>
+            <a:ext cx="11012348" cy="646331"/>
+          </a:xfrm>
+          <a:prstGeom prst="rect">
+            <a:avLst/>
+          </a:prstGeom>
+          <a:noFill/>
+        </p:spPr>
+        <p:txBody>
+          <a:bodyPr wrap="square" rtlCol="0">
+            <a:spAutoFit/>
+          </a:bodyPr>
+          <a:lstStyle/>
+          <a:p>
+            <a:r>
+              <a:rPr lang="en-US" dirty="0" smtClean="0"/>
+              <a:t>	</a:t>
+            </a:r>
+            <a:r>
+              <a:rPr lang="en-US" dirty="0" smtClean="0"/>
+              <a:t>10/25/2016</a:t>
+            </a:r>
+            <a:r>
+              <a:rPr lang="en-US" dirty="0" smtClean="0"/>
+              <a:t>	</a:t>
+            </a:r>
+            <a:r>
+              <a:rPr lang="en-US" dirty="0" smtClean="0"/>
+              <a:t>          5:01pm           		kwood28	                                                       </a:t>
+            </a:r>
+            <a:r>
+              <a:rPr lang="en-US" u="sng" dirty="0" smtClean="0">
+                <a:solidFill>
+                  <a:schemeClr val="accent1">
+                    <a:lumMod val="75000"/>
+                  </a:schemeClr>
+                </a:solidFill>
+              </a:rPr>
+              <a:t>view message</a:t>
+            </a:r>
+            <a:r>
+              <a:rPr lang="en-US" dirty="0" smtClean="0">
+                <a:solidFill>
+                  <a:schemeClr val="accent1">
+                    <a:lumMod val="75000"/>
+                  </a:schemeClr>
+                </a:solidFill>
+              </a:rPr>
+              <a:t>     </a:t>
+            </a:r>
+            <a:endParaRPr lang="en-US" u="sng" dirty="0" smtClean="0">
+              <a:solidFill>
+                <a:schemeClr val="accent1">
+                  <a:lumMod val="75000"/>
+                </a:schemeClr>
+              </a:solidFill>
+            </a:endParaRPr>
+          </a:p>
+          <a:p>
+            <a:r>
+              <a:rPr lang="en-US" dirty="0" smtClean="0"/>
+              <a:t>				            			 </a:t>
+            </a:r>
+            <a:endParaRPr lang="en-US" dirty="0"/>
+          </a:p>
+        </p:txBody>
+      </p:sp>
+      <p:sp>
+        <p:nvSpPr>
+          <p:cNvPr id="9" name="TextBox 8"/>
+          <p:cNvSpPr txBox="1"/>
+          <p:nvPr/>
+        </p:nvSpPr>
+        <p:spPr>
+          <a:xfrm>
+            <a:off x="570051" y="4055245"/>
+            <a:ext cx="10831373" cy="646331"/>
+          </a:xfrm>
+          <a:prstGeom prst="rect">
+            <a:avLst/>
+          </a:prstGeom>
+          <a:noFill/>
+        </p:spPr>
+        <p:txBody>
+          <a:bodyPr wrap="square" rtlCol="0">
+            <a:spAutoFit/>
+          </a:bodyPr>
+          <a:lstStyle/>
+          <a:p>
+            <a:r>
+              <a:rPr lang="en-US" dirty="0" smtClean="0"/>
+              <a:t> </a:t>
+            </a:r>
+            <a:r>
+              <a:rPr lang="en-US" dirty="0" smtClean="0"/>
+              <a:t>	</a:t>
+            </a:r>
+            <a:r>
+              <a:rPr lang="en-US" dirty="0" smtClean="0"/>
+              <a:t>10/24/2016	          5:08pm 	            	kwood28	                                                        </a:t>
+            </a:r>
+            <a:r>
+              <a:rPr lang="en-US" u="sng" dirty="0" smtClean="0">
+                <a:solidFill>
+                  <a:schemeClr val="accent1">
+                    <a:lumMod val="75000"/>
+                  </a:schemeClr>
+                </a:solidFill>
+              </a:rPr>
+              <a:t>view message</a:t>
+            </a:r>
+            <a:r>
+              <a:rPr lang="en-US" dirty="0" smtClean="0">
+                <a:solidFill>
+                  <a:schemeClr val="accent1">
+                    <a:lumMod val="75000"/>
+                  </a:schemeClr>
+                </a:solidFill>
+              </a:rPr>
+              <a:t> </a:t>
+            </a:r>
+            <a:endParaRPr lang="en-US" dirty="0" smtClean="0"/>
+          </a:p>
+          <a:p>
+            <a:r>
+              <a:rPr lang="en-US" dirty="0"/>
+              <a:t>	</a:t>
+            </a:r>
+            <a:r>
+              <a:rPr lang="en-US" dirty="0" smtClean="0"/>
+              <a:t>			</a:t>
+            </a:r>
+            <a:r>
+              <a:rPr lang="en-US" dirty="0" smtClean="0"/>
+              <a:t>			 </a:t>
+            </a:r>
+            <a:endParaRPr lang="en-US" dirty="0"/>
+          </a:p>
+        </p:txBody>
+      </p:sp>
+      <p:sp>
+        <p:nvSpPr>
+          <p:cNvPr id="10" name="TextBox 9"/>
+          <p:cNvSpPr txBox="1"/>
+          <p:nvPr/>
+        </p:nvSpPr>
+        <p:spPr>
+          <a:xfrm>
+            <a:off x="570052" y="4786373"/>
+            <a:ext cx="10831372" cy="646331"/>
+          </a:xfrm>
+          <a:prstGeom prst="rect">
+            <a:avLst/>
+          </a:prstGeom>
+          <a:noFill/>
+        </p:spPr>
+        <p:txBody>
+          <a:bodyPr wrap="square" rtlCol="0">
+            <a:spAutoFit/>
+          </a:bodyPr>
+          <a:lstStyle/>
+          <a:p>
+            <a:r>
+              <a:rPr lang="en-US" dirty="0" smtClean="0"/>
+              <a:t> </a:t>
+            </a:r>
+            <a:r>
+              <a:rPr lang="en-US" dirty="0" smtClean="0"/>
+              <a:t>	</a:t>
+            </a:r>
+            <a:r>
+              <a:rPr lang="en-US" dirty="0" smtClean="0"/>
+              <a:t>10/23/2016	         5:10pm       		                                mwong50                        </a:t>
+            </a:r>
+            <a:r>
+              <a:rPr lang="en-US" u="sng" dirty="0" smtClean="0">
+                <a:solidFill>
+                  <a:schemeClr val="accent1">
+                    <a:lumMod val="75000"/>
+                  </a:schemeClr>
+                </a:solidFill>
+              </a:rPr>
+              <a:t>view </a:t>
+            </a:r>
+            <a:r>
+              <a:rPr lang="en-US" u="sng" dirty="0">
+                <a:solidFill>
+                  <a:schemeClr val="accent1">
+                    <a:lumMod val="75000"/>
+                  </a:schemeClr>
+                </a:solidFill>
+              </a:rPr>
+              <a:t>message</a:t>
+            </a:r>
+            <a:r>
+              <a:rPr lang="en-US" dirty="0">
+                <a:solidFill>
+                  <a:schemeClr val="accent1">
+                    <a:lumMod val="75000"/>
+                  </a:schemeClr>
+                </a:solidFill>
+              </a:rPr>
+              <a:t> </a:t>
+            </a:r>
+            <a:endParaRPr lang="en-US" u="sng" dirty="0" smtClean="0">
+              <a:solidFill>
+                <a:schemeClr val="accent1">
+                  <a:lumMod val="75000"/>
+                </a:schemeClr>
+              </a:solidFill>
+            </a:endParaRPr>
+          </a:p>
+          <a:p>
+            <a:r>
+              <a:rPr lang="en-US" dirty="0" smtClean="0"/>
+              <a:t>				</a:t>
+            </a:r>
+            <a:endParaRPr lang="en-US" dirty="0"/>
+          </a:p>
+        </p:txBody>
+      </p:sp>
+      <p:sp>
+        <p:nvSpPr>
+          <p:cNvPr id="11" name="Rectangle 10"/>
+          <p:cNvSpPr/>
+          <p:nvPr/>
+        </p:nvSpPr>
+        <p:spPr>
+          <a:xfrm>
+            <a:off x="457383" y="465647"/>
+            <a:ext cx="4514667" cy="646331"/>
+          </a:xfrm>
+          <a:prstGeom prst="rect">
+            <a:avLst/>
+          </a:prstGeom>
+          <a:noFill/>
+        </p:spPr>
+        <p:txBody>
+          <a:bodyPr wrap="square" lIns="91440" tIns="45720" rIns="91440" bIns="45720">
+            <a:spAutoFit/>
+          </a:bodyPr>
+          <a:lstStyle/>
+          <a:p>
+            <a:pPr algn="ctr"/>
+            <a:r>
+              <a:rPr lang="en-US" sz="3600" dirty="0" err="1">
+                <a:ln w="0"/>
+                <a:solidFill>
+                  <a:schemeClr val="accent6">
+                    <a:lumMod val="50000"/>
+                  </a:schemeClr>
+                </a:solidFill>
+                <a:effectLst>
+                  <a:outerShdw blurRad="38100" dist="19050" dir="2700000" algn="tl" rotWithShape="0">
+                    <a:schemeClr val="dk1">
+                      <a:alpha val="40000"/>
+                    </a:schemeClr>
+                  </a:outerShdw>
+                </a:effectLst>
+              </a:rPr>
+              <a:t>p</a:t>
+            </a:r>
+            <a:r>
+              <a:rPr lang="en-US" sz="3600" b="0" cap="none" spc="0" dirty="0" err="1" smtClean="0">
+                <a:ln w="0"/>
+                <a:solidFill>
+                  <a:schemeClr val="accent6">
+                    <a:lumMod val="50000"/>
+                  </a:schemeClr>
+                </a:solidFill>
+                <a:effectLst>
+                  <a:outerShdw blurRad="38100" dist="19050" dir="2700000" algn="tl" rotWithShape="0">
+                    <a:schemeClr val="dk1">
+                      <a:alpha val="40000"/>
+                    </a:schemeClr>
+                  </a:outerShdw>
+                </a:effectLst>
+              </a:rPr>
+              <a:t>roduswap.org</a:t>
+            </a:r>
+            <a:endParaRPr lang="en-US" sz="3600" b="0" cap="none" spc="0" dirty="0">
+              <a:ln w="0"/>
+              <a:solidFill>
+                <a:schemeClr val="accent6">
+                  <a:lumMod val="50000"/>
+                </a:schemeClr>
+              </a:solidFill>
+              <a:effectLst>
+                <a:outerShdw blurRad="38100" dist="19050" dir="2700000" algn="tl" rotWithShape="0">
+                  <a:schemeClr val="dk1">
+                    <a:alpha val="40000"/>
+                  </a:schemeClr>
+                </a:outerShdw>
+              </a:effectLst>
+            </a:endParaRPr>
+          </a:p>
+        </p:txBody>
+      </p:sp>
+      <p:sp>
+        <p:nvSpPr>
+          <p:cNvPr id="12" name="TextBox 11"/>
+          <p:cNvSpPr txBox="1"/>
+          <p:nvPr/>
+        </p:nvSpPr>
+        <p:spPr>
+          <a:xfrm>
+            <a:off x="8273145" y="639112"/>
+            <a:ext cx="947737" cy="369332"/>
+          </a:xfrm>
+          <a:prstGeom prst="rect">
+            <a:avLst/>
+          </a:prstGeom>
+          <a:noFill/>
+        </p:spPr>
+        <p:txBody>
+          <a:bodyPr wrap="square" rtlCol="0">
+            <a:spAutoFit/>
+          </a:bodyPr>
+          <a:lstStyle/>
+          <a:p>
+            <a:pPr algn="ctr"/>
+            <a:r>
+              <a:rPr lang="en-US" u="sng" dirty="0" smtClean="0">
+                <a:solidFill>
+                  <a:schemeClr val="accent1">
+                    <a:lumMod val="75000"/>
+                  </a:schemeClr>
+                </a:solidFill>
+              </a:rPr>
+              <a:t>HOME</a:t>
+            </a:r>
+            <a:r>
+              <a:rPr lang="en-US" u="sng" dirty="0" smtClean="0"/>
+              <a:t> </a:t>
+            </a:r>
+            <a:endParaRPr lang="en-US" u="sng" dirty="0"/>
+          </a:p>
+        </p:txBody>
+      </p:sp>
+      <p:sp>
+        <p:nvSpPr>
+          <p:cNvPr id="13" name="Rectangle 12"/>
+          <p:cNvSpPr/>
+          <p:nvPr/>
+        </p:nvSpPr>
+        <p:spPr>
+          <a:xfrm>
+            <a:off x="8131378" y="1154639"/>
+            <a:ext cx="1485471" cy="523220"/>
+          </a:xfrm>
+          <a:prstGeom prst="rect">
+            <a:avLst/>
+          </a:prstGeom>
+        </p:spPr>
+        <p:txBody>
+          <a:bodyPr wrap="none">
+            <a:spAutoFit/>
+          </a:bodyPr>
+          <a:lstStyle/>
+          <a:p>
+            <a:r>
+              <a:rPr lang="en-US" sz="2800" u="sng" dirty="0">
+                <a:solidFill>
+                  <a:schemeClr val="accent1">
+                    <a:lumMod val="75000"/>
+                  </a:schemeClr>
+                </a:solidFill>
+              </a:rPr>
+              <a:t>m</a:t>
+            </a:r>
+            <a:r>
+              <a:rPr lang="en-US" sz="2800" u="sng" dirty="0" smtClean="0">
+                <a:solidFill>
+                  <a:schemeClr val="accent1">
+                    <a:lumMod val="75000"/>
+                  </a:schemeClr>
+                </a:solidFill>
+              </a:rPr>
+              <a:t>y posts</a:t>
+            </a:r>
+            <a:endParaRPr lang="en-US" sz="2800" u="sng" dirty="0">
+              <a:solidFill>
+                <a:schemeClr val="accent1">
+                  <a:lumMod val="75000"/>
+                </a:schemeClr>
+              </a:solidFill>
+            </a:endParaRPr>
+          </a:p>
+        </p:txBody>
+      </p:sp>
+      <p:sp>
+        <p:nvSpPr>
+          <p:cNvPr id="14" name="TextBox 13"/>
+          <p:cNvSpPr txBox="1"/>
+          <p:nvPr/>
+        </p:nvSpPr>
+        <p:spPr>
+          <a:xfrm>
+            <a:off x="10090718" y="641012"/>
+            <a:ext cx="1310707" cy="369332"/>
+          </a:xfrm>
+          <a:prstGeom prst="rect">
+            <a:avLst/>
+          </a:prstGeom>
+          <a:noFill/>
+        </p:spPr>
+        <p:txBody>
+          <a:bodyPr wrap="square" rtlCol="0">
+            <a:spAutoFit/>
+          </a:bodyPr>
+          <a:lstStyle/>
+          <a:p>
+            <a:pPr algn="ctr"/>
+            <a:r>
+              <a:rPr lang="en-US" u="sng" smtClean="0">
+                <a:solidFill>
+                  <a:schemeClr val="accent1">
+                    <a:lumMod val="75000"/>
+                  </a:schemeClr>
+                </a:solidFill>
+              </a:rPr>
+              <a:t>MY PROFILE</a:t>
+            </a:r>
+            <a:r>
+              <a:rPr lang="en-US" u="sng" smtClean="0"/>
+              <a:t> </a:t>
+            </a:r>
+            <a:endParaRPr lang="en-US" u="sng" dirty="0"/>
+          </a:p>
+        </p:txBody>
+      </p:sp>
+      <p:sp>
+        <p:nvSpPr>
+          <p:cNvPr id="15" name="Rectangle 14"/>
+          <p:cNvSpPr/>
+          <p:nvPr/>
+        </p:nvSpPr>
+        <p:spPr>
+          <a:xfrm>
+            <a:off x="1406776" y="2113625"/>
+            <a:ext cx="1917576" cy="461665"/>
+          </a:xfrm>
+          <a:prstGeom prst="rect">
+            <a:avLst/>
+          </a:prstGeom>
+        </p:spPr>
+        <p:txBody>
+          <a:bodyPr wrap="none">
+            <a:spAutoFit/>
+          </a:bodyPr>
+          <a:lstStyle/>
+          <a:p>
+            <a:r>
+              <a:rPr lang="en-US" sz="2400" u="sng" dirty="0">
+                <a:solidFill>
+                  <a:schemeClr val="accent1">
+                    <a:lumMod val="75000"/>
+                  </a:schemeClr>
+                </a:solidFill>
+              </a:rPr>
+              <a:t>m</a:t>
+            </a:r>
+            <a:r>
+              <a:rPr lang="en-US" sz="2400" u="sng" dirty="0" smtClean="0">
+                <a:solidFill>
+                  <a:schemeClr val="accent1">
+                    <a:lumMod val="75000"/>
+                  </a:schemeClr>
+                </a:solidFill>
+              </a:rPr>
+              <a:t>y messages:</a:t>
+            </a:r>
+            <a:endParaRPr lang="en-US" sz="2400" u="sng" dirty="0">
+              <a:solidFill>
+                <a:schemeClr val="accent1">
+                  <a:lumMod val="75000"/>
+                </a:schemeClr>
+              </a:solidFill>
+            </a:endParaRPr>
+          </a:p>
+        </p:txBody>
+      </p:sp>
+      <p:sp>
+        <p:nvSpPr>
+          <p:cNvPr id="16" name="Rectangle 15"/>
+          <p:cNvSpPr/>
+          <p:nvPr/>
+        </p:nvSpPr>
+        <p:spPr>
+          <a:xfrm>
+            <a:off x="4972050" y="1209038"/>
+            <a:ext cx="2550763" cy="523220"/>
+          </a:xfrm>
+          <a:prstGeom prst="rect">
+            <a:avLst/>
+          </a:prstGeom>
+        </p:spPr>
+        <p:txBody>
+          <a:bodyPr wrap="none">
+            <a:spAutoFit/>
+          </a:bodyPr>
+          <a:lstStyle/>
+          <a:p>
+            <a:r>
+              <a:rPr lang="en-US" sz="2800" u="sng" dirty="0">
+                <a:solidFill>
+                  <a:schemeClr val="accent1">
+                    <a:lumMod val="75000"/>
+                  </a:schemeClr>
+                </a:solidFill>
+              </a:rPr>
+              <a:t>p</a:t>
+            </a:r>
+            <a:r>
+              <a:rPr lang="en-US" sz="2800" u="sng" dirty="0" smtClean="0">
+                <a:solidFill>
+                  <a:schemeClr val="accent1">
+                    <a:lumMod val="75000"/>
+                  </a:schemeClr>
+                </a:solidFill>
+              </a:rPr>
+              <a:t>osts </a:t>
+            </a:r>
+            <a:r>
+              <a:rPr lang="en-US" sz="2800" u="sng" smtClean="0">
+                <a:solidFill>
+                  <a:schemeClr val="accent1">
+                    <a:lumMod val="75000"/>
+                  </a:schemeClr>
+                </a:solidFill>
+              </a:rPr>
+              <a:t>for 93010</a:t>
+            </a:r>
+            <a:endParaRPr lang="en-US" sz="2800" u="sng" dirty="0">
+              <a:solidFill>
+                <a:schemeClr val="accent1">
+                  <a:lumMod val="75000"/>
+                </a:schemeClr>
+              </a:solidFill>
+            </a:endParaRPr>
+          </a:p>
+        </p:txBody>
+      </p:sp>
+      <p:sp>
+        <p:nvSpPr>
+          <p:cNvPr id="17" name="Rectangle 16"/>
+          <p:cNvSpPr/>
+          <p:nvPr/>
+        </p:nvSpPr>
+        <p:spPr>
+          <a:xfrm>
+            <a:off x="2918809" y="1208338"/>
+            <a:ext cx="1524200" cy="523220"/>
+          </a:xfrm>
+          <a:prstGeom prst="rect">
+            <a:avLst/>
+          </a:prstGeom>
+        </p:spPr>
+        <p:txBody>
+          <a:bodyPr wrap="none">
+            <a:spAutoFit/>
+          </a:bodyPr>
+          <a:lstStyle/>
+          <a:p>
+            <a:r>
+              <a:rPr lang="en-US" sz="2800" u="sng" dirty="0">
+                <a:solidFill>
+                  <a:schemeClr val="accent1">
+                    <a:lumMod val="75000"/>
+                  </a:schemeClr>
+                </a:solidFill>
+              </a:rPr>
+              <a:t>n</a:t>
+            </a:r>
+            <a:r>
+              <a:rPr lang="en-US" sz="2800" u="sng" dirty="0" smtClean="0">
+                <a:solidFill>
+                  <a:schemeClr val="accent1">
+                    <a:lumMod val="75000"/>
+                  </a:schemeClr>
+                </a:solidFill>
+              </a:rPr>
+              <a:t>ew </a:t>
+            </a:r>
+            <a:r>
+              <a:rPr lang="en-US" sz="2800" u="sng" dirty="0" smtClean="0">
+                <a:solidFill>
+                  <a:schemeClr val="accent1">
+                    <a:lumMod val="75000"/>
+                  </a:schemeClr>
+                </a:solidFill>
+              </a:rPr>
+              <a:t>post</a:t>
+            </a:r>
+            <a:endParaRPr lang="en-US" sz="2800" u="sng" dirty="0">
+              <a:solidFill>
+                <a:schemeClr val="accent1">
+                  <a:lumMod val="75000"/>
+                </a:schemeClr>
+              </a:solidFill>
+            </a:endParaRPr>
+          </a:p>
+        </p:txBody>
+      </p:sp>
     </p:spTree>
     <p:extLst>
       <p:ext uri="{BB962C8B-B14F-4D97-AF65-F5344CB8AC3E}">
-        <p14:creationId xmlns:p14="http://schemas.microsoft.com/office/powerpoint/2010/main" val="1998744901"/>
+        <p14:creationId xmlns:p14="http://schemas.microsoft.com/office/powerpoint/2010/main" val="2070080732"/>
+      </p:ext>
+    </p:extLst>
+  </p:cSld>
+  <p:clrMapOvr>
+    <a:masterClrMapping/>
+  </p:clrMapOvr>
+</p:sld>
+</file>
+
+<file path=ppt/slides/slide9.xml><?xml version="1.0" encoding="utf-8"?>
+<p:sld xmlns:a="http://schemas.openxmlformats.org/drawingml/2006/main" xmlns:r="http://schemas.openxmlformats.org/officeDocument/2006/relationships" xmlns:p="http://schemas.openxmlformats.org/presentationml/2006/main">
+  <p:cSld>
+    <p:spTree>
+      <p:nvGrpSpPr>
+        <p:cNvPr id="1" name=""/>
+        <p:cNvGrpSpPr/>
+        <p:nvPr/>
+      </p:nvGrpSpPr>
+      <p:grpSpPr>
+        <a:xfrm>
+          <a:off x="0" y="0"/>
+          <a:ext cx="0" cy="0"/>
+          <a:chOff x="0" y="0"/>
+          <a:chExt cx="0" cy="0"/>
+        </a:xfrm>
+      </p:grpSpPr>
+      <p:sp>
+        <p:nvSpPr>
+          <p:cNvPr id="4" name="Rectangle 3"/>
+          <p:cNvSpPr/>
+          <p:nvPr/>
+        </p:nvSpPr>
+        <p:spPr>
+          <a:xfrm>
+            <a:off x="654256" y="291130"/>
+            <a:ext cx="10747169" cy="6181106"/>
+          </a:xfrm>
+          <a:prstGeom prst="rect">
+            <a:avLst/>
+          </a:prstGeom>
+          <a:gradFill flip="none" rotWithShape="1">
+            <a:gsLst>
+              <a:gs pos="83000">
+                <a:schemeClr val="bg1">
+                  <a:lumMod val="95000"/>
+                </a:schemeClr>
+              </a:gs>
+              <a:gs pos="100000">
+                <a:schemeClr val="accent6">
+                  <a:lumMod val="40000"/>
+                  <a:lumOff val="60000"/>
+                </a:schemeClr>
+              </a:gs>
+            </a:gsLst>
+            <a:path path="shape">
+              <a:fillToRect l="50000" t="50000" r="50000" b="50000"/>
+            </a:path>
+            <a:tileRect/>
+          </a:gradFill>
+        </p:spPr>
+        <p:style>
+          <a:lnRef idx="2">
+            <a:schemeClr val="accent1">
+              <a:shade val="50000"/>
+            </a:schemeClr>
+          </a:lnRef>
+          <a:fillRef idx="1">
+            <a:schemeClr val="accent1"/>
+          </a:fillRef>
+          <a:effectRef idx="0">
+            <a:schemeClr val="accent1"/>
+          </a:effectRef>
+          <a:fontRef idx="minor">
+            <a:schemeClr val="lt1"/>
+          </a:fontRef>
+        </p:style>
+        <p:txBody>
+          <a:bodyPr rtlCol="0" anchor="ctr"/>
+          <a:lstStyle/>
+          <a:p>
+            <a:pPr algn="ctr"/>
+            <a:endParaRPr lang="en-US" dirty="0">
+              <a:solidFill>
+                <a:srgbClr val="EEB403"/>
+              </a:solidFill>
+            </a:endParaRPr>
+          </a:p>
+        </p:txBody>
+      </p:sp>
+      <p:sp>
+        <p:nvSpPr>
+          <p:cNvPr id="5" name="Rectangle 4"/>
+          <p:cNvSpPr/>
+          <p:nvPr/>
+        </p:nvSpPr>
+        <p:spPr>
+          <a:xfrm>
+            <a:off x="3120571" y="498294"/>
+            <a:ext cx="5927292" cy="5297716"/>
+          </a:xfrm>
+          <a:prstGeom prst="rect">
+            <a:avLst/>
+          </a:prstGeom>
+          <a:solidFill>
+            <a:schemeClr val="accent6">
+              <a:lumMod val="20000"/>
+              <a:lumOff val="80000"/>
+            </a:schemeClr>
+          </a:solidFill>
+        </p:spPr>
+        <p:style>
+          <a:lnRef idx="2">
+            <a:schemeClr val="accent1">
+              <a:shade val="50000"/>
+            </a:schemeClr>
+          </a:lnRef>
+          <a:fillRef idx="1">
+            <a:schemeClr val="accent1"/>
+          </a:fillRef>
+          <a:effectRef idx="0">
+            <a:schemeClr val="accent1"/>
+          </a:effectRef>
+          <a:fontRef idx="minor">
+            <a:schemeClr val="lt1"/>
+          </a:fontRef>
+        </p:style>
+        <p:txBody>
+          <a:bodyPr rtlCol="0" anchor="ctr"/>
+          <a:lstStyle/>
+          <a:p>
+            <a:pPr algn="ctr"/>
+            <a:endParaRPr lang="en-US"/>
+          </a:p>
+        </p:txBody>
+      </p:sp>
+      <p:sp>
+        <p:nvSpPr>
+          <p:cNvPr id="6" name="TextBox 5"/>
+          <p:cNvSpPr txBox="1"/>
+          <p:nvPr/>
+        </p:nvSpPr>
+        <p:spPr>
+          <a:xfrm>
+            <a:off x="3816742" y="624113"/>
+            <a:ext cx="4422195" cy="707886"/>
+          </a:xfrm>
+          <a:prstGeom prst="rect">
+            <a:avLst/>
+          </a:prstGeom>
+          <a:noFill/>
+        </p:spPr>
+        <p:txBody>
+          <a:bodyPr wrap="square" rtlCol="0">
+            <a:spAutoFit/>
+          </a:bodyPr>
+          <a:lstStyle/>
+          <a:p>
+            <a:pPr algn="ctr"/>
+            <a:r>
+              <a:rPr lang="en-US" sz="4000" dirty="0" smtClean="0">
+                <a:solidFill>
+                  <a:schemeClr val="accent1">
+                    <a:lumMod val="75000"/>
+                  </a:schemeClr>
+                </a:solidFill>
+              </a:rPr>
+              <a:t>Rate Swap</a:t>
+            </a:r>
+            <a:endParaRPr lang="en-US" sz="4000" dirty="0"/>
+          </a:p>
+        </p:txBody>
+      </p:sp>
+      <p:sp>
+        <p:nvSpPr>
+          <p:cNvPr id="7" name="TextBox 6"/>
+          <p:cNvSpPr txBox="1"/>
+          <p:nvPr/>
+        </p:nvSpPr>
+        <p:spPr>
+          <a:xfrm>
+            <a:off x="4427143" y="1854493"/>
+            <a:ext cx="4499142" cy="2585323"/>
+          </a:xfrm>
+          <a:prstGeom prst="rect">
+            <a:avLst/>
+          </a:prstGeom>
+          <a:noFill/>
+        </p:spPr>
+        <p:txBody>
+          <a:bodyPr wrap="square" rtlCol="0">
+            <a:spAutoFit/>
+          </a:bodyPr>
+          <a:lstStyle/>
+          <a:p>
+            <a:pPr marL="342900" indent="-342900">
+              <a:buAutoNum type="arabicPeriod"/>
+            </a:pPr>
+            <a:r>
+              <a:rPr lang="en-US" dirty="0" smtClean="0"/>
+              <a:t>Swapper was on time.  </a:t>
+            </a:r>
+          </a:p>
+          <a:p>
+            <a:pPr marL="342900" indent="-342900">
+              <a:buAutoNum type="arabicPeriod"/>
+            </a:pPr>
+            <a:endParaRPr lang="en-US" dirty="0"/>
+          </a:p>
+          <a:p>
+            <a:pPr marL="342900" indent="-342900">
+              <a:buAutoNum type="arabicPeriod"/>
+            </a:pPr>
+            <a:r>
+              <a:rPr lang="en-US" dirty="0" smtClean="0"/>
+              <a:t>Swapper was kind.</a:t>
+            </a:r>
+          </a:p>
+          <a:p>
+            <a:pPr marL="342900" indent="-342900">
+              <a:buAutoNum type="arabicPeriod"/>
+            </a:pPr>
+            <a:endParaRPr lang="en-US" dirty="0" smtClean="0"/>
+          </a:p>
+          <a:p>
+            <a:pPr marL="342900" indent="-342900">
+              <a:buAutoNum type="arabicPeriod"/>
+            </a:pPr>
+            <a:r>
+              <a:rPr lang="en-US" dirty="0" smtClean="0"/>
+              <a:t>Produce was high quality.</a:t>
+            </a:r>
+          </a:p>
+          <a:p>
+            <a:pPr marL="342900" indent="-342900">
+              <a:buAutoNum type="arabicPeriod"/>
+            </a:pPr>
+            <a:endParaRPr lang="en-US" dirty="0" smtClean="0"/>
+          </a:p>
+          <a:p>
+            <a:pPr marL="342900" indent="-342900">
+              <a:buAutoNum type="arabicPeriod"/>
+            </a:pPr>
+            <a:r>
+              <a:rPr lang="en-US" dirty="0" smtClean="0"/>
+              <a:t>I had an overall great experience with swapper </a:t>
+            </a:r>
+          </a:p>
+          <a:p>
+            <a:pPr marL="342900" indent="-342900">
+              <a:buAutoNum type="arabicPeriod"/>
+            </a:pPr>
+            <a:endParaRPr lang="en-US" dirty="0"/>
+          </a:p>
+        </p:txBody>
+      </p:sp>
+      <p:sp>
+        <p:nvSpPr>
+          <p:cNvPr id="8" name="TextBox 7"/>
+          <p:cNvSpPr txBox="1"/>
+          <p:nvPr/>
+        </p:nvSpPr>
+        <p:spPr>
+          <a:xfrm>
+            <a:off x="3304080" y="1514475"/>
+            <a:ext cx="4934857" cy="369332"/>
+          </a:xfrm>
+          <a:prstGeom prst="rect">
+            <a:avLst/>
+          </a:prstGeom>
+          <a:noFill/>
+        </p:spPr>
+        <p:txBody>
+          <a:bodyPr wrap="square" rtlCol="0">
+            <a:spAutoFit/>
+          </a:bodyPr>
+          <a:lstStyle/>
+          <a:p>
+            <a:pPr marL="342900" marR="0" lvl="0" indent="-342900" defTabSz="914400" eaLnBrk="1" fontAlgn="auto" latinLnBrk="0" hangingPunct="1">
+              <a:lnSpc>
+                <a:spcPct val="100000"/>
+              </a:lnSpc>
+              <a:spcBef>
+                <a:spcPts val="0"/>
+              </a:spcBef>
+              <a:spcAft>
+                <a:spcPts val="0"/>
+              </a:spcAft>
+              <a:buClrTx/>
+              <a:buSzTx/>
+              <a:buFontTx/>
+              <a:buNone/>
+              <a:tabLst/>
+              <a:defRPr/>
+            </a:pPr>
+            <a:r>
+              <a:rPr lang="en-US" smtClean="0"/>
+              <a:t>True   False </a:t>
+            </a:r>
+            <a:endParaRPr lang="en-US" dirty="0"/>
+          </a:p>
+        </p:txBody>
+      </p:sp>
+      <p:sp>
+        <p:nvSpPr>
+          <p:cNvPr id="9" name="Rectangle 8"/>
+          <p:cNvSpPr/>
+          <p:nvPr/>
+        </p:nvSpPr>
+        <p:spPr>
+          <a:xfrm flipH="1">
+            <a:off x="3545490" y="1942911"/>
+            <a:ext cx="203200" cy="246743"/>
+          </a:xfrm>
+          <a:prstGeom prst="rect">
+            <a:avLst/>
+          </a:prstGeom>
+        </p:spPr>
+        <p:style>
+          <a:lnRef idx="2">
+            <a:schemeClr val="accent6"/>
+          </a:lnRef>
+          <a:fillRef idx="1">
+            <a:schemeClr val="lt1"/>
+          </a:fillRef>
+          <a:effectRef idx="0">
+            <a:schemeClr val="accent6"/>
+          </a:effectRef>
+          <a:fontRef idx="minor">
+            <a:schemeClr val="dk1"/>
+          </a:fontRef>
+        </p:style>
+        <p:txBody>
+          <a:bodyPr rtlCol="0" anchor="ctr"/>
+          <a:lstStyle/>
+          <a:p>
+            <a:pPr algn="ctr"/>
+            <a:endParaRPr lang="en-US"/>
+          </a:p>
+        </p:txBody>
+      </p:sp>
+      <p:sp>
+        <p:nvSpPr>
+          <p:cNvPr id="10" name="Rectangle 9"/>
+          <p:cNvSpPr/>
+          <p:nvPr/>
+        </p:nvSpPr>
+        <p:spPr>
+          <a:xfrm flipH="1">
+            <a:off x="4072009" y="1942911"/>
+            <a:ext cx="203200" cy="246743"/>
+          </a:xfrm>
+          <a:prstGeom prst="rect">
+            <a:avLst/>
+          </a:prstGeom>
+        </p:spPr>
+        <p:style>
+          <a:lnRef idx="2">
+            <a:schemeClr val="accent6"/>
+          </a:lnRef>
+          <a:fillRef idx="1">
+            <a:schemeClr val="lt1"/>
+          </a:fillRef>
+          <a:effectRef idx="0">
+            <a:schemeClr val="accent6"/>
+          </a:effectRef>
+          <a:fontRef idx="minor">
+            <a:schemeClr val="dk1"/>
+          </a:fontRef>
+        </p:style>
+        <p:txBody>
+          <a:bodyPr rtlCol="0" anchor="ctr"/>
+          <a:lstStyle/>
+          <a:p>
+            <a:pPr algn="ctr"/>
+            <a:endParaRPr lang="en-US"/>
+          </a:p>
+        </p:txBody>
+      </p:sp>
+      <p:sp>
+        <p:nvSpPr>
+          <p:cNvPr id="11" name="Rectangle 10"/>
+          <p:cNvSpPr/>
+          <p:nvPr/>
+        </p:nvSpPr>
+        <p:spPr>
+          <a:xfrm flipH="1">
+            <a:off x="3545490" y="2462460"/>
+            <a:ext cx="203200" cy="246743"/>
+          </a:xfrm>
+          <a:prstGeom prst="rect">
+            <a:avLst/>
+          </a:prstGeom>
+        </p:spPr>
+        <p:style>
+          <a:lnRef idx="2">
+            <a:schemeClr val="accent6"/>
+          </a:lnRef>
+          <a:fillRef idx="1">
+            <a:schemeClr val="lt1"/>
+          </a:fillRef>
+          <a:effectRef idx="0">
+            <a:schemeClr val="accent6"/>
+          </a:effectRef>
+          <a:fontRef idx="minor">
+            <a:schemeClr val="dk1"/>
+          </a:fontRef>
+        </p:style>
+        <p:txBody>
+          <a:bodyPr rtlCol="0" anchor="ctr"/>
+          <a:lstStyle/>
+          <a:p>
+            <a:pPr algn="ctr"/>
+            <a:endParaRPr lang="en-US"/>
+          </a:p>
+        </p:txBody>
+      </p:sp>
+      <p:sp>
+        <p:nvSpPr>
+          <p:cNvPr id="12" name="Rectangle 11"/>
+          <p:cNvSpPr/>
+          <p:nvPr/>
+        </p:nvSpPr>
+        <p:spPr>
+          <a:xfrm flipH="1">
+            <a:off x="4072009" y="2462460"/>
+            <a:ext cx="203200" cy="246743"/>
+          </a:xfrm>
+          <a:prstGeom prst="rect">
+            <a:avLst/>
+          </a:prstGeom>
+        </p:spPr>
+        <p:style>
+          <a:lnRef idx="2">
+            <a:schemeClr val="accent6"/>
+          </a:lnRef>
+          <a:fillRef idx="1">
+            <a:schemeClr val="lt1"/>
+          </a:fillRef>
+          <a:effectRef idx="0">
+            <a:schemeClr val="accent6"/>
+          </a:effectRef>
+          <a:fontRef idx="minor">
+            <a:schemeClr val="dk1"/>
+          </a:fontRef>
+        </p:style>
+        <p:txBody>
+          <a:bodyPr rtlCol="0" anchor="ctr"/>
+          <a:lstStyle/>
+          <a:p>
+            <a:pPr algn="ctr"/>
+            <a:endParaRPr lang="en-US"/>
+          </a:p>
+        </p:txBody>
+      </p:sp>
+      <p:sp>
+        <p:nvSpPr>
+          <p:cNvPr id="13" name="Rectangle 12"/>
+          <p:cNvSpPr/>
+          <p:nvPr/>
+        </p:nvSpPr>
+        <p:spPr>
+          <a:xfrm flipH="1">
+            <a:off x="3557613" y="3036073"/>
+            <a:ext cx="203200" cy="246743"/>
+          </a:xfrm>
+          <a:prstGeom prst="rect">
+            <a:avLst/>
+          </a:prstGeom>
+        </p:spPr>
+        <p:style>
+          <a:lnRef idx="2">
+            <a:schemeClr val="accent6"/>
+          </a:lnRef>
+          <a:fillRef idx="1">
+            <a:schemeClr val="lt1"/>
+          </a:fillRef>
+          <a:effectRef idx="0">
+            <a:schemeClr val="accent6"/>
+          </a:effectRef>
+          <a:fontRef idx="minor">
+            <a:schemeClr val="dk1"/>
+          </a:fontRef>
+        </p:style>
+        <p:txBody>
+          <a:bodyPr rtlCol="0" anchor="ctr"/>
+          <a:lstStyle/>
+          <a:p>
+            <a:pPr algn="ctr"/>
+            <a:endParaRPr lang="en-US"/>
+          </a:p>
+        </p:txBody>
+      </p:sp>
+      <p:sp>
+        <p:nvSpPr>
+          <p:cNvPr id="14" name="Rectangle 13"/>
+          <p:cNvSpPr/>
+          <p:nvPr/>
+        </p:nvSpPr>
+        <p:spPr>
+          <a:xfrm flipH="1">
+            <a:off x="4084132" y="3036073"/>
+            <a:ext cx="203200" cy="246743"/>
+          </a:xfrm>
+          <a:prstGeom prst="rect">
+            <a:avLst/>
+          </a:prstGeom>
+        </p:spPr>
+        <p:style>
+          <a:lnRef idx="2">
+            <a:schemeClr val="accent6"/>
+          </a:lnRef>
+          <a:fillRef idx="1">
+            <a:schemeClr val="lt1"/>
+          </a:fillRef>
+          <a:effectRef idx="0">
+            <a:schemeClr val="accent6"/>
+          </a:effectRef>
+          <a:fontRef idx="minor">
+            <a:schemeClr val="dk1"/>
+          </a:fontRef>
+        </p:style>
+        <p:txBody>
+          <a:bodyPr rtlCol="0" anchor="ctr"/>
+          <a:lstStyle/>
+          <a:p>
+            <a:pPr algn="ctr"/>
+            <a:endParaRPr lang="en-US"/>
+          </a:p>
+        </p:txBody>
+      </p:sp>
+      <p:sp>
+        <p:nvSpPr>
+          <p:cNvPr id="15" name="Rectangle 14"/>
+          <p:cNvSpPr/>
+          <p:nvPr/>
+        </p:nvSpPr>
+        <p:spPr>
+          <a:xfrm flipH="1">
+            <a:off x="3575068" y="3609686"/>
+            <a:ext cx="203200" cy="246743"/>
+          </a:xfrm>
+          <a:prstGeom prst="rect">
+            <a:avLst/>
+          </a:prstGeom>
+        </p:spPr>
+        <p:style>
+          <a:lnRef idx="2">
+            <a:schemeClr val="accent6"/>
+          </a:lnRef>
+          <a:fillRef idx="1">
+            <a:schemeClr val="lt1"/>
+          </a:fillRef>
+          <a:effectRef idx="0">
+            <a:schemeClr val="accent6"/>
+          </a:effectRef>
+          <a:fontRef idx="minor">
+            <a:schemeClr val="dk1"/>
+          </a:fontRef>
+        </p:style>
+        <p:txBody>
+          <a:bodyPr rtlCol="0" anchor="ctr"/>
+          <a:lstStyle/>
+          <a:p>
+            <a:pPr algn="ctr"/>
+            <a:endParaRPr lang="en-US"/>
+          </a:p>
+        </p:txBody>
+      </p:sp>
+      <p:sp>
+        <p:nvSpPr>
+          <p:cNvPr id="16" name="Rectangle 15"/>
+          <p:cNvSpPr/>
+          <p:nvPr/>
+        </p:nvSpPr>
+        <p:spPr>
+          <a:xfrm flipH="1">
+            <a:off x="4089464" y="3606769"/>
+            <a:ext cx="203200" cy="246743"/>
+          </a:xfrm>
+          <a:prstGeom prst="rect">
+            <a:avLst/>
+          </a:prstGeom>
+        </p:spPr>
+        <p:style>
+          <a:lnRef idx="2">
+            <a:schemeClr val="accent6"/>
+          </a:lnRef>
+          <a:fillRef idx="1">
+            <a:schemeClr val="lt1"/>
+          </a:fillRef>
+          <a:effectRef idx="0">
+            <a:schemeClr val="accent6"/>
+          </a:effectRef>
+          <a:fontRef idx="minor">
+            <a:schemeClr val="dk1"/>
+          </a:fontRef>
+        </p:style>
+        <p:txBody>
+          <a:bodyPr rtlCol="0" anchor="ctr"/>
+          <a:lstStyle/>
+          <a:p>
+            <a:pPr algn="ctr"/>
+            <a:endParaRPr lang="en-US"/>
+          </a:p>
+        </p:txBody>
+      </p:sp>
+    </p:spTree>
+    <p:extLst>
+      <p:ext uri="{BB962C8B-B14F-4D97-AF65-F5344CB8AC3E}">
+        <p14:creationId xmlns:p14="http://schemas.microsoft.com/office/powerpoint/2010/main" val="824676872"/>
       </p:ext>
     </p:extLst>
   </p:cSld>

</xml_diff>

<commit_message>
added routes user authentication and index and new user views
</commit_message>
<xml_diff>
--- a/produswap-org.pptx
+++ b/produswap-org.pptx
@@ -3483,7 +3483,7 @@
         <p:spPr>
           <a:xfrm>
             <a:off x="261257" y="1103086"/>
-            <a:ext cx="3265714" cy="4770537"/>
+            <a:ext cx="3265714" cy="5139869"/>
           </a:xfrm>
           <a:prstGeom prst="rect">
             <a:avLst/>
@@ -3533,11 +3533,11 @@
           </a:p>
           <a:p>
             <a:r>
-              <a:rPr lang="en-US" sz="2400"/>
+              <a:rPr lang="en-US" sz="2400" dirty="0" err="1"/>
               <a:t>l</a:t>
             </a:r>
             <a:r>
-              <a:rPr lang="en-US" sz="2400" smtClean="0"/>
+              <a:rPr lang="en-US" sz="2400" dirty="0" err="1" smtClean="0"/>
               <a:t>ast_name</a:t>
             </a:r>
             <a:endParaRPr lang="en-US" sz="2400" dirty="0" smtClean="0"/>
@@ -3565,6 +3565,13 @@
               <a:rPr lang="en-US" sz="2400" dirty="0" smtClean="0"/>
               <a:t>Rules?</a:t>
             </a:r>
+          </a:p>
+          <a:p>
+            <a:r>
+              <a:rPr lang="en-US" sz="2400" smtClean="0"/>
+              <a:t>username</a:t>
+            </a:r>
+            <a:endParaRPr lang="en-US" sz="2400" dirty="0" smtClean="0"/>
           </a:p>
           <a:p>
             <a:endParaRPr lang="en-US" sz="2400" dirty="0"/>

</xml_diff>

<commit_message>
made updates to erd
</commit_message>
<xml_diff>
--- a/produswap-org.pptx
+++ b/produswap-org.pptx
@@ -254,7 +254,7 @@
           <a:p>
             <a:fld id="{53B3AD58-3263-734D-AAA1-9560283B719D}" type="datetimeFigureOut">
               <a:rPr lang="en-US" smtClean="0"/>
-              <a:t>10/28/16</a:t>
+              <a:t>11/3/16</a:t>
             </a:fld>
             <a:endParaRPr lang="en-US"/>
           </a:p>
@@ -424,7 +424,7 @@
           <a:p>
             <a:fld id="{53B3AD58-3263-734D-AAA1-9560283B719D}" type="datetimeFigureOut">
               <a:rPr lang="en-US" smtClean="0"/>
-              <a:t>10/28/16</a:t>
+              <a:t>11/3/16</a:t>
             </a:fld>
             <a:endParaRPr lang="en-US"/>
           </a:p>
@@ -604,7 +604,7 @@
           <a:p>
             <a:fld id="{53B3AD58-3263-734D-AAA1-9560283B719D}" type="datetimeFigureOut">
               <a:rPr lang="en-US" smtClean="0"/>
-              <a:t>10/28/16</a:t>
+              <a:t>11/3/16</a:t>
             </a:fld>
             <a:endParaRPr lang="en-US"/>
           </a:p>
@@ -774,7 +774,7 @@
           <a:p>
             <a:fld id="{53B3AD58-3263-734D-AAA1-9560283B719D}" type="datetimeFigureOut">
               <a:rPr lang="en-US" smtClean="0"/>
-              <a:t>10/28/16</a:t>
+              <a:t>11/3/16</a:t>
             </a:fld>
             <a:endParaRPr lang="en-US"/>
           </a:p>
@@ -1020,7 +1020,7 @@
           <a:p>
             <a:fld id="{53B3AD58-3263-734D-AAA1-9560283B719D}" type="datetimeFigureOut">
               <a:rPr lang="en-US" smtClean="0"/>
-              <a:t>10/28/16</a:t>
+              <a:t>11/3/16</a:t>
             </a:fld>
             <a:endParaRPr lang="en-US"/>
           </a:p>
@@ -1252,7 +1252,7 @@
           <a:p>
             <a:fld id="{53B3AD58-3263-734D-AAA1-9560283B719D}" type="datetimeFigureOut">
               <a:rPr lang="en-US" smtClean="0"/>
-              <a:t>10/28/16</a:t>
+              <a:t>11/3/16</a:t>
             </a:fld>
             <a:endParaRPr lang="en-US"/>
           </a:p>
@@ -1619,7 +1619,7 @@
           <a:p>
             <a:fld id="{53B3AD58-3263-734D-AAA1-9560283B719D}" type="datetimeFigureOut">
               <a:rPr lang="en-US" smtClean="0"/>
-              <a:t>10/28/16</a:t>
+              <a:t>11/3/16</a:t>
             </a:fld>
             <a:endParaRPr lang="en-US"/>
           </a:p>
@@ -1737,7 +1737,7 @@
           <a:p>
             <a:fld id="{53B3AD58-3263-734D-AAA1-9560283B719D}" type="datetimeFigureOut">
               <a:rPr lang="en-US" smtClean="0"/>
-              <a:t>10/28/16</a:t>
+              <a:t>11/3/16</a:t>
             </a:fld>
             <a:endParaRPr lang="en-US"/>
           </a:p>
@@ -1832,7 +1832,7 @@
           <a:p>
             <a:fld id="{53B3AD58-3263-734D-AAA1-9560283B719D}" type="datetimeFigureOut">
               <a:rPr lang="en-US" smtClean="0"/>
-              <a:t>10/28/16</a:t>
+              <a:t>11/3/16</a:t>
             </a:fld>
             <a:endParaRPr lang="en-US"/>
           </a:p>
@@ -2109,7 +2109,7 @@
           <a:p>
             <a:fld id="{53B3AD58-3263-734D-AAA1-9560283B719D}" type="datetimeFigureOut">
               <a:rPr lang="en-US" smtClean="0"/>
-              <a:t>10/28/16</a:t>
+              <a:t>11/3/16</a:t>
             </a:fld>
             <a:endParaRPr lang="en-US"/>
           </a:p>
@@ -2362,7 +2362,7 @@
           <a:p>
             <a:fld id="{53B3AD58-3263-734D-AAA1-9560283B719D}" type="datetimeFigureOut">
               <a:rPr lang="en-US" smtClean="0"/>
-              <a:t>10/28/16</a:t>
+              <a:t>11/3/16</a:t>
             </a:fld>
             <a:endParaRPr lang="en-US"/>
           </a:p>
@@ -2575,7 +2575,7 @@
           <a:p>
             <a:fld id="{53B3AD58-3263-734D-AAA1-9560283B719D}" type="datetimeFigureOut">
               <a:rPr lang="en-US" smtClean="0"/>
-              <a:t>10/28/16</a:t>
+              <a:t>11/3/16</a:t>
             </a:fld>
             <a:endParaRPr lang="en-US"/>
           </a:p>
@@ -4301,6 +4301,575 @@
           </a:fontRef>
         </p:style>
       </p:cxnSp>
+      <p:grpSp>
+        <p:nvGrpSpPr>
+          <p:cNvPr id="2" name="Group 1"/>
+          <p:cNvGrpSpPr/>
+          <p:nvPr/>
+        </p:nvGrpSpPr>
+        <p:grpSpPr>
+          <a:xfrm>
+            <a:off x="3526971" y="4390588"/>
+            <a:ext cx="3164114" cy="537029"/>
+            <a:chOff x="1074057" y="5633001"/>
+            <a:chExt cx="9245600" cy="537029"/>
+          </a:xfrm>
+        </p:grpSpPr>
+        <p:sp>
+          <p:nvSpPr>
+            <p:cNvPr id="22" name="Freeform 21"/>
+            <p:cNvSpPr/>
+            <p:nvPr/>
+          </p:nvSpPr>
+          <p:spPr>
+            <a:xfrm>
+              <a:off x="1074057" y="5633001"/>
+              <a:ext cx="8636000" cy="537029"/>
+            </a:xfrm>
+            <a:custGeom>
+              <a:avLst/>
+              <a:gdLst>
+                <a:gd name="connsiteX0" fmla="*/ 0 w 8636000"/>
+                <a:gd name="connsiteY0" fmla="*/ 537029 h 537029"/>
+                <a:gd name="connsiteX1" fmla="*/ 1364343 w 8636000"/>
+                <a:gd name="connsiteY1" fmla="*/ 116114 h 537029"/>
+                <a:gd name="connsiteX2" fmla="*/ 3468915 w 8636000"/>
+                <a:gd name="connsiteY2" fmla="*/ 0 h 537029"/>
+                <a:gd name="connsiteX3" fmla="*/ 6037943 w 8636000"/>
+                <a:gd name="connsiteY3" fmla="*/ 29029 h 537029"/>
+                <a:gd name="connsiteX4" fmla="*/ 7968343 w 8636000"/>
+                <a:gd name="connsiteY4" fmla="*/ 188686 h 537029"/>
+                <a:gd name="connsiteX5" fmla="*/ 8636000 w 8636000"/>
+                <a:gd name="connsiteY5" fmla="*/ 420914 h 537029"/>
+              </a:gdLst>
+              <a:ahLst/>
+              <a:cxnLst>
+                <a:cxn ang="0">
+                  <a:pos x="connsiteX0" y="connsiteY0"/>
+                </a:cxn>
+                <a:cxn ang="0">
+                  <a:pos x="connsiteX1" y="connsiteY1"/>
+                </a:cxn>
+                <a:cxn ang="0">
+                  <a:pos x="connsiteX2" y="connsiteY2"/>
+                </a:cxn>
+                <a:cxn ang="0">
+                  <a:pos x="connsiteX3" y="connsiteY3"/>
+                </a:cxn>
+                <a:cxn ang="0">
+                  <a:pos x="connsiteX4" y="connsiteY4"/>
+                </a:cxn>
+                <a:cxn ang="0">
+                  <a:pos x="connsiteX5" y="connsiteY5"/>
+                </a:cxn>
+              </a:cxnLst>
+              <a:rect l="l" t="t" r="r" b="b"/>
+              <a:pathLst>
+                <a:path w="8636000" h="537029">
+                  <a:moveTo>
+                    <a:pt x="0" y="537029"/>
+                  </a:moveTo>
+                  <a:cubicBezTo>
+                    <a:pt x="393095" y="371324"/>
+                    <a:pt x="786191" y="205619"/>
+                    <a:pt x="1364343" y="116114"/>
+                  </a:cubicBezTo>
+                  <a:cubicBezTo>
+                    <a:pt x="1942495" y="26609"/>
+                    <a:pt x="3468915" y="0"/>
+                    <a:pt x="3468915" y="0"/>
+                  </a:cubicBezTo>
+                  <a:lnTo>
+                    <a:pt x="6037943" y="29029"/>
+                  </a:lnTo>
+                  <a:cubicBezTo>
+                    <a:pt x="6787848" y="60477"/>
+                    <a:pt x="7535334" y="123372"/>
+                    <a:pt x="7968343" y="188686"/>
+                  </a:cubicBezTo>
+                  <a:cubicBezTo>
+                    <a:pt x="8401352" y="254000"/>
+                    <a:pt x="8636000" y="420914"/>
+                    <a:pt x="8636000" y="420914"/>
+                  </a:cubicBezTo>
+                </a:path>
+              </a:pathLst>
+            </a:custGeom>
+            <a:noFill/>
+            <a:ln>
+              <a:solidFill>
+                <a:schemeClr val="tx1"/>
+              </a:solidFill>
+            </a:ln>
+          </p:spPr>
+          <p:style>
+            <a:lnRef idx="2">
+              <a:schemeClr val="accent1">
+                <a:shade val="50000"/>
+              </a:schemeClr>
+            </a:lnRef>
+            <a:fillRef idx="1">
+              <a:schemeClr val="accent1"/>
+            </a:fillRef>
+            <a:effectRef idx="0">
+              <a:schemeClr val="accent1"/>
+            </a:effectRef>
+            <a:fontRef idx="minor">
+              <a:schemeClr val="lt1"/>
+            </a:fontRef>
+          </p:style>
+          <p:txBody>
+            <a:bodyPr rtlCol="0" anchor="ctr"/>
+            <a:lstStyle/>
+            <a:p>
+              <a:pPr algn="ctr"/>
+              <a:endParaRPr lang="en-US"/>
+            </a:p>
+          </p:txBody>
+        </p:sp>
+        <p:cxnSp>
+          <p:nvCxnSpPr>
+            <p:cNvPr id="23" name="Straight Connector 22"/>
+            <p:cNvCxnSpPr/>
+            <p:nvPr/>
+          </p:nvCxnSpPr>
+          <p:spPr>
+            <a:xfrm>
+              <a:off x="1480458" y="5778405"/>
+              <a:ext cx="304800" cy="268514"/>
+            </a:xfrm>
+            <a:prstGeom prst="line">
+              <a:avLst/>
+            </a:prstGeom>
+            <a:ln>
+              <a:solidFill>
+                <a:schemeClr val="tx1"/>
+              </a:solidFill>
+            </a:ln>
+          </p:spPr>
+          <p:style>
+            <a:lnRef idx="1">
+              <a:schemeClr val="accent1"/>
+            </a:lnRef>
+            <a:fillRef idx="0">
+              <a:schemeClr val="accent1"/>
+            </a:fillRef>
+            <a:effectRef idx="0">
+              <a:schemeClr val="accent1"/>
+            </a:effectRef>
+            <a:fontRef idx="minor">
+              <a:schemeClr val="tx1"/>
+            </a:fontRef>
+          </p:style>
+        </p:cxnSp>
+        <p:cxnSp>
+          <p:nvCxnSpPr>
+            <p:cNvPr id="24" name="Straight Connector 23"/>
+            <p:cNvCxnSpPr/>
+            <p:nvPr/>
+          </p:nvCxnSpPr>
+          <p:spPr>
+            <a:xfrm>
+              <a:off x="9042400" y="5821687"/>
+              <a:ext cx="239486" cy="225232"/>
+            </a:xfrm>
+            <a:prstGeom prst="line">
+              <a:avLst/>
+            </a:prstGeom>
+            <a:ln>
+              <a:solidFill>
+                <a:schemeClr val="tx1"/>
+              </a:solidFill>
+            </a:ln>
+          </p:spPr>
+          <p:style>
+            <a:lnRef idx="1">
+              <a:schemeClr val="accent1"/>
+            </a:lnRef>
+            <a:fillRef idx="0">
+              <a:schemeClr val="accent1"/>
+            </a:fillRef>
+            <a:effectRef idx="0">
+              <a:schemeClr val="accent1"/>
+            </a:effectRef>
+            <a:fontRef idx="minor">
+              <a:schemeClr val="tx1"/>
+            </a:fontRef>
+          </p:style>
+        </p:cxnSp>
+        <p:cxnSp>
+          <p:nvCxnSpPr>
+            <p:cNvPr id="25" name="Straight Connector 24"/>
+            <p:cNvCxnSpPr/>
+            <p:nvPr/>
+          </p:nvCxnSpPr>
+          <p:spPr>
+            <a:xfrm>
+              <a:off x="9114971" y="5814692"/>
+              <a:ext cx="1204686" cy="232227"/>
+            </a:xfrm>
+            <a:prstGeom prst="line">
+              <a:avLst/>
+            </a:prstGeom>
+            <a:ln>
+              <a:solidFill>
+                <a:schemeClr val="tx1"/>
+              </a:solidFill>
+            </a:ln>
+          </p:spPr>
+          <p:style>
+            <a:lnRef idx="1">
+              <a:schemeClr val="accent1"/>
+            </a:lnRef>
+            <a:fillRef idx="0">
+              <a:schemeClr val="accent1"/>
+            </a:fillRef>
+            <a:effectRef idx="0">
+              <a:schemeClr val="accent1"/>
+            </a:effectRef>
+            <a:fontRef idx="minor">
+              <a:schemeClr val="tx1"/>
+            </a:fontRef>
+          </p:style>
+        </p:cxnSp>
+      </p:grpSp>
+      <p:grpSp>
+        <p:nvGrpSpPr>
+          <p:cNvPr id="27" name="Group 26"/>
+          <p:cNvGrpSpPr/>
+          <p:nvPr/>
+        </p:nvGrpSpPr>
+        <p:grpSpPr>
+          <a:xfrm rot="8469151">
+            <a:off x="7126514" y="5325000"/>
+            <a:ext cx="3164114" cy="537029"/>
+            <a:chOff x="1074057" y="5633001"/>
+            <a:chExt cx="9245600" cy="537029"/>
+          </a:xfrm>
+        </p:grpSpPr>
+        <p:sp>
+          <p:nvSpPr>
+            <p:cNvPr id="29" name="Freeform 28"/>
+            <p:cNvSpPr/>
+            <p:nvPr/>
+          </p:nvSpPr>
+          <p:spPr>
+            <a:xfrm>
+              <a:off x="1074057" y="5633001"/>
+              <a:ext cx="8636000" cy="537029"/>
+            </a:xfrm>
+            <a:custGeom>
+              <a:avLst/>
+              <a:gdLst>
+                <a:gd name="connsiteX0" fmla="*/ 0 w 8636000"/>
+                <a:gd name="connsiteY0" fmla="*/ 537029 h 537029"/>
+                <a:gd name="connsiteX1" fmla="*/ 1364343 w 8636000"/>
+                <a:gd name="connsiteY1" fmla="*/ 116114 h 537029"/>
+                <a:gd name="connsiteX2" fmla="*/ 3468915 w 8636000"/>
+                <a:gd name="connsiteY2" fmla="*/ 0 h 537029"/>
+                <a:gd name="connsiteX3" fmla="*/ 6037943 w 8636000"/>
+                <a:gd name="connsiteY3" fmla="*/ 29029 h 537029"/>
+                <a:gd name="connsiteX4" fmla="*/ 7968343 w 8636000"/>
+                <a:gd name="connsiteY4" fmla="*/ 188686 h 537029"/>
+                <a:gd name="connsiteX5" fmla="*/ 8636000 w 8636000"/>
+                <a:gd name="connsiteY5" fmla="*/ 420914 h 537029"/>
+              </a:gdLst>
+              <a:ahLst/>
+              <a:cxnLst>
+                <a:cxn ang="0">
+                  <a:pos x="connsiteX0" y="connsiteY0"/>
+                </a:cxn>
+                <a:cxn ang="0">
+                  <a:pos x="connsiteX1" y="connsiteY1"/>
+                </a:cxn>
+                <a:cxn ang="0">
+                  <a:pos x="connsiteX2" y="connsiteY2"/>
+                </a:cxn>
+                <a:cxn ang="0">
+                  <a:pos x="connsiteX3" y="connsiteY3"/>
+                </a:cxn>
+                <a:cxn ang="0">
+                  <a:pos x="connsiteX4" y="connsiteY4"/>
+                </a:cxn>
+                <a:cxn ang="0">
+                  <a:pos x="connsiteX5" y="connsiteY5"/>
+                </a:cxn>
+              </a:cxnLst>
+              <a:rect l="l" t="t" r="r" b="b"/>
+              <a:pathLst>
+                <a:path w="8636000" h="537029">
+                  <a:moveTo>
+                    <a:pt x="0" y="537029"/>
+                  </a:moveTo>
+                  <a:cubicBezTo>
+                    <a:pt x="393095" y="371324"/>
+                    <a:pt x="786191" y="205619"/>
+                    <a:pt x="1364343" y="116114"/>
+                  </a:cubicBezTo>
+                  <a:cubicBezTo>
+                    <a:pt x="1942495" y="26609"/>
+                    <a:pt x="3468915" y="0"/>
+                    <a:pt x="3468915" y="0"/>
+                  </a:cubicBezTo>
+                  <a:lnTo>
+                    <a:pt x="6037943" y="29029"/>
+                  </a:lnTo>
+                  <a:cubicBezTo>
+                    <a:pt x="6787848" y="60477"/>
+                    <a:pt x="7535334" y="123372"/>
+                    <a:pt x="7968343" y="188686"/>
+                  </a:cubicBezTo>
+                  <a:cubicBezTo>
+                    <a:pt x="8401352" y="254000"/>
+                    <a:pt x="8636000" y="420914"/>
+                    <a:pt x="8636000" y="420914"/>
+                  </a:cubicBezTo>
+                </a:path>
+              </a:pathLst>
+            </a:custGeom>
+            <a:noFill/>
+            <a:ln>
+              <a:solidFill>
+                <a:schemeClr val="tx1"/>
+              </a:solidFill>
+            </a:ln>
+          </p:spPr>
+          <p:style>
+            <a:lnRef idx="2">
+              <a:schemeClr val="accent1">
+                <a:shade val="50000"/>
+              </a:schemeClr>
+            </a:lnRef>
+            <a:fillRef idx="1">
+              <a:schemeClr val="accent1"/>
+            </a:fillRef>
+            <a:effectRef idx="0">
+              <a:schemeClr val="accent1"/>
+            </a:effectRef>
+            <a:fontRef idx="minor">
+              <a:schemeClr val="lt1"/>
+            </a:fontRef>
+          </p:style>
+          <p:txBody>
+            <a:bodyPr rtlCol="0" anchor="ctr"/>
+            <a:lstStyle/>
+            <a:p>
+              <a:pPr algn="ctr"/>
+              <a:endParaRPr lang="en-US"/>
+            </a:p>
+          </p:txBody>
+        </p:sp>
+        <p:cxnSp>
+          <p:nvCxnSpPr>
+            <p:cNvPr id="30" name="Straight Connector 29"/>
+            <p:cNvCxnSpPr/>
+            <p:nvPr/>
+          </p:nvCxnSpPr>
+          <p:spPr>
+            <a:xfrm>
+              <a:off x="1480458" y="5778405"/>
+              <a:ext cx="304800" cy="268514"/>
+            </a:xfrm>
+            <a:prstGeom prst="line">
+              <a:avLst/>
+            </a:prstGeom>
+            <a:ln>
+              <a:solidFill>
+                <a:schemeClr val="tx1"/>
+              </a:solidFill>
+            </a:ln>
+          </p:spPr>
+          <p:style>
+            <a:lnRef idx="1">
+              <a:schemeClr val="accent1"/>
+            </a:lnRef>
+            <a:fillRef idx="0">
+              <a:schemeClr val="accent1"/>
+            </a:fillRef>
+            <a:effectRef idx="0">
+              <a:schemeClr val="accent1"/>
+            </a:effectRef>
+            <a:fontRef idx="minor">
+              <a:schemeClr val="tx1"/>
+            </a:fontRef>
+          </p:style>
+        </p:cxnSp>
+        <p:cxnSp>
+          <p:nvCxnSpPr>
+            <p:cNvPr id="32" name="Straight Connector 31"/>
+            <p:cNvCxnSpPr/>
+            <p:nvPr/>
+          </p:nvCxnSpPr>
+          <p:spPr>
+            <a:xfrm>
+              <a:off x="9042400" y="5821687"/>
+              <a:ext cx="239486" cy="225232"/>
+            </a:xfrm>
+            <a:prstGeom prst="line">
+              <a:avLst/>
+            </a:prstGeom>
+            <a:ln>
+              <a:solidFill>
+                <a:schemeClr val="tx1"/>
+              </a:solidFill>
+            </a:ln>
+          </p:spPr>
+          <p:style>
+            <a:lnRef idx="1">
+              <a:schemeClr val="accent1"/>
+            </a:lnRef>
+            <a:fillRef idx="0">
+              <a:schemeClr val="accent1"/>
+            </a:fillRef>
+            <a:effectRef idx="0">
+              <a:schemeClr val="accent1"/>
+            </a:effectRef>
+            <a:fontRef idx="minor">
+              <a:schemeClr val="tx1"/>
+            </a:fontRef>
+          </p:style>
+        </p:cxnSp>
+        <p:cxnSp>
+          <p:nvCxnSpPr>
+            <p:cNvPr id="34" name="Straight Connector 33"/>
+            <p:cNvCxnSpPr/>
+            <p:nvPr/>
+          </p:nvCxnSpPr>
+          <p:spPr>
+            <a:xfrm>
+              <a:off x="9114971" y="5814692"/>
+              <a:ext cx="1204686" cy="232227"/>
+            </a:xfrm>
+            <a:prstGeom prst="line">
+              <a:avLst/>
+            </a:prstGeom>
+            <a:ln>
+              <a:solidFill>
+                <a:schemeClr val="tx1"/>
+              </a:solidFill>
+            </a:ln>
+          </p:spPr>
+          <p:style>
+            <a:lnRef idx="1">
+              <a:schemeClr val="accent1"/>
+            </a:lnRef>
+            <a:fillRef idx="0">
+              <a:schemeClr val="accent1"/>
+            </a:fillRef>
+            <a:effectRef idx="0">
+              <a:schemeClr val="accent1"/>
+            </a:effectRef>
+            <a:fontRef idx="minor">
+              <a:schemeClr val="tx1"/>
+            </a:fontRef>
+          </p:style>
+        </p:cxnSp>
+      </p:grpSp>
+      <p:sp>
+        <p:nvSpPr>
+          <p:cNvPr id="17" name="TextBox 16"/>
+          <p:cNvSpPr txBox="1"/>
+          <p:nvPr/>
+        </p:nvSpPr>
+        <p:spPr>
+          <a:xfrm>
+            <a:off x="4967513" y="4850780"/>
+            <a:ext cx="2634343" cy="3170099"/>
+          </a:xfrm>
+          <a:prstGeom prst="rect">
+            <a:avLst/>
+          </a:prstGeom>
+          <a:solidFill>
+            <a:schemeClr val="bg1">
+              <a:lumMod val="95000"/>
+            </a:schemeClr>
+          </a:solidFill>
+          <a:ln>
+            <a:solidFill>
+              <a:schemeClr val="tx1"/>
+            </a:solidFill>
+          </a:ln>
+        </p:spPr>
+        <p:txBody>
+          <a:bodyPr wrap="square" rtlCol="0">
+            <a:spAutoFit/>
+          </a:bodyPr>
+          <a:lstStyle/>
+          <a:p>
+            <a:r>
+              <a:rPr lang="en-US" sz="4000" u="sng" dirty="0" smtClean="0"/>
+              <a:t>Replies</a:t>
+            </a:r>
+            <a:endParaRPr lang="en-US" sz="3200" u="sng" dirty="0"/>
+          </a:p>
+          <a:p>
+            <a:r>
+              <a:rPr lang="en-US" sz="2400" dirty="0" smtClean="0"/>
+              <a:t>ID </a:t>
+            </a:r>
+          </a:p>
+          <a:p>
+            <a:r>
+              <a:rPr lang="en-US" sz="2400" dirty="0" err="1" smtClean="0"/>
+              <a:t>User_ID</a:t>
+            </a:r>
+            <a:r>
+              <a:rPr lang="en-US" sz="2400" dirty="0" smtClean="0"/>
+              <a:t> </a:t>
+            </a:r>
+            <a:endParaRPr lang="en-US" sz="2400" dirty="0" smtClean="0"/>
+          </a:p>
+          <a:p>
+            <a:r>
+              <a:rPr lang="en-US" sz="2400" dirty="0" err="1" smtClean="0"/>
+              <a:t>Message_ID</a:t>
+            </a:r>
+            <a:endParaRPr lang="en-US" sz="2400" dirty="0" smtClean="0"/>
+          </a:p>
+          <a:p>
+            <a:r>
+              <a:rPr lang="en-US" sz="2400" dirty="0" smtClean="0"/>
+              <a:t>Content</a:t>
+            </a:r>
+          </a:p>
+          <a:p>
+            <a:endParaRPr lang="en-US" sz="2400" dirty="0"/>
+          </a:p>
+          <a:p>
+            <a:r>
+              <a:rPr lang="en-US" sz="2000" dirty="0" err="1"/>
+              <a:t>b</a:t>
+            </a:r>
+            <a:r>
+              <a:rPr lang="en-US" sz="2000" dirty="0" err="1" smtClean="0"/>
+              <a:t>elongs_to</a:t>
+            </a:r>
+            <a:r>
+              <a:rPr lang="en-US" sz="2000" dirty="0" smtClean="0"/>
+              <a:t> </a:t>
+            </a:r>
+            <a:r>
+              <a:rPr lang="en-US" sz="2000" dirty="0" smtClean="0"/>
+              <a:t>:</a:t>
+            </a:r>
+            <a:r>
+              <a:rPr lang="en-US" sz="2000" dirty="0" smtClean="0"/>
+              <a:t>message</a:t>
+            </a:r>
+          </a:p>
+          <a:p>
+            <a:r>
+              <a:rPr lang="en-US" sz="2000" dirty="0" err="1" smtClean="0"/>
+              <a:t>Belongs_to</a:t>
+            </a:r>
+            <a:r>
+              <a:rPr lang="en-US" sz="2000" dirty="0" smtClean="0"/>
+              <a:t> :user  </a:t>
+            </a:r>
+            <a:endParaRPr lang="en-US" sz="2000" dirty="0" smtClean="0"/>
+          </a:p>
+        </p:txBody>
+      </p:sp>
     </p:spTree>
     <p:extLst>
       <p:ext uri="{BB962C8B-B14F-4D97-AF65-F5344CB8AC3E}">
@@ -4621,19 +5190,7 @@
           <a:p>
             <a:r>
               <a:rPr lang="en-US" sz="2400" b="1" dirty="0" smtClean="0"/>
-              <a:t>username</a:t>
-            </a:r>
-            <a:r>
-              <a:rPr lang="en-US" sz="2400" b="1" dirty="0" smtClean="0"/>
-              <a:t>	</a:t>
-            </a:r>
-            <a:r>
-              <a:rPr lang="en-US" sz="2400" b="1" dirty="0" smtClean="0"/>
-              <a:t>post date</a:t>
-            </a:r>
-            <a:r>
-              <a:rPr lang="en-US" sz="2400" b="1" dirty="0" smtClean="0"/>
-              <a:t>	         summary			 </a:t>
+              <a:t>username	post date	         summary			 </a:t>
             </a:r>
             <a:endParaRPr lang="en-US" sz="2400" b="1" dirty="0"/>
           </a:p>
@@ -4663,19 +5220,7 @@
           <a:p>
             <a:r>
               <a:rPr lang="en-US" dirty="0" smtClean="0"/>
-              <a:t>agonzalez27	</a:t>
-            </a:r>
-            <a:r>
-              <a:rPr lang="en-US" dirty="0" smtClean="0"/>
-              <a:t>10/25/2016</a:t>
-            </a:r>
-            <a:r>
-              <a:rPr lang="en-US" dirty="0" smtClean="0"/>
-              <a:t>	            I will swap oranges for           </a:t>
-            </a:r>
-            <a:r>
-              <a:rPr lang="en-US" dirty="0" smtClean="0"/>
-              <a:t>	 </a:t>
+              <a:t>agonzalez27	10/25/2016	            I will swap oranges for           	 </a:t>
             </a:r>
             <a:r>
               <a:rPr lang="en-US" u="sng" dirty="0" smtClean="0">
@@ -4748,19 +5293,7 @@
           <a:p>
             <a:r>
               <a:rPr lang="en-US" dirty="0" smtClean="0"/>
-              <a:t>Kwood28		</a:t>
-            </a:r>
-            <a:r>
-              <a:rPr lang="en-US" dirty="0" smtClean="0"/>
-              <a:t>10/25/2016	            I </a:t>
-            </a:r>
-            <a:r>
-              <a:rPr lang="en-US" dirty="0" smtClean="0"/>
-              <a:t>will swap strawberries         </a:t>
-            </a:r>
-            <a:r>
-              <a:rPr lang="en-US" dirty="0" smtClean="0"/>
-              <a:t>	 </a:t>
+              <a:t>Kwood28		10/25/2016	            I will swap strawberries         	 </a:t>
             </a:r>
             <a:r>
               <a:rPr lang="en-US" u="sng" dirty="0" smtClean="0">
@@ -4833,19 +5366,7 @@
           <a:p>
             <a:r>
               <a:rPr lang="en-US" dirty="0" smtClean="0"/>
-              <a:t>mwong50	</a:t>
-            </a:r>
-            <a:r>
-              <a:rPr lang="en-US" dirty="0" smtClean="0"/>
-              <a:t>10/24/2016	            I </a:t>
-            </a:r>
-            <a:r>
-              <a:rPr lang="en-US" dirty="0" smtClean="0"/>
-              <a:t>will swap strawberries           </a:t>
-            </a:r>
-            <a:r>
-              <a:rPr lang="en-US" dirty="0" smtClean="0"/>
-              <a:t>	 </a:t>
+              <a:t>mwong50	10/24/2016	            I will swap strawberries           	 </a:t>
             </a:r>
             <a:r>
               <a:rPr lang="en-US" u="sng" dirty="0" smtClean="0">
@@ -5051,17 +5572,7 @@
                   </a:schemeClr>
                 </a:solidFill>
               </a:rPr>
-              <a:t>ew </a:t>
-            </a:r>
-            <a:r>
-              <a:rPr lang="en-US" sz="2800" u="sng" dirty="0" smtClean="0">
-                <a:solidFill>
-                  <a:schemeClr val="accent1">
-                    <a:lumMod val="75000"/>
-                  </a:schemeClr>
-                </a:solidFill>
-              </a:rPr>
-              <a:t>post</a:t>
+              <a:t>ew post</a:t>
             </a:r>
             <a:endParaRPr lang="en-US" sz="2800" u="sng" dirty="0">
               <a:solidFill>
@@ -7585,11 +8096,7 @@
           <a:p>
             <a:r>
               <a:rPr lang="en-US" sz="2400" dirty="0" smtClean="0"/>
-              <a:t>10/25/2016</a:t>
-            </a:r>
-            <a:r>
-              <a:rPr lang="en-US" sz="2400" dirty="0" smtClean="0"/>
-              <a:t>	</a:t>
+              <a:t>10/25/2016	</a:t>
             </a:r>
             <a:endParaRPr lang="en-US" sz="2400" b="1" dirty="0"/>
           </a:p>
@@ -7937,11 +8444,7 @@
           <a:p>
             <a:r>
               <a:rPr lang="en-US" sz="2400" dirty="0" smtClean="0"/>
-              <a:t>5:00pm </a:t>
-            </a:r>
-            <a:r>
-              <a:rPr lang="en-US" sz="2400" dirty="0" smtClean="0"/>
-              <a:t>	</a:t>
+              <a:t>5:00pm 	</a:t>
             </a:r>
             <a:endParaRPr lang="en-US" sz="2400" b="1" dirty="0"/>
           </a:p>
@@ -8049,13 +8552,6 @@
               </a:rPr>
               <a:t>Submit</a:t>
             </a:r>
-            <a:endParaRPr lang="en-US" u="sng" dirty="0" smtClean="0">
-              <a:solidFill>
-                <a:schemeClr val="accent1">
-                  <a:lumMod val="75000"/>
-                </a:schemeClr>
-              </a:solidFill>
-            </a:endParaRPr>
           </a:p>
         </p:txBody>
       </p:sp>
@@ -8135,25 +8631,8 @@
           <a:p>
             <a:r>
               <a:rPr lang="en-US" b="1" dirty="0" smtClean="0"/>
-              <a:t>Message</a:t>
-            </a:r>
-            <a:r>
-              <a:rPr lang="en-US" b="1" dirty="0" smtClean="0"/>
-              <a:t> </a:t>
-            </a:r>
-            <a:r>
-              <a:rPr lang="en-US" b="1" dirty="0" smtClean="0"/>
-              <a:t>by </a:t>
-            </a:r>
-            <a:r>
-              <a:rPr lang="en-US" b="1" dirty="0" smtClean="0"/>
-              <a:t>kwood28 10/25/2016 5:05pm</a:t>
-            </a:r>
-            <a:r>
-              <a:rPr lang="en-US" b="1" dirty="0" smtClean="0"/>
-              <a:t>:</a:t>
-            </a:r>
-            <a:endParaRPr lang="en-US" b="1" dirty="0" smtClean="0"/>
+              <a:t>Message by kwood28 10/25/2016 5:05pm:</a:t>
+            </a:r>
           </a:p>
           <a:p>
             <a:r>
@@ -8370,19 +8849,7 @@
           <a:p>
             <a:r>
               <a:rPr lang="en-US" sz="2400" b="1" dirty="0" smtClean="0"/>
-              <a:t>username</a:t>
-            </a:r>
-            <a:r>
-              <a:rPr lang="en-US" sz="2400" b="1" dirty="0" smtClean="0"/>
-              <a:t>	</a:t>
-            </a:r>
-            <a:r>
-              <a:rPr lang="en-US" sz="2400" b="1" dirty="0" smtClean="0"/>
-              <a:t>post date</a:t>
-            </a:r>
-            <a:r>
-              <a:rPr lang="en-US" sz="2400" b="1" dirty="0" smtClean="0"/>
-              <a:t>	         summary			 </a:t>
+              <a:t>username	post date	         summary			 </a:t>
             </a:r>
             <a:endParaRPr lang="en-US" sz="2400" b="1" dirty="0"/>
           </a:p>
@@ -8412,19 +8879,7 @@
           <a:p>
             <a:r>
               <a:rPr lang="en-US" dirty="0" smtClean="0"/>
-              <a:t>agonzalez27	</a:t>
-            </a:r>
-            <a:r>
-              <a:rPr lang="en-US" dirty="0" smtClean="0"/>
-              <a:t>10/25/2016</a:t>
-            </a:r>
-            <a:r>
-              <a:rPr lang="en-US" dirty="0" smtClean="0"/>
-              <a:t>	            I will swap oranges for           </a:t>
-            </a:r>
-            <a:r>
-              <a:rPr lang="en-US" dirty="0" smtClean="0"/>
-              <a:t>	 </a:t>
+              <a:t>agonzalez27	10/25/2016	            I will swap oranges for           	 </a:t>
             </a:r>
             <a:r>
               <a:rPr lang="en-US" u="sng" dirty="0" smtClean="0">
@@ -8501,19 +8956,7 @@
             </a:r>
             <a:r>
               <a:rPr lang="en-US" dirty="0" smtClean="0"/>
-              <a:t>	</a:t>
-            </a:r>
-            <a:r>
-              <a:rPr lang="en-US" dirty="0" smtClean="0"/>
-              <a:t>10/10/2016	            I </a:t>
-            </a:r>
-            <a:r>
-              <a:rPr lang="en-US" dirty="0" smtClean="0"/>
-              <a:t>will swap </a:t>
-            </a:r>
-            <a:r>
-              <a:rPr lang="en-US" dirty="0" smtClean="0"/>
-              <a:t>oranges for		</a:t>
+              <a:t>	10/10/2016	            I will swap oranges for		</a:t>
             </a:r>
             <a:r>
               <a:rPr lang="en-US" u="sng" dirty="0">
@@ -8544,11 +8987,7 @@
             </a:r>
             <a:r>
               <a:rPr lang="en-US" dirty="0" smtClean="0"/>
-              <a:t>			            tomatoes!</a:t>
-            </a:r>
-            <a:r>
-              <a:rPr lang="en-US" dirty="0" smtClean="0"/>
-              <a:t>			 </a:t>
+              <a:t>			            tomatoes!			 </a:t>
             </a:r>
             <a:endParaRPr lang="en-US" dirty="0"/>
           </a:p>
@@ -8582,23 +9021,7 @@
             </a:r>
             <a:r>
               <a:rPr lang="en-US" dirty="0" smtClean="0"/>
-              <a:t>	</a:t>
-            </a:r>
-            <a:r>
-              <a:rPr lang="en-US" dirty="0" smtClean="0"/>
-              <a:t>10/1/2016	            I </a:t>
-            </a:r>
-            <a:r>
-              <a:rPr lang="en-US" dirty="0" smtClean="0"/>
-              <a:t>will swap </a:t>
-            </a:r>
-            <a:r>
-              <a:rPr lang="en-US" dirty="0" smtClean="0"/>
-              <a:t>oranges for</a:t>
-            </a:r>
-            <a:r>
-              <a:rPr lang="en-US" dirty="0" smtClean="0"/>
-              <a:t>          	 </a:t>
+              <a:t>	10/1/2016	            I will swap oranges for          	 </a:t>
             </a:r>
             <a:r>
               <a:rPr lang="en-US" u="sng" dirty="0" smtClean="0">
@@ -8631,11 +9054,7 @@
           <a:p>
             <a:r>
               <a:rPr lang="en-US" dirty="0" smtClean="0"/>
-              <a:t>				            </a:t>
-            </a:r>
-            <a:r>
-              <a:rPr lang="en-US" dirty="0" smtClean="0"/>
-              <a:t>pumpkins. </a:t>
+              <a:t>				            pumpkins. </a:t>
             </a:r>
             <a:endParaRPr lang="en-US" dirty="0"/>
           </a:p>
@@ -9002,17 +9421,7 @@
                   </a:schemeClr>
                 </a:solidFill>
               </a:rPr>
-              <a:t>ew </a:t>
-            </a:r>
-            <a:r>
-              <a:rPr lang="en-US" sz="2800" u="sng" dirty="0" smtClean="0">
-                <a:solidFill>
-                  <a:schemeClr val="accent1">
-                    <a:lumMod val="75000"/>
-                  </a:schemeClr>
-                </a:solidFill>
-              </a:rPr>
-              <a:t>post</a:t>
+              <a:t>ew post</a:t>
             </a:r>
             <a:endParaRPr lang="en-US" sz="2800" u="sng" dirty="0">
               <a:solidFill>
@@ -9223,27 +9632,7 @@
           <a:p>
             <a:r>
               <a:rPr lang="en-US" sz="2400" b="1" dirty="0" smtClean="0"/>
-              <a:t>	</a:t>
-            </a:r>
-            <a:r>
-              <a:rPr lang="en-US" sz="2400" b="1" dirty="0" smtClean="0"/>
-              <a:t>message</a:t>
-            </a:r>
-            <a:r>
-              <a:rPr lang="en-US" sz="2400" b="1" dirty="0" smtClean="0"/>
-              <a:t> date</a:t>
-            </a:r>
-            <a:r>
-              <a:rPr lang="en-US" sz="2400" b="1" dirty="0" smtClean="0"/>
-              <a:t>	</a:t>
-            </a:r>
-            <a:r>
-              <a:rPr lang="en-US" sz="2400" b="1" dirty="0" smtClean="0"/>
-              <a:t>       message time      message to    message from    </a:t>
-            </a:r>
-            <a:r>
-              <a:rPr lang="en-US" sz="2400" b="1" dirty="0" smtClean="0"/>
-              <a:t>		 </a:t>
+              <a:t>	message date	       message time      message to    message from    		 </a:t>
             </a:r>
             <a:endParaRPr lang="en-US" sz="2400" b="1" dirty="0"/>
           </a:p>
@@ -9273,19 +9662,7 @@
           <a:p>
             <a:r>
               <a:rPr lang="en-US" dirty="0" smtClean="0"/>
-              <a:t>	</a:t>
-            </a:r>
-            <a:r>
-              <a:rPr lang="en-US" dirty="0" smtClean="0"/>
-              <a:t>10/25/2016</a:t>
-            </a:r>
-            <a:r>
-              <a:rPr lang="en-US" dirty="0" smtClean="0"/>
-              <a:t>	</a:t>
-            </a:r>
-            <a:r>
-              <a:rPr lang="en-US" dirty="0" smtClean="0"/>
-              <a:t>          5:01pm           		kwood28	                                                       </a:t>
+              <a:t>	10/25/2016	          5:01pm           		kwood28	                                                       </a:t>
             </a:r>
             <a:r>
               <a:rPr lang="en-US" u="sng" dirty="0" smtClean="0">
@@ -9348,15 +9725,7 @@
           <a:p>
             <a:r>
               <a:rPr lang="en-US" dirty="0" smtClean="0"/>
-              <a:t> </a:t>
-            </a:r>
-            <a:r>
-              <a:rPr lang="en-US" dirty="0" smtClean="0"/>
-              <a:t>	</a:t>
-            </a:r>
-            <a:r>
-              <a:rPr lang="en-US" dirty="0" smtClean="0"/>
-              <a:t>10/24/2016	          5:08pm 	            	kwood28	                                                        </a:t>
+              <a:t> 	10/24/2016	          5:08pm 	            	kwood28	                                                        </a:t>
             </a:r>
             <a:r>
               <a:rPr lang="en-US" u="sng" dirty="0" smtClean="0">
@@ -9387,11 +9756,7 @@
             </a:r>
             <a:r>
               <a:rPr lang="en-US" dirty="0" smtClean="0"/>
-              <a:t>			</a:t>
-            </a:r>
-            <a:r>
-              <a:rPr lang="en-US" dirty="0" smtClean="0"/>
-              <a:t>			 </a:t>
+              <a:t>						 </a:t>
             </a:r>
             <a:endParaRPr lang="en-US" dirty="0"/>
           </a:p>
@@ -9421,15 +9786,7 @@
           <a:p>
             <a:r>
               <a:rPr lang="en-US" dirty="0" smtClean="0"/>
-              <a:t> </a:t>
-            </a:r>
-            <a:r>
-              <a:rPr lang="en-US" dirty="0" smtClean="0"/>
-              <a:t>	</a:t>
-            </a:r>
-            <a:r>
-              <a:rPr lang="en-US" dirty="0" smtClean="0"/>
-              <a:t>10/23/2016	         5:10pm       		                                mwong50                        </a:t>
+              <a:t> 	10/23/2016	         5:10pm       		                                mwong50                        </a:t>
             </a:r>
             <a:r>
               <a:rPr lang="en-US" u="sng" dirty="0" smtClean="0">
@@ -9839,17 +10196,7 @@
                   </a:schemeClr>
                 </a:solidFill>
               </a:rPr>
-              <a:t>ew </a:t>
-            </a:r>
-            <a:r>
-              <a:rPr lang="en-US" sz="2800" u="sng" dirty="0" smtClean="0">
-                <a:solidFill>
-                  <a:schemeClr val="accent1">
-                    <a:lumMod val="75000"/>
-                  </a:schemeClr>
-                </a:solidFill>
-              </a:rPr>
-              <a:t>post</a:t>
+              <a:t>ew post</a:t>
             </a:r>
             <a:endParaRPr lang="en-US" sz="2800" u="sng" dirty="0">
               <a:solidFill>

</xml_diff>

<commit_message>
made changes to the erd
</commit_message>
<xml_diff>
--- a/produswap-org.pptx
+++ b/produswap-org.pptx
@@ -3590,9 +3590,6 @@
             </a:r>
           </a:p>
           <a:p>
-            <a:endParaRPr lang="en-US" sz="2400" dirty="0"/>
-          </a:p>
-          <a:p>
             <a:r>
               <a:rPr lang="en-US" sz="2400" dirty="0" err="1"/>
               <a:t>h</a:t>
@@ -3603,6 +3600,21 @@
             </a:r>
             <a:r>
               <a:rPr lang="en-US" sz="2400" dirty="0" smtClean="0"/>
+              <a:t> :replies</a:t>
+            </a:r>
+            <a:endParaRPr lang="en-US" sz="2400" dirty="0"/>
+          </a:p>
+          <a:p>
+            <a:r>
+              <a:rPr lang="en-US" sz="2400" dirty="0" err="1"/>
+              <a:t>h</a:t>
+            </a:r>
+            <a:r>
+              <a:rPr lang="en-US" sz="2400" dirty="0" err="1" smtClean="0"/>
+              <a:t>as_many</a:t>
+            </a:r>
+            <a:r>
+              <a:rPr lang="en-US" sz="2400" dirty="0" smtClean="0"/>
               <a:t> :messages</a:t>
             </a:r>
           </a:p>
@@ -3617,7 +3629,7 @@
         <p:spPr>
           <a:xfrm>
             <a:off x="4869542" y="1103086"/>
-            <a:ext cx="2634343" cy="2862322"/>
+            <a:ext cx="2634343" cy="2800767"/>
           </a:xfrm>
           <a:prstGeom prst="rect">
             <a:avLst/>
@@ -3674,7 +3686,19 @@
             </a:r>
           </a:p>
           <a:p>
-            <a:endParaRPr lang="en-US" sz="2400" dirty="0"/>
+            <a:r>
+              <a:rPr lang="en-US" sz="2000" dirty="0" err="1"/>
+              <a:t>h</a:t>
+            </a:r>
+            <a:r>
+              <a:rPr lang="en-US" sz="2000" dirty="0" err="1" smtClean="0"/>
+              <a:t>as_many</a:t>
+            </a:r>
+            <a:r>
+              <a:rPr lang="en-US" sz="2000" dirty="0" smtClean="0"/>
+              <a:t> :messages</a:t>
+            </a:r>
+            <a:endParaRPr lang="en-US" sz="2000" dirty="0"/>
           </a:p>
           <a:p>
             <a:r>
@@ -3773,7 +3797,7 @@
         <p:spPr>
           <a:xfrm>
             <a:off x="4426857" y="2191657"/>
-            <a:ext cx="442685" cy="342590"/>
+            <a:ext cx="442685" cy="311813"/>
           </a:xfrm>
           <a:prstGeom prst="line">
             <a:avLst/>
@@ -3985,7 +4009,7 @@
         <p:spPr>
           <a:xfrm>
             <a:off x="8708571" y="979975"/>
-            <a:ext cx="2540000" cy="3416320"/>
+            <a:ext cx="2540000" cy="3724096"/>
           </a:xfrm>
           <a:prstGeom prst="rect">
             <a:avLst/>
@@ -4077,8 +4101,27 @@
             </a:r>
             <a:r>
               <a:rPr lang="en-US" sz="2000" dirty="0" smtClean="0"/>
-              <a:t> :user</a:t>
-            </a:r>
+              <a:t> :</a:t>
+            </a:r>
+            <a:r>
+              <a:rPr lang="en-US" sz="2000" dirty="0" smtClean="0"/>
+              <a:t>user</a:t>
+            </a:r>
+          </a:p>
+          <a:p>
+            <a:r>
+              <a:rPr lang="en-US" sz="2000" dirty="0" err="1"/>
+              <a:t>h</a:t>
+            </a:r>
+            <a:r>
+              <a:rPr lang="en-US" sz="2000" dirty="0" err="1" smtClean="0"/>
+              <a:t>as_many</a:t>
+            </a:r>
+            <a:r>
+              <a:rPr lang="en-US" sz="2000" dirty="0" smtClean="0"/>
+              <a:t> :replies</a:t>
+            </a:r>
+            <a:endParaRPr lang="en-US" sz="2000" dirty="0" smtClean="0"/>
           </a:p>
         </p:txBody>
       </p:sp>
@@ -4817,7 +4860,6 @@
               <a:rPr lang="en-US" sz="2400" dirty="0" smtClean="0"/>
               <a:t> </a:t>
             </a:r>
-            <a:endParaRPr lang="en-US" sz="2400" dirty="0" smtClean="0"/>
           </a:p>
           <a:p>
             <a:r>
@@ -4846,15 +4888,7 @@
             </a:r>
             <a:r>
               <a:rPr lang="en-US" sz="2000" dirty="0" smtClean="0"/>
-              <a:t> </a:t>
-            </a:r>
-            <a:r>
-              <a:rPr lang="en-US" sz="2000" dirty="0" smtClean="0"/>
-              <a:t>:</a:t>
-            </a:r>
-            <a:r>
-              <a:rPr lang="en-US" sz="2000" dirty="0" smtClean="0"/>
-              <a:t>message</a:t>
+              <a:t> :message</a:t>
             </a:r>
           </a:p>
           <a:p>
@@ -4866,7 +4900,6 @@
               <a:rPr lang="en-US" sz="2000" dirty="0" smtClean="0"/>
               <a:t> :user  </a:t>
             </a:r>
-            <a:endParaRPr lang="en-US" sz="2000" dirty="0" smtClean="0"/>
           </a:p>
         </p:txBody>
       </p:sp>

</xml_diff>